<commit_message>
🚧 Update block diagram (stage 3 in progress)
</commit_message>
<xml_diff>
--- a/Documents/Temporary_Documents/phoeniX Block diagram.pptx
+++ b/Documents/Temporary_Documents/phoeniX Block diagram.pptx
@@ -7287,6 +7287,114 @@
           <a:chExt cx="0" cy="0"/>
         </a:xfrm>
       </p:grpSpPr>
+      <p:cxnSp>
+        <p:nvCxnSpPr>
+          <p:cNvPr id="384" name="Straight Arrow Connector 383"/>
+          <p:cNvCxnSpPr/>
+          <p:nvPr/>
+        </p:nvCxnSpPr>
+        <p:spPr>
+          <a:xfrm>
+            <a:off x="10478468" y="3572605"/>
+            <a:ext cx="0" cy="372645"/>
+          </a:xfrm>
+          <a:prstGeom prst="straightConnector1">
+            <a:avLst/>
+          </a:prstGeom>
+          <a:ln w="12700">
+            <a:solidFill>
+              <a:schemeClr val="tx1"/>
+            </a:solidFill>
+            <a:tailEnd type="triangle"/>
+          </a:ln>
+        </p:spPr>
+        <p:style>
+          <a:lnRef idx="1">
+            <a:schemeClr val="accent1"/>
+          </a:lnRef>
+          <a:fillRef idx="0">
+            <a:schemeClr val="accent1"/>
+          </a:fillRef>
+          <a:effectRef idx="0">
+            <a:schemeClr val="accent1"/>
+          </a:effectRef>
+          <a:fontRef idx="minor">
+            <a:schemeClr val="tx1"/>
+          </a:fontRef>
+        </p:style>
+      </p:cxnSp>
+      <p:cxnSp>
+        <p:nvCxnSpPr>
+          <p:cNvPr id="385" name="Straight Arrow Connector 384"/>
+          <p:cNvCxnSpPr/>
+          <p:nvPr/>
+        </p:nvCxnSpPr>
+        <p:spPr>
+          <a:xfrm>
+            <a:off x="10328679" y="3571702"/>
+            <a:ext cx="0" cy="372645"/>
+          </a:xfrm>
+          <a:prstGeom prst="straightConnector1">
+            <a:avLst/>
+          </a:prstGeom>
+          <a:ln w="12700">
+            <a:solidFill>
+              <a:schemeClr val="tx1"/>
+            </a:solidFill>
+            <a:tailEnd type="triangle"/>
+          </a:ln>
+        </p:spPr>
+        <p:style>
+          <a:lnRef idx="1">
+            <a:schemeClr val="accent1"/>
+          </a:lnRef>
+          <a:fillRef idx="0">
+            <a:schemeClr val="accent1"/>
+          </a:fillRef>
+          <a:effectRef idx="0">
+            <a:schemeClr val="accent1"/>
+          </a:effectRef>
+          <a:fontRef idx="minor">
+            <a:schemeClr val="tx1"/>
+          </a:fontRef>
+        </p:style>
+      </p:cxnSp>
+      <p:cxnSp>
+        <p:nvCxnSpPr>
+          <p:cNvPr id="386" name="Straight Arrow Connector 385"/>
+          <p:cNvCxnSpPr/>
+          <p:nvPr/>
+        </p:nvCxnSpPr>
+        <p:spPr>
+          <a:xfrm>
+            <a:off x="10171796" y="3569296"/>
+            <a:ext cx="0" cy="372645"/>
+          </a:xfrm>
+          <a:prstGeom prst="straightConnector1">
+            <a:avLst/>
+          </a:prstGeom>
+          <a:ln w="12700">
+            <a:solidFill>
+              <a:schemeClr val="tx1"/>
+            </a:solidFill>
+            <a:tailEnd type="triangle"/>
+          </a:ln>
+        </p:spPr>
+        <p:style>
+          <a:lnRef idx="1">
+            <a:schemeClr val="accent1"/>
+          </a:lnRef>
+          <a:fillRef idx="0">
+            <a:schemeClr val="accent1"/>
+          </a:fillRef>
+          <a:effectRef idx="0">
+            <a:schemeClr val="accent1"/>
+          </a:effectRef>
+          <a:fontRef idx="minor">
+            <a:schemeClr val="tx1"/>
+          </a:fontRef>
+        </p:style>
+      </p:cxnSp>
       <p:sp>
         <p:nvSpPr>
           <p:cNvPr id="250" name="Rounded Rectangle 249"/>
@@ -7295,17 +7403,15 @@
         </p:nvSpPr>
         <p:spPr>
           <a:xfrm>
-            <a:off x="502783" y="1477431"/>
-            <a:ext cx="16169814" cy="7233606"/>
+            <a:off x="428657" y="1232876"/>
+            <a:ext cx="16278897" cy="7453924"/>
           </a:xfrm>
           <a:prstGeom prst="roundRect">
             <a:avLst>
               <a:gd name="adj" fmla="val 1821"/>
             </a:avLst>
           </a:prstGeom>
-          <a:solidFill>
-            <a:schemeClr val="bg1"/>
-          </a:solidFill>
+          <a:noFill/>
           <a:ln>
             <a:solidFill>
               <a:schemeClr val="tx1"/>
@@ -7347,20 +7453,57 @@
           </a:p>
         </p:txBody>
       </p:sp>
-      <p:sp>
-        <p:nvSpPr>
-          <p:cNvPr id="105" name="Trapezoid 104"/>
+      <p:cxnSp>
+        <p:nvCxnSpPr>
+          <p:cNvPr id="354" name="Elbow Connector 353"/>
+          <p:cNvCxnSpPr/>
+          <p:nvPr/>
+        </p:nvCxnSpPr>
+        <p:spPr>
+          <a:xfrm rot="5400000" flipH="1" flipV="1">
+            <a:off x="6872937" y="4828141"/>
+            <a:ext cx="3750667" cy="451184"/>
+          </a:xfrm>
+          <a:prstGeom prst="bentConnector3">
+            <a:avLst>
+              <a:gd name="adj1" fmla="val -10"/>
+            </a:avLst>
+          </a:prstGeom>
+          <a:ln w="12700">
+            <a:solidFill>
+              <a:schemeClr val="tx1"/>
+            </a:solidFill>
+          </a:ln>
+        </p:spPr>
+        <p:style>
+          <a:lnRef idx="1">
+            <a:schemeClr val="accent1"/>
+          </a:lnRef>
+          <a:fillRef idx="0">
+            <a:schemeClr val="accent1"/>
+          </a:fillRef>
+          <a:effectRef idx="0">
+            <a:schemeClr val="accent1"/>
+          </a:effectRef>
+          <a:fontRef idx="minor">
+            <a:schemeClr val="tx1"/>
+          </a:fontRef>
+        </p:style>
+      </p:cxnSp>
+      <p:sp>
+        <p:nvSpPr>
+          <p:cNvPr id="36" name="Rounded Rectangle 35"/>
           <p:cNvSpPr/>
           <p:nvPr/>
         </p:nvSpPr>
         <p:spPr>
-          <a:xfrm rot="5400000">
-            <a:off x="10832114" y="4098759"/>
-            <a:ext cx="1712000" cy="296009"/>
-          </a:xfrm>
-          <a:prstGeom prst="trapezoid">
+          <a:xfrm>
+            <a:off x="4691149" y="5033378"/>
+            <a:ext cx="1358828" cy="1211284"/>
+          </a:xfrm>
+          <a:prstGeom prst="roundRect">
             <a:avLst>
-              <a:gd name="adj" fmla="val 50716"/>
+              <a:gd name="adj" fmla="val 5363"/>
             </a:avLst>
           </a:prstGeom>
           <a:solidFill>
@@ -7398,31 +7541,90 @@
           <a:lstStyle/>
           <a:p>
             <a:pPr algn="ctr"/>
+            <a:r>
+              <a:rPr lang="en-US" sz="1798" dirty="0" smtClean="0">
+                <a:solidFill>
+                  <a:schemeClr val="tx1"/>
+                </a:solidFill>
+              </a:rPr>
+              <a:t>Register File</a:t>
+            </a:r>
+          </a:p>
+          <a:p>
+            <a:pPr algn="ctr"/>
+            <a:r>
+              <a:rPr lang="en-US" sz="1798" dirty="0" smtClean="0">
+                <a:solidFill>
+                  <a:schemeClr val="tx1"/>
+                </a:solidFill>
+              </a:rPr>
+              <a:t>(Read)</a:t>
+            </a:r>
             <a:endParaRPr lang="en-US" sz="1798" dirty="0">
               <a:solidFill>
-                <a:sysClr val="windowText" lastClr="000000"/>
+                <a:schemeClr val="tx1"/>
               </a:solidFill>
             </a:endParaRPr>
           </a:p>
         </p:txBody>
       </p:sp>
-      <p:sp>
-        <p:nvSpPr>
-          <p:cNvPr id="141" name="Rectangle 140"/>
+      <p:cxnSp>
+        <p:nvCxnSpPr>
+          <p:cNvPr id="38" name="Straight Arrow Connector 37"/>
+          <p:cNvCxnSpPr/>
+          <p:nvPr/>
+        </p:nvCxnSpPr>
+        <p:spPr>
+          <a:xfrm>
+            <a:off x="4500367" y="3506434"/>
+            <a:ext cx="190110" cy="0"/>
+          </a:xfrm>
+          <a:prstGeom prst="straightConnector1">
+            <a:avLst/>
+          </a:prstGeom>
+          <a:ln w="12700">
+            <a:solidFill>
+              <a:schemeClr val="tx1"/>
+            </a:solidFill>
+            <a:tailEnd type="triangle"/>
+          </a:ln>
+        </p:spPr>
+        <p:style>
+          <a:lnRef idx="1">
+            <a:schemeClr val="accent1"/>
+          </a:lnRef>
+          <a:fillRef idx="0">
+            <a:schemeClr val="accent1"/>
+          </a:fillRef>
+          <a:effectRef idx="0">
+            <a:schemeClr val="accent1"/>
+          </a:effectRef>
+          <a:fontRef idx="minor">
+            <a:schemeClr val="tx1"/>
+          </a:fontRef>
+        </p:style>
+      </p:cxnSp>
+      <p:sp>
+        <p:nvSpPr>
+          <p:cNvPr id="84" name="Rounded Rectangle 83"/>
           <p:cNvSpPr/>
           <p:nvPr/>
         </p:nvSpPr>
         <p:spPr>
           <a:xfrm>
-            <a:off x="11540110" y="3520101"/>
-            <a:ext cx="296009" cy="402227"/>
-          </a:xfrm>
-          <a:prstGeom prst="rect">
-            <a:avLst/>
+            <a:off x="5726227" y="2293917"/>
+            <a:ext cx="1541807" cy="627065"/>
+          </a:xfrm>
+          <a:prstGeom prst="roundRect">
+            <a:avLst>
+              <a:gd name="adj" fmla="val 5363"/>
+            </a:avLst>
           </a:prstGeom>
           <a:noFill/>
           <a:ln>
-            <a:noFill/>
+            <a:solidFill>
+              <a:schemeClr val="tx1"/>
+            </a:solidFill>
           </a:ln>
         </p:spPr>
         <p:style>
@@ -7451,173 +7653,6 @@
           <a:lstStyle/>
           <a:p>
             <a:pPr algn="ctr"/>
-            <a:endParaRPr lang="en-US" sz="1798"/>
-          </a:p>
-        </p:txBody>
-      </p:sp>
-      <p:sp>
-        <p:nvSpPr>
-          <p:cNvPr id="36" name="Rounded Rectangle 35"/>
-          <p:cNvSpPr/>
-          <p:nvPr/>
-        </p:nvSpPr>
-        <p:spPr>
-          <a:xfrm>
-            <a:off x="4691149" y="5033378"/>
-            <a:ext cx="1358828" cy="1211284"/>
-          </a:xfrm>
-          <a:prstGeom prst="roundRect">
-            <a:avLst>
-              <a:gd name="adj" fmla="val 5363"/>
-            </a:avLst>
-          </a:prstGeom>
-          <a:solidFill>
-            <a:schemeClr val="bg1"/>
-          </a:solidFill>
-          <a:ln>
-            <a:solidFill>
-              <a:schemeClr val="tx1"/>
-            </a:solidFill>
-          </a:ln>
-        </p:spPr>
-        <p:style>
-          <a:lnRef idx="2">
-            <a:schemeClr val="accent1">
-              <a:shade val="50000"/>
-            </a:schemeClr>
-          </a:lnRef>
-          <a:fillRef idx="1">
-            <a:schemeClr val="accent1"/>
-          </a:fillRef>
-          <a:effectRef idx="0">
-            <a:schemeClr val="accent1"/>
-          </a:effectRef>
-          <a:fontRef idx="minor">
-            <a:schemeClr val="lt1"/>
-          </a:fontRef>
-        </p:style>
-        <p:txBody>
-          <a:bodyPr rot="0" spcFirstLastPara="0" vertOverflow="overflow" horzOverflow="overflow" vert="horz" wrap="square" lIns="91440" tIns="45721" rIns="91440" bIns="45721" numCol="1" spcCol="0" rtlCol="0" fromWordArt="0" anchor="ctr" anchorCtr="0" forceAA="0" compatLnSpc="1">
-            <a:prstTxWarp prst="textNoShape">
-              <a:avLst/>
-            </a:prstTxWarp>
-            <a:noAutofit/>
-          </a:bodyPr>
-          <a:lstStyle/>
-          <a:p>
-            <a:pPr algn="ctr"/>
-            <a:r>
-              <a:rPr lang="en-US" sz="1798" dirty="0" smtClean="0">
-                <a:solidFill>
-                  <a:schemeClr val="tx1"/>
-                </a:solidFill>
-              </a:rPr>
-              <a:t>Register File</a:t>
-            </a:r>
-          </a:p>
-          <a:p>
-            <a:pPr algn="ctr"/>
-            <a:r>
-              <a:rPr lang="en-US" sz="1798" dirty="0" smtClean="0">
-                <a:solidFill>
-                  <a:schemeClr val="tx1"/>
-                </a:solidFill>
-              </a:rPr>
-              <a:t>(Read)</a:t>
-            </a:r>
-            <a:endParaRPr lang="en-US" sz="1798" dirty="0">
-              <a:solidFill>
-                <a:schemeClr val="tx1"/>
-              </a:solidFill>
-            </a:endParaRPr>
-          </a:p>
-        </p:txBody>
-      </p:sp>
-      <p:cxnSp>
-        <p:nvCxnSpPr>
-          <p:cNvPr id="38" name="Straight Arrow Connector 37"/>
-          <p:cNvCxnSpPr/>
-          <p:nvPr/>
-        </p:nvCxnSpPr>
-        <p:spPr>
-          <a:xfrm>
-            <a:off x="4500367" y="3506434"/>
-            <a:ext cx="190110" cy="0"/>
-          </a:xfrm>
-          <a:prstGeom prst="straightConnector1">
-            <a:avLst/>
-          </a:prstGeom>
-          <a:ln w="12700">
-            <a:solidFill>
-              <a:schemeClr val="tx1"/>
-            </a:solidFill>
-            <a:tailEnd type="triangle"/>
-          </a:ln>
-        </p:spPr>
-        <p:style>
-          <a:lnRef idx="1">
-            <a:schemeClr val="accent1"/>
-          </a:lnRef>
-          <a:fillRef idx="0">
-            <a:schemeClr val="accent1"/>
-          </a:fillRef>
-          <a:effectRef idx="0">
-            <a:schemeClr val="accent1"/>
-          </a:effectRef>
-          <a:fontRef idx="minor">
-            <a:schemeClr val="tx1"/>
-          </a:fontRef>
-        </p:style>
-      </p:cxnSp>
-      <p:sp>
-        <p:nvSpPr>
-          <p:cNvPr id="84" name="Rounded Rectangle 83"/>
-          <p:cNvSpPr/>
-          <p:nvPr/>
-        </p:nvSpPr>
-        <p:spPr>
-          <a:xfrm>
-            <a:off x="5726227" y="2293917"/>
-            <a:ext cx="1541807" cy="627065"/>
-          </a:xfrm>
-          <a:prstGeom prst="roundRect">
-            <a:avLst>
-              <a:gd name="adj" fmla="val 5363"/>
-            </a:avLst>
-          </a:prstGeom>
-          <a:noFill/>
-          <a:ln>
-            <a:solidFill>
-              <a:schemeClr val="tx1"/>
-            </a:solidFill>
-          </a:ln>
-        </p:spPr>
-        <p:style>
-          <a:lnRef idx="2">
-            <a:schemeClr val="accent1">
-              <a:shade val="50000"/>
-            </a:schemeClr>
-          </a:lnRef>
-          <a:fillRef idx="1">
-            <a:schemeClr val="accent1"/>
-          </a:fillRef>
-          <a:effectRef idx="0">
-            <a:schemeClr val="accent1"/>
-          </a:effectRef>
-          <a:fontRef idx="minor">
-            <a:schemeClr val="lt1"/>
-          </a:fontRef>
-        </p:style>
-        <p:txBody>
-          <a:bodyPr rot="0" spcFirstLastPara="0" vertOverflow="overflow" horzOverflow="overflow" vert="horz" wrap="square" lIns="91440" tIns="45721" rIns="91440" bIns="45721" numCol="1" spcCol="0" rtlCol="0" fromWordArt="0" anchor="ctr" anchorCtr="0" forceAA="0" compatLnSpc="1">
-            <a:prstTxWarp prst="textNoShape">
-              <a:avLst/>
-            </a:prstTxWarp>
-            <a:noAutofit/>
-          </a:bodyPr>
-          <a:lstStyle/>
-          <a:p>
-            <a:pPr algn="ctr"/>
             <a:r>
               <a:rPr lang="en-US" sz="1798" dirty="0">
                 <a:solidFill>
@@ -7680,890 +7715,14 @@
       </p:cxnSp>
       <p:grpSp>
         <p:nvGrpSpPr>
-          <p:cNvPr id="95" name="Group 94"/>
+          <p:cNvPr id="163" name="Group 162"/>
           <p:cNvGrpSpPr/>
           <p:nvPr/>
         </p:nvGrpSpPr>
         <p:grpSpPr>
           <a:xfrm>
-            <a:off x="8324953" y="1696802"/>
-            <a:ext cx="507476" cy="6872530"/>
-            <a:chOff x="4944353" y="2024407"/>
-            <a:chExt cx="507477" cy="1545997"/>
-          </a:xfrm>
-          <a:solidFill>
-            <a:schemeClr val="bg2"/>
-          </a:solidFill>
-        </p:grpSpPr>
-        <p:sp>
-          <p:nvSpPr>
-            <p:cNvPr id="96" name="Rounded Rectangle 95"/>
-            <p:cNvSpPr/>
-            <p:nvPr/>
-          </p:nvSpPr>
-          <p:spPr>
-            <a:xfrm>
-              <a:off x="4944353" y="2024407"/>
-              <a:ext cx="507477" cy="1545996"/>
-            </a:xfrm>
-            <a:prstGeom prst="roundRect">
-              <a:avLst>
-                <a:gd name="adj" fmla="val 5363"/>
-              </a:avLst>
-            </a:prstGeom>
-            <a:grpFill/>
-            <a:ln>
-              <a:solidFill>
-                <a:schemeClr val="tx1"/>
-              </a:solidFill>
-            </a:ln>
-          </p:spPr>
-          <p:style>
-            <a:lnRef idx="2">
-              <a:schemeClr val="accent1">
-                <a:shade val="50000"/>
-              </a:schemeClr>
-            </a:lnRef>
-            <a:fillRef idx="1">
-              <a:schemeClr val="accent1"/>
-            </a:fillRef>
-            <a:effectRef idx="0">
-              <a:schemeClr val="accent1"/>
-            </a:effectRef>
-            <a:fontRef idx="minor">
-              <a:schemeClr val="lt1"/>
-            </a:fontRef>
-          </p:style>
-          <p:txBody>
-            <a:bodyPr rot="0" spcFirstLastPara="0" vertOverflow="overflow" horzOverflow="overflow" vert="horz" wrap="square" lIns="91440" tIns="45721" rIns="91440" bIns="45721" numCol="1" spcCol="0" rtlCol="0" fromWordArt="0" anchor="ctr" anchorCtr="0" forceAA="0" compatLnSpc="1">
-              <a:prstTxWarp prst="textNoShape">
-                <a:avLst/>
-              </a:prstTxWarp>
-              <a:noAutofit/>
-            </a:bodyPr>
-            <a:lstStyle/>
-            <a:p>
-              <a:pPr algn="ctr"/>
-              <a:r>
-                <a:rPr lang="en-US" sz="1798" dirty="0">
-                  <a:solidFill>
-                    <a:schemeClr val="tx1"/>
-                  </a:solidFill>
-                </a:rPr>
-                <a:t>ID</a:t>
-              </a:r>
-            </a:p>
-          </p:txBody>
-        </p:sp>
-        <p:sp>
-          <p:nvSpPr>
-            <p:cNvPr id="97" name="Isosceles Triangle 96"/>
-            <p:cNvSpPr/>
-            <p:nvPr/>
-          </p:nvSpPr>
-          <p:spPr>
-            <a:xfrm>
-              <a:off x="5094978" y="3534070"/>
-              <a:ext cx="185057" cy="36334"/>
-            </a:xfrm>
-            <a:prstGeom prst="triangle">
-              <a:avLst/>
-            </a:prstGeom>
-            <a:grpFill/>
-            <a:ln>
-              <a:solidFill>
-                <a:schemeClr val="tx1"/>
-              </a:solidFill>
-            </a:ln>
-          </p:spPr>
-          <p:style>
-            <a:lnRef idx="2">
-              <a:schemeClr val="accent1">
-                <a:shade val="50000"/>
-              </a:schemeClr>
-            </a:lnRef>
-            <a:fillRef idx="1">
-              <a:schemeClr val="accent1"/>
-            </a:fillRef>
-            <a:effectRef idx="0">
-              <a:schemeClr val="accent1"/>
-            </a:effectRef>
-            <a:fontRef idx="minor">
-              <a:schemeClr val="lt1"/>
-            </a:fontRef>
-          </p:style>
-          <p:txBody>
-            <a:bodyPr rot="0" spcFirstLastPara="0" vertOverflow="overflow" horzOverflow="overflow" vert="horz" wrap="square" lIns="91440" tIns="45721" rIns="91440" bIns="45721" numCol="1" spcCol="0" rtlCol="0" fromWordArt="0" anchor="ctr" anchorCtr="0" forceAA="0" compatLnSpc="1">
-              <a:prstTxWarp prst="textNoShape">
-                <a:avLst/>
-              </a:prstTxWarp>
-              <a:noAutofit/>
-            </a:bodyPr>
-            <a:lstStyle/>
-            <a:p>
-              <a:pPr algn="ctr"/>
-              <a:endParaRPr lang="en-US" sz="1798"/>
-            </a:p>
-          </p:txBody>
-        </p:sp>
-      </p:grpSp>
-      <p:sp>
-        <p:nvSpPr>
-          <p:cNvPr id="100" name="Rounded Rectangle 99"/>
-          <p:cNvSpPr/>
-          <p:nvPr/>
-        </p:nvSpPr>
-        <p:spPr>
-          <a:xfrm>
-            <a:off x="9684453" y="2293917"/>
-            <a:ext cx="1326454" cy="612740"/>
-          </a:xfrm>
-          <a:prstGeom prst="roundRect">
-            <a:avLst>
-              <a:gd name="adj" fmla="val 5363"/>
-            </a:avLst>
-          </a:prstGeom>
-          <a:noFill/>
-          <a:ln>
-            <a:solidFill>
-              <a:schemeClr val="tx1"/>
-            </a:solidFill>
-          </a:ln>
-        </p:spPr>
-        <p:style>
-          <a:lnRef idx="2">
-            <a:schemeClr val="accent1">
-              <a:shade val="50000"/>
-            </a:schemeClr>
-          </a:lnRef>
-          <a:fillRef idx="1">
-            <a:schemeClr val="accent1"/>
-          </a:fillRef>
-          <a:effectRef idx="0">
-            <a:schemeClr val="accent1"/>
-          </a:effectRef>
-          <a:fontRef idx="minor">
-            <a:schemeClr val="lt1"/>
-          </a:fontRef>
-        </p:style>
-        <p:txBody>
-          <a:bodyPr rot="0" spcFirstLastPara="0" vertOverflow="overflow" horzOverflow="overflow" vert="horz" wrap="square" lIns="91440" tIns="45721" rIns="91440" bIns="45721" numCol="1" spcCol="0" rtlCol="0" fromWordArt="0" anchor="ctr" anchorCtr="0" forceAA="0" compatLnSpc="1">
-            <a:prstTxWarp prst="textNoShape">
-              <a:avLst/>
-            </a:prstTxWarp>
-            <a:noAutofit/>
-          </a:bodyPr>
-          <a:lstStyle/>
-          <a:p>
-            <a:pPr algn="ctr"/>
-            <a:r>
-              <a:rPr lang="en-US" sz="1798" dirty="0">
-                <a:solidFill>
-                  <a:schemeClr val="tx1"/>
-                </a:solidFill>
-              </a:rPr>
-              <a:t>ALU</a:t>
-            </a:r>
-          </a:p>
-        </p:txBody>
-      </p:sp>
-      <p:sp>
-        <p:nvSpPr>
-          <p:cNvPr id="101" name="Rounded Rectangle 100"/>
-          <p:cNvSpPr/>
-          <p:nvPr/>
-        </p:nvSpPr>
-        <p:spPr>
-          <a:xfrm>
-            <a:off x="9684453" y="3118156"/>
-            <a:ext cx="1326454" cy="612740"/>
-          </a:xfrm>
-          <a:prstGeom prst="roundRect">
-            <a:avLst>
-              <a:gd name="adj" fmla="val 5363"/>
-            </a:avLst>
-          </a:prstGeom>
-          <a:noFill/>
-          <a:ln>
-            <a:solidFill>
-              <a:schemeClr val="tx1"/>
-            </a:solidFill>
-          </a:ln>
-        </p:spPr>
-        <p:style>
-          <a:lnRef idx="2">
-            <a:schemeClr val="accent1">
-              <a:shade val="50000"/>
-            </a:schemeClr>
-          </a:lnRef>
-          <a:fillRef idx="1">
-            <a:schemeClr val="accent1"/>
-          </a:fillRef>
-          <a:effectRef idx="0">
-            <a:schemeClr val="accent1"/>
-          </a:effectRef>
-          <a:fontRef idx="minor">
-            <a:schemeClr val="lt1"/>
-          </a:fontRef>
-        </p:style>
-        <p:txBody>
-          <a:bodyPr rot="0" spcFirstLastPara="0" vertOverflow="overflow" horzOverflow="overflow" vert="horz" wrap="square" lIns="91440" tIns="45721" rIns="91440" bIns="45721" numCol="1" spcCol="0" rtlCol="0" fromWordArt="0" anchor="ctr" anchorCtr="0" forceAA="0" compatLnSpc="1">
-            <a:prstTxWarp prst="textNoShape">
-              <a:avLst/>
-            </a:prstTxWarp>
-            <a:noAutofit/>
-          </a:bodyPr>
-          <a:lstStyle/>
-          <a:p>
-            <a:pPr algn="ctr"/>
-            <a:r>
-              <a:rPr lang="en-US" sz="1798" dirty="0">
-                <a:solidFill>
-                  <a:schemeClr val="tx1"/>
-                </a:solidFill>
-              </a:rPr>
-              <a:t>MUL/DIV</a:t>
-            </a:r>
-          </a:p>
-        </p:txBody>
-      </p:sp>
-      <p:sp>
-        <p:nvSpPr>
-          <p:cNvPr id="102" name="Rounded Rectangle 101"/>
-          <p:cNvSpPr/>
-          <p:nvPr/>
-        </p:nvSpPr>
-        <p:spPr>
-          <a:xfrm>
-            <a:off x="9684453" y="3942397"/>
-            <a:ext cx="1326454" cy="612740"/>
-          </a:xfrm>
-          <a:prstGeom prst="roundRect">
-            <a:avLst>
-              <a:gd name="adj" fmla="val 5363"/>
-            </a:avLst>
-          </a:prstGeom>
-          <a:noFill/>
-          <a:ln>
-            <a:solidFill>
-              <a:schemeClr val="tx1"/>
-            </a:solidFill>
-          </a:ln>
-        </p:spPr>
-        <p:style>
-          <a:lnRef idx="2">
-            <a:schemeClr val="accent1">
-              <a:shade val="50000"/>
-            </a:schemeClr>
-          </a:lnRef>
-          <a:fillRef idx="1">
-            <a:schemeClr val="accent1"/>
-          </a:fillRef>
-          <a:effectRef idx="0">
-            <a:schemeClr val="accent1"/>
-          </a:effectRef>
-          <a:fontRef idx="minor">
-            <a:schemeClr val="lt1"/>
-          </a:fontRef>
-        </p:style>
-        <p:txBody>
-          <a:bodyPr rot="0" spcFirstLastPara="0" vertOverflow="overflow" horzOverflow="overflow" vert="horz" wrap="square" lIns="91440" tIns="45721" rIns="91440" bIns="45721" numCol="1" spcCol="0" rtlCol="0" fromWordArt="0" anchor="ctr" anchorCtr="0" forceAA="0" compatLnSpc="1">
-            <a:prstTxWarp prst="textNoShape">
-              <a:avLst/>
-            </a:prstTxWarp>
-            <a:noAutofit/>
-          </a:bodyPr>
-          <a:lstStyle/>
-          <a:p>
-            <a:pPr algn="ctr"/>
-            <a:r>
-              <a:rPr lang="en-US" sz="1798" dirty="0">
-                <a:solidFill>
-                  <a:schemeClr val="tx1"/>
-                </a:solidFill>
-              </a:rPr>
-              <a:t>FPU</a:t>
-            </a:r>
-          </a:p>
-        </p:txBody>
-      </p:sp>
-      <p:sp>
-        <p:nvSpPr>
-          <p:cNvPr id="103" name="Rounded Rectangle 102"/>
-          <p:cNvSpPr/>
-          <p:nvPr/>
-        </p:nvSpPr>
-        <p:spPr>
-          <a:xfrm>
-            <a:off x="9684453" y="4766640"/>
-            <a:ext cx="1326454" cy="612740"/>
-          </a:xfrm>
-          <a:prstGeom prst="roundRect">
-            <a:avLst>
-              <a:gd name="adj" fmla="val 5363"/>
-            </a:avLst>
-          </a:prstGeom>
-          <a:noFill/>
-          <a:ln>
-            <a:solidFill>
-              <a:schemeClr val="tx1"/>
-            </a:solidFill>
-          </a:ln>
-        </p:spPr>
-        <p:style>
-          <a:lnRef idx="2">
-            <a:schemeClr val="accent1">
-              <a:shade val="50000"/>
-            </a:schemeClr>
-          </a:lnRef>
-          <a:fillRef idx="1">
-            <a:schemeClr val="accent1"/>
-          </a:fillRef>
-          <a:effectRef idx="0">
-            <a:schemeClr val="accent1"/>
-          </a:effectRef>
-          <a:fontRef idx="minor">
-            <a:schemeClr val="lt1"/>
-          </a:fontRef>
-        </p:style>
-        <p:txBody>
-          <a:bodyPr rot="0" spcFirstLastPara="0" vertOverflow="overflow" horzOverflow="overflow" vert="horz" wrap="square" lIns="91440" tIns="45721" rIns="91440" bIns="45721" numCol="1" spcCol="0" rtlCol="0" fromWordArt="0" anchor="ctr" anchorCtr="0" forceAA="0" compatLnSpc="1">
-            <a:prstTxWarp prst="textNoShape">
-              <a:avLst/>
-            </a:prstTxWarp>
-            <a:noAutofit/>
-          </a:bodyPr>
-          <a:lstStyle/>
-          <a:p>
-            <a:pPr algn="ctr"/>
-            <a:r>
-              <a:rPr lang="en-US" sz="1798" dirty="0">
-                <a:solidFill>
-                  <a:schemeClr val="tx1"/>
-                </a:solidFill>
-              </a:rPr>
-              <a:t>Branch Unit</a:t>
-            </a:r>
-          </a:p>
-        </p:txBody>
-      </p:sp>
-      <p:sp>
-        <p:nvSpPr>
-          <p:cNvPr id="104" name="Rounded Rectangle 103"/>
-          <p:cNvSpPr/>
-          <p:nvPr/>
-        </p:nvSpPr>
-        <p:spPr>
-          <a:xfrm>
-            <a:off x="9684453" y="5592109"/>
-            <a:ext cx="1326454" cy="612740"/>
-          </a:xfrm>
-          <a:prstGeom prst="roundRect">
-            <a:avLst>
-              <a:gd name="adj" fmla="val 5363"/>
-            </a:avLst>
-          </a:prstGeom>
-          <a:noFill/>
-          <a:ln>
-            <a:solidFill>
-              <a:schemeClr val="tx1"/>
-            </a:solidFill>
-          </a:ln>
-        </p:spPr>
-        <p:style>
-          <a:lnRef idx="2">
-            <a:schemeClr val="accent1">
-              <a:shade val="50000"/>
-            </a:schemeClr>
-          </a:lnRef>
-          <a:fillRef idx="1">
-            <a:schemeClr val="accent1"/>
-          </a:fillRef>
-          <a:effectRef idx="0">
-            <a:schemeClr val="accent1"/>
-          </a:effectRef>
-          <a:fontRef idx="minor">
-            <a:schemeClr val="lt1"/>
-          </a:fontRef>
-        </p:style>
-        <p:txBody>
-          <a:bodyPr rot="0" spcFirstLastPara="0" vertOverflow="overflow" horzOverflow="overflow" vert="horz" wrap="square" lIns="91440" tIns="45721" rIns="91440" bIns="45721" numCol="1" spcCol="0" rtlCol="0" fromWordArt="0" anchor="ctr" anchorCtr="0" forceAA="0" compatLnSpc="1">
-            <a:prstTxWarp prst="textNoShape">
-              <a:avLst/>
-            </a:prstTxWarp>
-            <a:noAutofit/>
-          </a:bodyPr>
-          <a:lstStyle/>
-          <a:p>
-            <a:pPr algn="ctr"/>
-            <a:r>
-              <a:rPr lang="en-US" sz="1798" dirty="0">
-                <a:solidFill>
-                  <a:schemeClr val="tx1"/>
-                </a:solidFill>
-              </a:rPr>
-              <a:t>LSU</a:t>
-            </a:r>
-          </a:p>
-          <a:p>
-            <a:pPr algn="ctr"/>
-            <a:r>
-              <a:rPr lang="en-US" sz="1798" dirty="0">
-                <a:solidFill>
-                  <a:schemeClr val="tx1"/>
-                </a:solidFill>
-              </a:rPr>
-              <a:t>Address</a:t>
-            </a:r>
-          </a:p>
-        </p:txBody>
-      </p:sp>
-      <p:cxnSp>
-        <p:nvCxnSpPr>
-          <p:cNvPr id="107" name="Straight Arrow Connector 106"/>
-          <p:cNvCxnSpPr>
-            <a:stCxn id="102" idx="3"/>
-            <a:endCxn id="105" idx="2"/>
-          </p:cNvCxnSpPr>
-          <p:nvPr/>
-        </p:nvCxnSpPr>
-        <p:spPr>
-          <a:xfrm flipV="1">
-            <a:off x="11010907" y="4246760"/>
-            <a:ext cx="529204" cy="2006"/>
-          </a:xfrm>
-          <a:prstGeom prst="straightConnector1">
-            <a:avLst/>
-          </a:prstGeom>
-          <a:ln w="12700">
-            <a:solidFill>
-              <a:schemeClr val="tx1"/>
-            </a:solidFill>
-            <a:tailEnd type="triangle"/>
-          </a:ln>
-        </p:spPr>
-        <p:style>
-          <a:lnRef idx="1">
-            <a:schemeClr val="accent1"/>
-          </a:lnRef>
-          <a:fillRef idx="0">
-            <a:schemeClr val="accent1"/>
-          </a:fillRef>
-          <a:effectRef idx="0">
-            <a:schemeClr val="accent1"/>
-          </a:effectRef>
-          <a:fontRef idx="minor">
-            <a:schemeClr val="tx1"/>
-          </a:fontRef>
-        </p:style>
-      </p:cxnSp>
-      <p:cxnSp>
-        <p:nvCxnSpPr>
-          <p:cNvPr id="122" name="Elbow Connector 121"/>
-          <p:cNvCxnSpPr>
-            <a:stCxn id="101" idx="3"/>
-          </p:cNvCxnSpPr>
-          <p:nvPr/>
-        </p:nvCxnSpPr>
-        <p:spPr>
-          <a:xfrm>
-            <a:off x="11010907" y="3424526"/>
-            <a:ext cx="529204" cy="497794"/>
-          </a:xfrm>
-          <a:prstGeom prst="bentConnector3">
-            <a:avLst/>
-          </a:prstGeom>
-          <a:ln w="12700">
-            <a:solidFill>
-              <a:schemeClr val="tx1"/>
-            </a:solidFill>
-            <a:tailEnd type="triangle"/>
-          </a:ln>
-        </p:spPr>
-        <p:style>
-          <a:lnRef idx="1">
-            <a:schemeClr val="accent1"/>
-          </a:lnRef>
-          <a:fillRef idx="0">
-            <a:schemeClr val="accent1"/>
-          </a:fillRef>
-          <a:effectRef idx="0">
-            <a:schemeClr val="accent1"/>
-          </a:effectRef>
-          <a:fontRef idx="minor">
-            <a:schemeClr val="tx1"/>
-          </a:fontRef>
-        </p:style>
-      </p:cxnSp>
-      <p:cxnSp>
-        <p:nvCxnSpPr>
-          <p:cNvPr id="125" name="Elbow Connector 124"/>
-          <p:cNvCxnSpPr>
-            <a:stCxn id="103" idx="3"/>
-          </p:cNvCxnSpPr>
-          <p:nvPr/>
-        </p:nvCxnSpPr>
-        <p:spPr>
-          <a:xfrm flipV="1">
-            <a:off x="11010907" y="4555142"/>
-            <a:ext cx="529204" cy="517870"/>
-          </a:xfrm>
-          <a:prstGeom prst="bentConnector3">
-            <a:avLst/>
-          </a:prstGeom>
-          <a:ln w="12700">
-            <a:solidFill>
-              <a:schemeClr val="tx1"/>
-            </a:solidFill>
-            <a:tailEnd type="triangle"/>
-          </a:ln>
-        </p:spPr>
-        <p:style>
-          <a:lnRef idx="1">
-            <a:schemeClr val="accent1"/>
-          </a:lnRef>
-          <a:fillRef idx="0">
-            <a:schemeClr val="accent1"/>
-          </a:fillRef>
-          <a:effectRef idx="0">
-            <a:schemeClr val="accent1"/>
-          </a:effectRef>
-          <a:fontRef idx="minor">
-            <a:schemeClr val="tx1"/>
-          </a:fontRef>
-        </p:style>
-      </p:cxnSp>
-      <p:cxnSp>
-        <p:nvCxnSpPr>
-          <p:cNvPr id="136" name="Elbow Connector 135"/>
-          <p:cNvCxnSpPr>
-            <a:stCxn id="100" idx="3"/>
-            <a:endCxn id="141" idx="1"/>
-          </p:cNvCxnSpPr>
-          <p:nvPr/>
-        </p:nvCxnSpPr>
-        <p:spPr>
-          <a:xfrm>
-            <a:off x="11010907" y="2600284"/>
-            <a:ext cx="529204" cy="1120924"/>
-          </a:xfrm>
-          <a:prstGeom prst="bentConnector3">
-            <a:avLst>
-              <a:gd name="adj1" fmla="val 69199"/>
-            </a:avLst>
-          </a:prstGeom>
-          <a:ln w="12700">
-            <a:solidFill>
-              <a:schemeClr val="tx1"/>
-            </a:solidFill>
-            <a:tailEnd type="triangle"/>
-          </a:ln>
-        </p:spPr>
-        <p:style>
-          <a:lnRef idx="1">
-            <a:schemeClr val="accent1"/>
-          </a:lnRef>
-          <a:fillRef idx="0">
-            <a:schemeClr val="accent1"/>
-          </a:fillRef>
-          <a:effectRef idx="0">
-            <a:schemeClr val="accent1"/>
-          </a:effectRef>
-          <a:fontRef idx="minor">
-            <a:schemeClr val="tx1"/>
-          </a:fontRef>
-        </p:style>
-      </p:cxnSp>
-      <p:sp>
-        <p:nvSpPr>
-          <p:cNvPr id="145" name="Rectangle 144"/>
-          <p:cNvSpPr/>
-          <p:nvPr/>
-        </p:nvSpPr>
-        <p:spPr>
-          <a:xfrm>
-            <a:off x="11540110" y="4661651"/>
-            <a:ext cx="296009" cy="402227"/>
-          </a:xfrm>
-          <a:prstGeom prst="rect">
-            <a:avLst/>
-          </a:prstGeom>
-          <a:noFill/>
-          <a:ln>
-            <a:noFill/>
-          </a:ln>
-        </p:spPr>
-        <p:style>
-          <a:lnRef idx="2">
-            <a:schemeClr val="accent1">
-              <a:shade val="50000"/>
-            </a:schemeClr>
-          </a:lnRef>
-          <a:fillRef idx="1">
-            <a:schemeClr val="accent1"/>
-          </a:fillRef>
-          <a:effectRef idx="0">
-            <a:schemeClr val="accent1"/>
-          </a:effectRef>
-          <a:fontRef idx="minor">
-            <a:schemeClr val="lt1"/>
-          </a:fontRef>
-        </p:style>
-        <p:txBody>
-          <a:bodyPr rot="0" spcFirstLastPara="0" vertOverflow="overflow" horzOverflow="overflow" vert="horz" wrap="square" lIns="91440" tIns="45721" rIns="91440" bIns="45721" numCol="1" spcCol="0" rtlCol="0" fromWordArt="0" anchor="ctr" anchorCtr="0" forceAA="0" compatLnSpc="1">
-            <a:prstTxWarp prst="textNoShape">
-              <a:avLst/>
-            </a:prstTxWarp>
-            <a:noAutofit/>
-          </a:bodyPr>
-          <a:lstStyle/>
-          <a:p>
-            <a:pPr algn="ctr"/>
-            <a:endParaRPr lang="en-US" sz="1798"/>
-          </a:p>
-        </p:txBody>
-      </p:sp>
-      <p:cxnSp>
-        <p:nvCxnSpPr>
-          <p:cNvPr id="147" name="Elbow Connector 146"/>
-          <p:cNvCxnSpPr>
-            <a:stCxn id="104" idx="3"/>
-            <a:endCxn id="145" idx="1"/>
-          </p:cNvCxnSpPr>
-          <p:nvPr/>
-        </p:nvCxnSpPr>
-        <p:spPr>
-          <a:xfrm flipV="1">
-            <a:off x="11010914" y="4862765"/>
-            <a:ext cx="529201" cy="1035719"/>
-          </a:xfrm>
-          <a:prstGeom prst="bentConnector3">
-            <a:avLst>
-              <a:gd name="adj1" fmla="val 66799"/>
-            </a:avLst>
-          </a:prstGeom>
-          <a:ln w="12700">
-            <a:solidFill>
-              <a:schemeClr val="tx1"/>
-            </a:solidFill>
-            <a:tailEnd type="triangle"/>
-          </a:ln>
-        </p:spPr>
-        <p:style>
-          <a:lnRef idx="1">
-            <a:schemeClr val="accent1"/>
-          </a:lnRef>
-          <a:fillRef idx="0">
-            <a:schemeClr val="accent1"/>
-          </a:fillRef>
-          <a:effectRef idx="0">
-            <a:schemeClr val="accent1"/>
-          </a:effectRef>
-          <a:fontRef idx="minor">
-            <a:schemeClr val="tx1"/>
-          </a:fontRef>
-        </p:style>
-      </p:cxnSp>
-      <p:cxnSp>
-        <p:nvCxnSpPr>
-          <p:cNvPr id="150" name="Straight Arrow Connector 149"/>
-          <p:cNvCxnSpPr>
-            <a:endCxn id="100" idx="1"/>
-          </p:cNvCxnSpPr>
-          <p:nvPr/>
-        </p:nvCxnSpPr>
-        <p:spPr>
-          <a:xfrm>
-            <a:off x="9429067" y="2600280"/>
-            <a:ext cx="255390" cy="0"/>
-          </a:xfrm>
-          <a:prstGeom prst="straightConnector1">
-            <a:avLst/>
-          </a:prstGeom>
-          <a:ln w="12700">
-            <a:solidFill>
-              <a:schemeClr val="tx1"/>
-            </a:solidFill>
-            <a:tailEnd type="triangle"/>
-          </a:ln>
-        </p:spPr>
-        <p:style>
-          <a:lnRef idx="1">
-            <a:schemeClr val="accent1"/>
-          </a:lnRef>
-          <a:fillRef idx="0">
-            <a:schemeClr val="accent1"/>
-          </a:fillRef>
-          <a:effectRef idx="0">
-            <a:schemeClr val="accent1"/>
-          </a:effectRef>
-          <a:fontRef idx="minor">
-            <a:schemeClr val="tx1"/>
-          </a:fontRef>
-        </p:style>
-      </p:cxnSp>
-      <p:cxnSp>
-        <p:nvCxnSpPr>
-          <p:cNvPr id="152" name="Straight Arrow Connector 151"/>
-          <p:cNvCxnSpPr>
-            <a:endCxn id="101" idx="1"/>
-          </p:cNvCxnSpPr>
-          <p:nvPr/>
-        </p:nvCxnSpPr>
-        <p:spPr>
-          <a:xfrm>
-            <a:off x="9429067" y="3424520"/>
-            <a:ext cx="255390" cy="0"/>
-          </a:xfrm>
-          <a:prstGeom prst="straightConnector1">
-            <a:avLst/>
-          </a:prstGeom>
-          <a:ln w="12700">
-            <a:solidFill>
-              <a:schemeClr val="tx1"/>
-            </a:solidFill>
-            <a:tailEnd type="triangle"/>
-          </a:ln>
-        </p:spPr>
-        <p:style>
-          <a:lnRef idx="1">
-            <a:schemeClr val="accent1"/>
-          </a:lnRef>
-          <a:fillRef idx="0">
-            <a:schemeClr val="accent1"/>
-          </a:fillRef>
-          <a:effectRef idx="0">
-            <a:schemeClr val="accent1"/>
-          </a:effectRef>
-          <a:fontRef idx="minor">
-            <a:schemeClr val="tx1"/>
-          </a:fontRef>
-        </p:style>
-      </p:cxnSp>
-      <p:cxnSp>
-        <p:nvCxnSpPr>
-          <p:cNvPr id="154" name="Straight Arrow Connector 153"/>
-          <p:cNvCxnSpPr>
-            <a:endCxn id="102" idx="1"/>
-          </p:cNvCxnSpPr>
-          <p:nvPr/>
-        </p:nvCxnSpPr>
-        <p:spPr>
-          <a:xfrm>
-            <a:off x="9429067" y="4248763"/>
-            <a:ext cx="255390" cy="0"/>
-          </a:xfrm>
-          <a:prstGeom prst="straightConnector1">
-            <a:avLst/>
-          </a:prstGeom>
-          <a:ln w="12700">
-            <a:solidFill>
-              <a:schemeClr val="tx1"/>
-            </a:solidFill>
-            <a:tailEnd type="triangle"/>
-          </a:ln>
-        </p:spPr>
-        <p:style>
-          <a:lnRef idx="1">
-            <a:schemeClr val="accent1"/>
-          </a:lnRef>
-          <a:fillRef idx="0">
-            <a:schemeClr val="accent1"/>
-          </a:fillRef>
-          <a:effectRef idx="0">
-            <a:schemeClr val="accent1"/>
-          </a:effectRef>
-          <a:fontRef idx="minor">
-            <a:schemeClr val="tx1"/>
-          </a:fontRef>
-        </p:style>
-      </p:cxnSp>
-      <p:cxnSp>
-        <p:nvCxnSpPr>
-          <p:cNvPr id="158" name="Straight Arrow Connector 157"/>
-          <p:cNvCxnSpPr>
-            <a:endCxn id="103" idx="1"/>
-          </p:cNvCxnSpPr>
-          <p:nvPr/>
-        </p:nvCxnSpPr>
-        <p:spPr>
-          <a:xfrm>
-            <a:off x="9429067" y="5073004"/>
-            <a:ext cx="255390" cy="0"/>
-          </a:xfrm>
-          <a:prstGeom prst="straightConnector1">
-            <a:avLst/>
-          </a:prstGeom>
-          <a:ln w="12700">
-            <a:solidFill>
-              <a:schemeClr val="tx1"/>
-            </a:solidFill>
-            <a:tailEnd type="triangle"/>
-          </a:ln>
-        </p:spPr>
-        <p:style>
-          <a:lnRef idx="1">
-            <a:schemeClr val="accent1"/>
-          </a:lnRef>
-          <a:fillRef idx="0">
-            <a:schemeClr val="accent1"/>
-          </a:fillRef>
-          <a:effectRef idx="0">
-            <a:schemeClr val="accent1"/>
-          </a:effectRef>
-          <a:fontRef idx="minor">
-            <a:schemeClr val="tx1"/>
-          </a:fontRef>
-        </p:style>
-      </p:cxnSp>
-      <p:cxnSp>
-        <p:nvCxnSpPr>
-          <p:cNvPr id="160" name="Straight Arrow Connector 159"/>
-          <p:cNvCxnSpPr>
-            <a:endCxn id="104" idx="1"/>
-          </p:cNvCxnSpPr>
-          <p:nvPr/>
-        </p:nvCxnSpPr>
-        <p:spPr>
-          <a:xfrm>
-            <a:off x="9429067" y="5898470"/>
-            <a:ext cx="255390" cy="0"/>
-          </a:xfrm>
-          <a:prstGeom prst="straightConnector1">
-            <a:avLst/>
-          </a:prstGeom>
-          <a:ln w="12700">
-            <a:solidFill>
-              <a:schemeClr val="tx1"/>
-            </a:solidFill>
-            <a:tailEnd type="triangle"/>
-          </a:ln>
-        </p:spPr>
-        <p:style>
-          <a:lnRef idx="1">
-            <a:schemeClr val="accent1"/>
-          </a:lnRef>
-          <a:fillRef idx="0">
-            <a:schemeClr val="accent1"/>
-          </a:fillRef>
-          <a:effectRef idx="0">
-            <a:schemeClr val="accent1"/>
-          </a:effectRef>
-          <a:fontRef idx="minor">
-            <a:schemeClr val="tx1"/>
-          </a:fontRef>
-        </p:style>
-      </p:cxnSp>
-      <p:grpSp>
-        <p:nvGrpSpPr>
-          <p:cNvPr id="163" name="Group 162"/>
-          <p:cNvGrpSpPr/>
-          <p:nvPr/>
-        </p:nvGrpSpPr>
-        <p:grpSpPr>
-          <a:xfrm>
-            <a:off x="12133302" y="1693369"/>
-            <a:ext cx="507476" cy="5689160"/>
+            <a:off x="12133302" y="1693368"/>
+            <a:ext cx="507476" cy="6875959"/>
             <a:chOff x="4944353" y="2024407"/>
             <a:chExt cx="507477" cy="1545997"/>
           </a:xfrm>
@@ -8639,7 +7798,7 @@
           </p:nvSpPr>
           <p:spPr>
             <a:xfrm>
-              <a:off x="5082278" y="3534070"/>
+              <a:off x="5104050" y="3534070"/>
               <a:ext cx="185057" cy="36334"/>
             </a:xfrm>
             <a:prstGeom prst="triangle">
@@ -8683,44 +7842,6 @@
           </p:txBody>
         </p:sp>
       </p:grpSp>
-      <p:cxnSp>
-        <p:nvCxnSpPr>
-          <p:cNvPr id="167" name="Straight Arrow Connector 166"/>
-          <p:cNvCxnSpPr>
-            <a:stCxn id="105" idx="0"/>
-          </p:cNvCxnSpPr>
-          <p:nvPr/>
-        </p:nvCxnSpPr>
-        <p:spPr>
-          <a:xfrm flipV="1">
-            <a:off x="11836121" y="4246771"/>
-            <a:ext cx="297187" cy="1"/>
-          </a:xfrm>
-          <a:prstGeom prst="straightConnector1">
-            <a:avLst/>
-          </a:prstGeom>
-          <a:ln w="12700">
-            <a:solidFill>
-              <a:schemeClr val="tx1"/>
-            </a:solidFill>
-            <a:tailEnd type="triangle"/>
-          </a:ln>
-        </p:spPr>
-        <p:style>
-          <a:lnRef idx="1">
-            <a:schemeClr val="accent1"/>
-          </a:lnRef>
-          <a:fillRef idx="0">
-            <a:schemeClr val="accent1"/>
-          </a:fillRef>
-          <a:effectRef idx="0">
-            <a:schemeClr val="accent1"/>
-          </a:effectRef>
-          <a:fontRef idx="minor">
-            <a:schemeClr val="tx1"/>
-          </a:fontRef>
-        </p:style>
-      </p:cxnSp>
       <p:grpSp>
         <p:nvGrpSpPr>
           <p:cNvPr id="213" name="Group 212"/>
@@ -9029,7 +8150,7 @@
         </p:nvSpPr>
         <p:spPr>
           <a:xfrm>
-            <a:off x="1322471" y="7486365"/>
+            <a:off x="1322471" y="7497251"/>
             <a:ext cx="189076" cy="147684"/>
           </a:xfrm>
           <a:prstGeom prst="triangle">
@@ -9748,12 +8869,12 @@
         </p:nvCxnSpPr>
         <p:spPr>
           <a:xfrm rot="10800000" flipH="1" flipV="1">
-            <a:off x="1339511" y="769558"/>
-            <a:ext cx="252349" cy="2726262"/>
+            <a:off x="1338815" y="703968"/>
+            <a:ext cx="253046" cy="2791852"/>
           </a:xfrm>
           <a:prstGeom prst="bentConnector3">
             <a:avLst>
-              <a:gd name="adj1" fmla="val -90589"/>
+              <a:gd name="adj1" fmla="val -90339"/>
             </a:avLst>
           </a:prstGeom>
           <a:ln w="12700">
@@ -9955,7 +9076,7 @@
         </p:nvSpPr>
         <p:spPr>
           <a:xfrm>
-            <a:off x="1339512" y="463188"/>
+            <a:off x="1338815" y="397598"/>
             <a:ext cx="14367726" cy="612740"/>
           </a:xfrm>
           <a:prstGeom prst="roundRect">
@@ -10194,7 +9315,7 @@
         </p:nvSpPr>
         <p:spPr>
           <a:xfrm>
-            <a:off x="7305064" y="2281139"/>
+            <a:off x="7266964" y="2268439"/>
             <a:ext cx="1079847" cy="338554"/>
           </a:xfrm>
           <a:prstGeom prst="rect">
@@ -11568,6 +10689,120 @@
           </a:p>
         </p:txBody>
       </p:sp>
+      <p:cxnSp>
+        <p:nvCxnSpPr>
+          <p:cNvPr id="287" name="Elbow Connector 286"/>
+          <p:cNvCxnSpPr/>
+          <p:nvPr/>
+        </p:nvCxnSpPr>
+        <p:spPr>
+          <a:xfrm flipV="1">
+            <a:off x="5410413" y="2125980"/>
+            <a:ext cx="2906917" cy="1079546"/>
+          </a:xfrm>
+          <a:prstGeom prst="bentConnector3">
+            <a:avLst>
+              <a:gd name="adj1" fmla="val 194"/>
+            </a:avLst>
+          </a:prstGeom>
+          <a:ln w="12700">
+            <a:solidFill>
+              <a:schemeClr val="tx1"/>
+            </a:solidFill>
+            <a:tailEnd type="triangle"/>
+          </a:ln>
+        </p:spPr>
+        <p:style>
+          <a:lnRef idx="1">
+            <a:schemeClr val="accent1"/>
+          </a:lnRef>
+          <a:fillRef idx="0">
+            <a:schemeClr val="accent1"/>
+          </a:fillRef>
+          <a:effectRef idx="0">
+            <a:schemeClr val="accent1"/>
+          </a:effectRef>
+          <a:fontRef idx="minor">
+            <a:schemeClr val="tx1"/>
+          </a:fontRef>
+        </p:style>
+      </p:cxnSp>
+      <p:cxnSp>
+        <p:nvCxnSpPr>
+          <p:cNvPr id="292" name="Elbow Connector 291"/>
+          <p:cNvCxnSpPr/>
+          <p:nvPr/>
+        </p:nvCxnSpPr>
+        <p:spPr>
+          <a:xfrm flipV="1">
+            <a:off x="5097524" y="1981200"/>
+            <a:ext cx="3226665" cy="1249034"/>
+          </a:xfrm>
+          <a:prstGeom prst="bentConnector3">
+            <a:avLst>
+              <a:gd name="adj1" fmla="val 171"/>
+            </a:avLst>
+          </a:prstGeom>
+          <a:ln w="12700">
+            <a:solidFill>
+              <a:schemeClr val="tx1"/>
+            </a:solidFill>
+            <a:tailEnd type="triangle"/>
+          </a:ln>
+        </p:spPr>
+        <p:style>
+          <a:lnRef idx="1">
+            <a:schemeClr val="accent1"/>
+          </a:lnRef>
+          <a:fillRef idx="0">
+            <a:schemeClr val="accent1"/>
+          </a:fillRef>
+          <a:effectRef idx="0">
+            <a:schemeClr val="accent1"/>
+          </a:effectRef>
+          <a:fontRef idx="minor">
+            <a:schemeClr val="tx1"/>
+          </a:fontRef>
+        </p:style>
+      </p:cxnSp>
+      <p:cxnSp>
+        <p:nvCxnSpPr>
+          <p:cNvPr id="299" name="Elbow Connector 298"/>
+          <p:cNvCxnSpPr/>
+          <p:nvPr/>
+        </p:nvCxnSpPr>
+        <p:spPr>
+          <a:xfrm flipV="1">
+            <a:off x="4805550" y="1844040"/>
+            <a:ext cx="3518639" cy="1386194"/>
+          </a:xfrm>
+          <a:prstGeom prst="bentConnector3">
+            <a:avLst>
+              <a:gd name="adj1" fmla="val 408"/>
+            </a:avLst>
+          </a:prstGeom>
+          <a:ln w="12700">
+            <a:solidFill>
+              <a:schemeClr val="tx1"/>
+            </a:solidFill>
+            <a:tailEnd type="triangle"/>
+          </a:ln>
+        </p:spPr>
+        <p:style>
+          <a:lnRef idx="1">
+            <a:schemeClr val="accent1"/>
+          </a:lnRef>
+          <a:fillRef idx="0">
+            <a:schemeClr val="accent1"/>
+          </a:fillRef>
+          <a:effectRef idx="0">
+            <a:schemeClr val="accent1"/>
+          </a:effectRef>
+          <a:fontRef idx="minor">
+            <a:schemeClr val="tx1"/>
+          </a:fontRef>
+        </p:style>
+      </p:cxnSp>
       <p:sp>
         <p:nvSpPr>
           <p:cNvPr id="18" name="Rounded Rectangle 17"/>
@@ -11627,6 +10862,1741 @@
               </a:rPr>
               <a:t>Instruction Decoder</a:t>
             </a:r>
+          </a:p>
+        </p:txBody>
+      </p:sp>
+      <p:sp>
+        <p:nvSpPr>
+          <p:cNvPr id="309" name="TextBox 308"/>
+          <p:cNvSpPr txBox="1"/>
+          <p:nvPr/>
+        </p:nvSpPr>
+        <p:spPr>
+          <a:xfrm rot="16200000">
+            <a:off x="4339215" y="2070199"/>
+            <a:ext cx="726609" cy="307777"/>
+          </a:xfrm>
+          <a:prstGeom prst="rect">
+            <a:avLst/>
+          </a:prstGeom>
+          <a:noFill/>
+        </p:spPr>
+        <p:txBody>
+          <a:bodyPr wrap="none" rtlCol="0">
+            <a:spAutoFit/>
+          </a:bodyPr>
+          <a:lstStyle/>
+          <a:p>
+            <a:r>
+              <a:rPr lang="en-US" sz="1400" dirty="0" smtClean="0"/>
+              <a:t>opcode</a:t>
+            </a:r>
+            <a:endParaRPr lang="en-US" sz="1400" dirty="0"/>
+          </a:p>
+        </p:txBody>
+      </p:sp>
+      <p:sp>
+        <p:nvSpPr>
+          <p:cNvPr id="310" name="TextBox 309"/>
+          <p:cNvSpPr txBox="1"/>
+          <p:nvPr/>
+        </p:nvSpPr>
+        <p:spPr>
+          <a:xfrm rot="16200000">
+            <a:off x="4624753" y="2100461"/>
+            <a:ext cx="655949" cy="307777"/>
+          </a:xfrm>
+          <a:prstGeom prst="rect">
+            <a:avLst/>
+          </a:prstGeom>
+          <a:noFill/>
+        </p:spPr>
+        <p:txBody>
+          <a:bodyPr wrap="none" rtlCol="0">
+            <a:spAutoFit/>
+          </a:bodyPr>
+          <a:lstStyle/>
+          <a:p>
+            <a:r>
+              <a:rPr lang="en-US" sz="1400" dirty="0" smtClean="0"/>
+              <a:t>funct7</a:t>
+            </a:r>
+            <a:endParaRPr lang="en-US" sz="1400" dirty="0"/>
+          </a:p>
+        </p:txBody>
+      </p:sp>
+      <p:sp>
+        <p:nvSpPr>
+          <p:cNvPr id="311" name="TextBox 310"/>
+          <p:cNvSpPr txBox="1"/>
+          <p:nvPr/>
+        </p:nvSpPr>
+        <p:spPr>
+          <a:xfrm rot="16200000">
+            <a:off x="4923438" y="2117111"/>
+            <a:ext cx="655949" cy="307777"/>
+          </a:xfrm>
+          <a:prstGeom prst="rect">
+            <a:avLst/>
+          </a:prstGeom>
+          <a:noFill/>
+        </p:spPr>
+        <p:txBody>
+          <a:bodyPr wrap="none" rtlCol="0">
+            <a:spAutoFit/>
+          </a:bodyPr>
+          <a:lstStyle/>
+          <a:p>
+            <a:r>
+              <a:rPr lang="en-US" sz="1400" dirty="0" smtClean="0"/>
+              <a:t>funct3</a:t>
+            </a:r>
+            <a:endParaRPr lang="en-US" sz="1400" dirty="0"/>
+          </a:p>
+        </p:txBody>
+      </p:sp>
+      <p:sp>
+        <p:nvSpPr>
+          <p:cNvPr id="313" name="Rounded Rectangle 312"/>
+          <p:cNvSpPr/>
+          <p:nvPr/>
+        </p:nvSpPr>
+        <p:spPr>
+          <a:xfrm>
+            <a:off x="9111042" y="2498625"/>
+            <a:ext cx="1681976" cy="1091808"/>
+          </a:xfrm>
+          <a:prstGeom prst="roundRect">
+            <a:avLst>
+              <a:gd name="adj" fmla="val 5363"/>
+            </a:avLst>
+          </a:prstGeom>
+          <a:solidFill>
+            <a:schemeClr val="bg1"/>
+          </a:solidFill>
+          <a:ln>
+            <a:solidFill>
+              <a:schemeClr val="tx1"/>
+            </a:solidFill>
+            <a:prstDash val="dash"/>
+          </a:ln>
+        </p:spPr>
+        <p:style>
+          <a:lnRef idx="2">
+            <a:schemeClr val="accent1">
+              <a:shade val="50000"/>
+            </a:schemeClr>
+          </a:lnRef>
+          <a:fillRef idx="1">
+            <a:schemeClr val="accent1"/>
+          </a:fillRef>
+          <a:effectRef idx="0">
+            <a:schemeClr val="accent1"/>
+          </a:effectRef>
+          <a:fontRef idx="minor">
+            <a:schemeClr val="lt1"/>
+          </a:fontRef>
+        </p:style>
+        <p:txBody>
+          <a:bodyPr rot="0" spcFirstLastPara="0" vertOverflow="overflow" horzOverflow="overflow" vert="horz" wrap="square" lIns="91440" tIns="45721" rIns="91440" bIns="45721" numCol="1" spcCol="0" rtlCol="0" fromWordArt="0" anchor="ctr" anchorCtr="0" forceAA="0" compatLnSpc="1">
+            <a:prstTxWarp prst="textNoShape">
+              <a:avLst/>
+            </a:prstTxWarp>
+            <a:noAutofit/>
+          </a:bodyPr>
+          <a:lstStyle/>
+          <a:p>
+            <a:pPr algn="ctr"/>
+            <a:endParaRPr lang="en-US" sz="1798" dirty="0">
+              <a:solidFill>
+                <a:schemeClr val="tx1"/>
+              </a:solidFill>
+            </a:endParaRPr>
+          </a:p>
+        </p:txBody>
+      </p:sp>
+      <p:sp>
+        <p:nvSpPr>
+          <p:cNvPr id="314" name="Trapezoid 313"/>
+          <p:cNvSpPr/>
+          <p:nvPr/>
+        </p:nvSpPr>
+        <p:spPr>
+          <a:xfrm rot="5400000">
+            <a:off x="9461498" y="3215407"/>
+            <a:ext cx="418017" cy="195737"/>
+          </a:xfrm>
+          <a:prstGeom prst="trapezoid">
+            <a:avLst>
+              <a:gd name="adj" fmla="val 50716"/>
+            </a:avLst>
+          </a:prstGeom>
+          <a:solidFill>
+            <a:schemeClr val="bg1"/>
+          </a:solidFill>
+          <a:ln>
+            <a:solidFill>
+              <a:schemeClr val="tx1"/>
+            </a:solidFill>
+          </a:ln>
+        </p:spPr>
+        <p:style>
+          <a:lnRef idx="2">
+            <a:schemeClr val="accent1">
+              <a:shade val="50000"/>
+            </a:schemeClr>
+          </a:lnRef>
+          <a:fillRef idx="1">
+            <a:schemeClr val="accent1"/>
+          </a:fillRef>
+          <a:effectRef idx="0">
+            <a:schemeClr val="accent1"/>
+          </a:effectRef>
+          <a:fontRef idx="minor">
+            <a:schemeClr val="lt1"/>
+          </a:fontRef>
+        </p:style>
+        <p:txBody>
+          <a:bodyPr rot="0" spcFirstLastPara="0" vertOverflow="overflow" horzOverflow="overflow" vert="horz" wrap="square" lIns="91440" tIns="45721" rIns="91440" bIns="45721" numCol="1" spcCol="0" rtlCol="0" fromWordArt="0" anchor="ctr" anchorCtr="0" forceAA="0" compatLnSpc="1">
+            <a:prstTxWarp prst="textNoShape">
+              <a:avLst/>
+            </a:prstTxWarp>
+            <a:noAutofit/>
+          </a:bodyPr>
+          <a:lstStyle/>
+          <a:p>
+            <a:pPr algn="ctr"/>
+            <a:endParaRPr lang="en-US" sz="1798" dirty="0">
+              <a:solidFill>
+                <a:sysClr val="windowText" lastClr="000000"/>
+              </a:solidFill>
+            </a:endParaRPr>
+          </a:p>
+        </p:txBody>
+      </p:sp>
+      <p:sp>
+        <p:nvSpPr>
+          <p:cNvPr id="315" name="Oval 314"/>
+          <p:cNvSpPr/>
+          <p:nvPr/>
+        </p:nvSpPr>
+        <p:spPr>
+          <a:xfrm>
+            <a:off x="10223786" y="2793477"/>
+            <a:ext cx="354648" cy="351729"/>
+          </a:xfrm>
+          <a:prstGeom prst="ellipse">
+            <a:avLst/>
+          </a:prstGeom>
+          <a:solidFill>
+            <a:schemeClr val="bg1"/>
+          </a:solidFill>
+          <a:ln>
+            <a:solidFill>
+              <a:schemeClr val="tx1"/>
+            </a:solidFill>
+          </a:ln>
+        </p:spPr>
+        <p:style>
+          <a:lnRef idx="2">
+            <a:schemeClr val="accent1">
+              <a:shade val="50000"/>
+            </a:schemeClr>
+          </a:lnRef>
+          <a:fillRef idx="1">
+            <a:schemeClr val="accent1"/>
+          </a:fillRef>
+          <a:effectRef idx="0">
+            <a:schemeClr val="accent1"/>
+          </a:effectRef>
+          <a:fontRef idx="minor">
+            <a:schemeClr val="lt1"/>
+          </a:fontRef>
+        </p:style>
+        <p:txBody>
+          <a:bodyPr rtlCol="0" anchor="ctr"/>
+          <a:lstStyle/>
+          <a:p>
+            <a:pPr algn="ctr"/>
+            <a:r>
+              <a:rPr lang="en-US" dirty="0" smtClean="0">
+                <a:solidFill>
+                  <a:schemeClr val="tx1"/>
+                </a:solidFill>
+              </a:rPr>
+              <a:t>+</a:t>
+            </a:r>
+            <a:endParaRPr lang="en-US" dirty="0">
+              <a:solidFill>
+                <a:schemeClr val="tx1"/>
+              </a:solidFill>
+            </a:endParaRPr>
+          </a:p>
+        </p:txBody>
+      </p:sp>
+      <p:cxnSp>
+        <p:nvCxnSpPr>
+          <p:cNvPr id="317" name="Elbow Connector 316"/>
+          <p:cNvCxnSpPr>
+            <a:endCxn id="315" idx="0"/>
+          </p:cNvCxnSpPr>
+          <p:nvPr/>
+        </p:nvCxnSpPr>
+        <p:spPr>
+          <a:xfrm>
+            <a:off x="8744170" y="2616791"/>
+            <a:ext cx="1656940" cy="176686"/>
+          </a:xfrm>
+          <a:prstGeom prst="bentConnector2">
+            <a:avLst/>
+          </a:prstGeom>
+          <a:ln w="12700">
+            <a:solidFill>
+              <a:schemeClr val="tx1"/>
+            </a:solidFill>
+            <a:tailEnd type="triangle"/>
+          </a:ln>
+        </p:spPr>
+        <p:style>
+          <a:lnRef idx="1">
+            <a:schemeClr val="accent1"/>
+          </a:lnRef>
+          <a:fillRef idx="0">
+            <a:schemeClr val="accent1"/>
+          </a:fillRef>
+          <a:effectRef idx="0">
+            <a:schemeClr val="accent1"/>
+          </a:effectRef>
+          <a:fontRef idx="minor">
+            <a:schemeClr val="tx1"/>
+          </a:fontRef>
+        </p:style>
+      </p:cxnSp>
+      <p:cxnSp>
+        <p:nvCxnSpPr>
+          <p:cNvPr id="321" name="Elbow Connector 320"/>
+          <p:cNvCxnSpPr>
+            <a:stCxn id="314" idx="0"/>
+            <a:endCxn id="315" idx="4"/>
+          </p:cNvCxnSpPr>
+          <p:nvPr/>
+        </p:nvCxnSpPr>
+        <p:spPr>
+          <a:xfrm flipV="1">
+            <a:off x="9768375" y="3145206"/>
+            <a:ext cx="632735" cy="168070"/>
+          </a:xfrm>
+          <a:prstGeom prst="bentConnector2">
+            <a:avLst/>
+          </a:prstGeom>
+          <a:ln w="12700">
+            <a:solidFill>
+              <a:schemeClr val="tx1"/>
+            </a:solidFill>
+            <a:tailEnd type="triangle"/>
+          </a:ln>
+        </p:spPr>
+        <p:style>
+          <a:lnRef idx="1">
+            <a:schemeClr val="accent1"/>
+          </a:lnRef>
+          <a:fillRef idx="0">
+            <a:schemeClr val="accent1"/>
+          </a:fillRef>
+          <a:effectRef idx="0">
+            <a:schemeClr val="accent1"/>
+          </a:effectRef>
+          <a:fontRef idx="minor">
+            <a:schemeClr val="tx1"/>
+          </a:fontRef>
+        </p:style>
+      </p:cxnSp>
+      <p:grpSp>
+        <p:nvGrpSpPr>
+          <p:cNvPr id="95" name="Group 94"/>
+          <p:cNvGrpSpPr/>
+          <p:nvPr/>
+        </p:nvGrpSpPr>
+        <p:grpSpPr>
+          <a:xfrm>
+            <a:off x="8324953" y="1696802"/>
+            <a:ext cx="507476" cy="6872530"/>
+            <a:chOff x="4944353" y="2024407"/>
+            <a:chExt cx="507477" cy="1545997"/>
+          </a:xfrm>
+          <a:solidFill>
+            <a:schemeClr val="bg2"/>
+          </a:solidFill>
+        </p:grpSpPr>
+        <p:sp>
+          <p:nvSpPr>
+            <p:cNvPr id="96" name="Rounded Rectangle 95"/>
+            <p:cNvSpPr/>
+            <p:nvPr/>
+          </p:nvSpPr>
+          <p:spPr>
+            <a:xfrm>
+              <a:off x="4944353" y="2024407"/>
+              <a:ext cx="507477" cy="1545996"/>
+            </a:xfrm>
+            <a:prstGeom prst="roundRect">
+              <a:avLst>
+                <a:gd name="adj" fmla="val 5363"/>
+              </a:avLst>
+            </a:prstGeom>
+            <a:grpFill/>
+            <a:ln>
+              <a:solidFill>
+                <a:schemeClr val="tx1"/>
+              </a:solidFill>
+            </a:ln>
+          </p:spPr>
+          <p:style>
+            <a:lnRef idx="2">
+              <a:schemeClr val="accent1">
+                <a:shade val="50000"/>
+              </a:schemeClr>
+            </a:lnRef>
+            <a:fillRef idx="1">
+              <a:schemeClr val="accent1"/>
+            </a:fillRef>
+            <a:effectRef idx="0">
+              <a:schemeClr val="accent1"/>
+            </a:effectRef>
+            <a:fontRef idx="minor">
+              <a:schemeClr val="lt1"/>
+            </a:fontRef>
+          </p:style>
+          <p:txBody>
+            <a:bodyPr rot="0" spcFirstLastPara="0" vertOverflow="overflow" horzOverflow="overflow" vert="horz" wrap="square" lIns="91440" tIns="45721" rIns="91440" bIns="45721" numCol="1" spcCol="0" rtlCol="0" fromWordArt="0" anchor="ctr" anchorCtr="0" forceAA="0" compatLnSpc="1">
+              <a:prstTxWarp prst="textNoShape">
+                <a:avLst/>
+              </a:prstTxWarp>
+              <a:noAutofit/>
+            </a:bodyPr>
+            <a:lstStyle/>
+            <a:p>
+              <a:pPr algn="ctr"/>
+              <a:r>
+                <a:rPr lang="en-US" sz="1798" dirty="0">
+                  <a:solidFill>
+                    <a:schemeClr val="tx1"/>
+                  </a:solidFill>
+                </a:rPr>
+                <a:t>ID</a:t>
+              </a:r>
+            </a:p>
+          </p:txBody>
+        </p:sp>
+        <p:sp>
+          <p:nvSpPr>
+            <p:cNvPr id="97" name="Isosceles Triangle 96"/>
+            <p:cNvSpPr/>
+            <p:nvPr/>
+          </p:nvSpPr>
+          <p:spPr>
+            <a:xfrm>
+              <a:off x="5094978" y="3534070"/>
+              <a:ext cx="185057" cy="36334"/>
+            </a:xfrm>
+            <a:prstGeom prst="triangle">
+              <a:avLst/>
+            </a:prstGeom>
+            <a:grpFill/>
+            <a:ln>
+              <a:solidFill>
+                <a:schemeClr val="tx1"/>
+              </a:solidFill>
+            </a:ln>
+          </p:spPr>
+          <p:style>
+            <a:lnRef idx="2">
+              <a:schemeClr val="accent1">
+                <a:shade val="50000"/>
+              </a:schemeClr>
+            </a:lnRef>
+            <a:fillRef idx="1">
+              <a:schemeClr val="accent1"/>
+            </a:fillRef>
+            <a:effectRef idx="0">
+              <a:schemeClr val="accent1"/>
+            </a:effectRef>
+            <a:fontRef idx="minor">
+              <a:schemeClr val="lt1"/>
+            </a:fontRef>
+          </p:style>
+          <p:txBody>
+            <a:bodyPr rot="0" spcFirstLastPara="0" vertOverflow="overflow" horzOverflow="overflow" vert="horz" wrap="square" lIns="91440" tIns="45721" rIns="91440" bIns="45721" numCol="1" spcCol="0" rtlCol="0" fromWordArt="0" anchor="ctr" anchorCtr="0" forceAA="0" compatLnSpc="1">
+              <a:prstTxWarp prst="textNoShape">
+                <a:avLst/>
+              </a:prstTxWarp>
+              <a:noAutofit/>
+            </a:bodyPr>
+            <a:lstStyle/>
+            <a:p>
+              <a:pPr algn="ctr"/>
+              <a:endParaRPr lang="en-US" sz="1798"/>
+            </a:p>
+          </p:txBody>
+        </p:sp>
+      </p:grpSp>
+      <p:cxnSp>
+        <p:nvCxnSpPr>
+          <p:cNvPr id="328" name="Straight Arrow Connector 327"/>
+          <p:cNvCxnSpPr>
+            <a:stCxn id="315" idx="6"/>
+          </p:cNvCxnSpPr>
+          <p:nvPr/>
+        </p:nvCxnSpPr>
+        <p:spPr>
+          <a:xfrm flipV="1">
+            <a:off x="10578434" y="2969341"/>
+            <a:ext cx="1541235" cy="1"/>
+          </a:xfrm>
+          <a:prstGeom prst="straightConnector1">
+            <a:avLst/>
+          </a:prstGeom>
+          <a:ln w="12700">
+            <a:solidFill>
+              <a:schemeClr val="tx1"/>
+            </a:solidFill>
+            <a:tailEnd type="triangle"/>
+          </a:ln>
+        </p:spPr>
+        <p:style>
+          <a:lnRef idx="1">
+            <a:schemeClr val="accent1"/>
+          </a:lnRef>
+          <a:fillRef idx="0">
+            <a:schemeClr val="accent1"/>
+          </a:fillRef>
+          <a:effectRef idx="0">
+            <a:schemeClr val="accent1"/>
+          </a:effectRef>
+          <a:fontRef idx="minor">
+            <a:schemeClr val="tx1"/>
+          </a:fontRef>
+        </p:style>
+      </p:cxnSp>
+      <p:sp>
+        <p:nvSpPr>
+          <p:cNvPr id="329" name="TextBox 328"/>
+          <p:cNvSpPr txBox="1"/>
+          <p:nvPr/>
+        </p:nvSpPr>
+        <p:spPr>
+          <a:xfrm>
+            <a:off x="10873657" y="2642269"/>
+            <a:ext cx="829586" cy="338554"/>
+          </a:xfrm>
+          <a:prstGeom prst="rect">
+            <a:avLst/>
+          </a:prstGeom>
+          <a:noFill/>
+        </p:spPr>
+        <p:txBody>
+          <a:bodyPr wrap="none" rtlCol="0">
+            <a:spAutoFit/>
+          </a:bodyPr>
+          <a:lstStyle/>
+          <a:p>
+            <a:r>
+              <a:rPr lang="en-US" sz="1600" dirty="0" smtClean="0"/>
+              <a:t>address</a:t>
+            </a:r>
+            <a:endParaRPr lang="en-US" sz="1600" dirty="0"/>
+          </a:p>
+        </p:txBody>
+      </p:sp>
+      <p:sp>
+        <p:nvSpPr>
+          <p:cNvPr id="330" name="TextBox 329"/>
+          <p:cNvSpPr txBox="1"/>
+          <p:nvPr/>
+        </p:nvSpPr>
+        <p:spPr>
+          <a:xfrm>
+            <a:off x="9247070" y="2580401"/>
+            <a:ext cx="1079847" cy="338554"/>
+          </a:xfrm>
+          <a:prstGeom prst="rect">
+            <a:avLst/>
+          </a:prstGeom>
+          <a:noFill/>
+        </p:spPr>
+        <p:txBody>
+          <a:bodyPr wrap="none" rtlCol="0">
+            <a:spAutoFit/>
+          </a:bodyPr>
+          <a:lstStyle/>
+          <a:p>
+            <a:r>
+              <a:rPr lang="en-US" sz="1600" dirty="0" smtClean="0"/>
+              <a:t>immediate</a:t>
+            </a:r>
+            <a:endParaRPr lang="en-US" sz="1600" dirty="0"/>
+          </a:p>
+        </p:txBody>
+      </p:sp>
+      <p:cxnSp>
+        <p:nvCxnSpPr>
+          <p:cNvPr id="332" name="Straight Arrow Connector 331"/>
+          <p:cNvCxnSpPr/>
+          <p:nvPr/>
+        </p:nvCxnSpPr>
+        <p:spPr>
+          <a:xfrm>
+            <a:off x="9238645" y="3423625"/>
+            <a:ext cx="333994" cy="0"/>
+          </a:xfrm>
+          <a:prstGeom prst="straightConnector1">
+            <a:avLst/>
+          </a:prstGeom>
+          <a:ln w="12700">
+            <a:solidFill>
+              <a:schemeClr val="tx1"/>
+            </a:solidFill>
+            <a:tailEnd type="triangle"/>
+          </a:ln>
+        </p:spPr>
+        <p:style>
+          <a:lnRef idx="1">
+            <a:schemeClr val="accent1"/>
+          </a:lnRef>
+          <a:fillRef idx="0">
+            <a:schemeClr val="accent1"/>
+          </a:fillRef>
+          <a:effectRef idx="0">
+            <a:schemeClr val="accent1"/>
+          </a:effectRef>
+          <a:fontRef idx="minor">
+            <a:schemeClr val="tx1"/>
+          </a:fontRef>
+        </p:style>
+      </p:cxnSp>
+      <p:sp>
+        <p:nvSpPr>
+          <p:cNvPr id="333" name="TextBox 332"/>
+          <p:cNvSpPr txBox="1"/>
+          <p:nvPr/>
+        </p:nvSpPr>
+        <p:spPr>
+          <a:xfrm>
+            <a:off x="9181324" y="3182197"/>
+            <a:ext cx="373820" cy="307777"/>
+          </a:xfrm>
+          <a:prstGeom prst="rect">
+            <a:avLst/>
+          </a:prstGeom>
+          <a:noFill/>
+        </p:spPr>
+        <p:txBody>
+          <a:bodyPr wrap="none" rtlCol="0">
+            <a:spAutoFit/>
+          </a:bodyPr>
+          <a:lstStyle/>
+          <a:p>
+            <a:r>
+              <a:rPr lang="en-US" sz="1400" dirty="0" smtClean="0"/>
+              <a:t>PC</a:t>
+            </a:r>
+            <a:endParaRPr lang="en-US" sz="1400" dirty="0"/>
+          </a:p>
+        </p:txBody>
+      </p:sp>
+      <p:cxnSp>
+        <p:nvCxnSpPr>
+          <p:cNvPr id="363" name="Straight Arrow Connector 362"/>
+          <p:cNvCxnSpPr/>
+          <p:nvPr/>
+        </p:nvCxnSpPr>
+        <p:spPr>
+          <a:xfrm>
+            <a:off x="8970020" y="3182197"/>
+            <a:ext cx="599043" cy="0"/>
+          </a:xfrm>
+          <a:prstGeom prst="straightConnector1">
+            <a:avLst/>
+          </a:prstGeom>
+          <a:ln w="12700">
+            <a:solidFill>
+              <a:schemeClr val="tx1"/>
+            </a:solidFill>
+            <a:tailEnd type="triangle"/>
+          </a:ln>
+        </p:spPr>
+        <p:style>
+          <a:lnRef idx="1">
+            <a:schemeClr val="accent1"/>
+          </a:lnRef>
+          <a:fillRef idx="0">
+            <a:schemeClr val="accent1"/>
+          </a:fillRef>
+          <a:effectRef idx="0">
+            <a:schemeClr val="accent1"/>
+          </a:effectRef>
+          <a:fontRef idx="minor">
+            <a:schemeClr val="tx1"/>
+          </a:fontRef>
+        </p:style>
+      </p:cxnSp>
+      <p:sp>
+        <p:nvSpPr>
+          <p:cNvPr id="364" name="TextBox 363"/>
+          <p:cNvSpPr txBox="1"/>
+          <p:nvPr/>
+        </p:nvSpPr>
+        <p:spPr>
+          <a:xfrm>
+            <a:off x="9098360" y="2896688"/>
+            <a:ext cx="495777" cy="307777"/>
+          </a:xfrm>
+          <a:prstGeom prst="rect">
+            <a:avLst/>
+          </a:prstGeom>
+          <a:noFill/>
+        </p:spPr>
+        <p:txBody>
+          <a:bodyPr wrap="none" rtlCol="0">
+            <a:spAutoFit/>
+          </a:bodyPr>
+          <a:lstStyle/>
+          <a:p>
+            <a:r>
+              <a:rPr lang="en-US" sz="1400" dirty="0" smtClean="0"/>
+              <a:t>rs_1</a:t>
+            </a:r>
+            <a:endParaRPr lang="en-US" sz="1400" dirty="0"/>
+          </a:p>
+        </p:txBody>
+      </p:sp>
+      <p:cxnSp>
+        <p:nvCxnSpPr>
+          <p:cNvPr id="370" name="Straight Arrow Connector 369"/>
+          <p:cNvCxnSpPr/>
+          <p:nvPr/>
+        </p:nvCxnSpPr>
+        <p:spPr>
+          <a:xfrm>
+            <a:off x="8843315" y="1844040"/>
+            <a:ext cx="3287240" cy="0"/>
+          </a:xfrm>
+          <a:prstGeom prst="straightConnector1">
+            <a:avLst/>
+          </a:prstGeom>
+          <a:ln w="12700">
+            <a:solidFill>
+              <a:schemeClr val="tx1"/>
+            </a:solidFill>
+            <a:tailEnd type="triangle"/>
+          </a:ln>
+        </p:spPr>
+        <p:style>
+          <a:lnRef idx="1">
+            <a:schemeClr val="accent1"/>
+          </a:lnRef>
+          <a:fillRef idx="0">
+            <a:schemeClr val="accent1"/>
+          </a:fillRef>
+          <a:effectRef idx="0">
+            <a:schemeClr val="accent1"/>
+          </a:effectRef>
+          <a:fontRef idx="minor">
+            <a:schemeClr val="tx1"/>
+          </a:fontRef>
+        </p:style>
+      </p:cxnSp>
+      <p:cxnSp>
+        <p:nvCxnSpPr>
+          <p:cNvPr id="371" name="Straight Arrow Connector 370"/>
+          <p:cNvCxnSpPr/>
+          <p:nvPr/>
+        </p:nvCxnSpPr>
+        <p:spPr>
+          <a:xfrm>
+            <a:off x="8835176" y="1981200"/>
+            <a:ext cx="3287240" cy="0"/>
+          </a:xfrm>
+          <a:prstGeom prst="straightConnector1">
+            <a:avLst/>
+          </a:prstGeom>
+          <a:ln w="12700">
+            <a:solidFill>
+              <a:schemeClr val="tx1"/>
+            </a:solidFill>
+            <a:tailEnd type="triangle"/>
+          </a:ln>
+        </p:spPr>
+        <p:style>
+          <a:lnRef idx="1">
+            <a:schemeClr val="accent1"/>
+          </a:lnRef>
+          <a:fillRef idx="0">
+            <a:schemeClr val="accent1"/>
+          </a:fillRef>
+          <a:effectRef idx="0">
+            <a:schemeClr val="accent1"/>
+          </a:effectRef>
+          <a:fontRef idx="minor">
+            <a:schemeClr val="tx1"/>
+          </a:fontRef>
+        </p:style>
+      </p:cxnSp>
+      <p:cxnSp>
+        <p:nvCxnSpPr>
+          <p:cNvPr id="372" name="Straight Arrow Connector 371"/>
+          <p:cNvCxnSpPr/>
+          <p:nvPr/>
+        </p:nvCxnSpPr>
+        <p:spPr>
+          <a:xfrm>
+            <a:off x="8832429" y="2125980"/>
+            <a:ext cx="3287240" cy="0"/>
+          </a:xfrm>
+          <a:prstGeom prst="straightConnector1">
+            <a:avLst/>
+          </a:prstGeom>
+          <a:ln w="12700">
+            <a:solidFill>
+              <a:schemeClr val="tx1"/>
+            </a:solidFill>
+            <a:tailEnd type="triangle"/>
+          </a:ln>
+        </p:spPr>
+        <p:style>
+          <a:lnRef idx="1">
+            <a:schemeClr val="accent1"/>
+          </a:lnRef>
+          <a:fillRef idx="0">
+            <a:schemeClr val="accent1"/>
+          </a:fillRef>
+          <a:effectRef idx="0">
+            <a:schemeClr val="accent1"/>
+          </a:effectRef>
+          <a:fontRef idx="minor">
+            <a:schemeClr val="tx1"/>
+          </a:fontRef>
+        </p:style>
+      </p:cxnSp>
+      <p:cxnSp>
+        <p:nvCxnSpPr>
+          <p:cNvPr id="378" name="Straight Arrow Connector 377"/>
+          <p:cNvCxnSpPr/>
+          <p:nvPr/>
+        </p:nvCxnSpPr>
+        <p:spPr>
+          <a:xfrm>
+            <a:off x="10171796" y="1832369"/>
+            <a:ext cx="0" cy="653393"/>
+          </a:xfrm>
+          <a:prstGeom prst="straightConnector1">
+            <a:avLst/>
+          </a:prstGeom>
+          <a:ln w="12700">
+            <a:solidFill>
+              <a:schemeClr val="tx1"/>
+            </a:solidFill>
+            <a:tailEnd type="triangle"/>
+          </a:ln>
+        </p:spPr>
+        <p:style>
+          <a:lnRef idx="1">
+            <a:schemeClr val="accent1"/>
+          </a:lnRef>
+          <a:fillRef idx="0">
+            <a:schemeClr val="accent1"/>
+          </a:fillRef>
+          <a:effectRef idx="0">
+            <a:schemeClr val="accent1"/>
+          </a:effectRef>
+          <a:fontRef idx="minor">
+            <a:schemeClr val="tx1"/>
+          </a:fontRef>
+        </p:style>
+      </p:cxnSp>
+      <p:cxnSp>
+        <p:nvCxnSpPr>
+          <p:cNvPr id="379" name="Straight Arrow Connector 378"/>
+          <p:cNvCxnSpPr/>
+          <p:nvPr/>
+        </p:nvCxnSpPr>
+        <p:spPr>
+          <a:xfrm>
+            <a:off x="10323477" y="1981200"/>
+            <a:ext cx="3440" cy="512345"/>
+          </a:xfrm>
+          <a:prstGeom prst="straightConnector1">
+            <a:avLst/>
+          </a:prstGeom>
+          <a:ln w="12700">
+            <a:solidFill>
+              <a:schemeClr val="tx1"/>
+            </a:solidFill>
+            <a:tailEnd type="triangle"/>
+          </a:ln>
+        </p:spPr>
+        <p:style>
+          <a:lnRef idx="1">
+            <a:schemeClr val="accent1"/>
+          </a:lnRef>
+          <a:fillRef idx="0">
+            <a:schemeClr val="accent1"/>
+          </a:fillRef>
+          <a:effectRef idx="0">
+            <a:schemeClr val="accent1"/>
+          </a:effectRef>
+          <a:fontRef idx="minor">
+            <a:schemeClr val="tx1"/>
+          </a:fontRef>
+        </p:style>
+      </p:cxnSp>
+      <p:cxnSp>
+        <p:nvCxnSpPr>
+          <p:cNvPr id="381" name="Straight Arrow Connector 380"/>
+          <p:cNvCxnSpPr/>
+          <p:nvPr/>
+        </p:nvCxnSpPr>
+        <p:spPr>
+          <a:xfrm>
+            <a:off x="10486935" y="2125980"/>
+            <a:ext cx="0" cy="372645"/>
+          </a:xfrm>
+          <a:prstGeom prst="straightConnector1">
+            <a:avLst/>
+          </a:prstGeom>
+          <a:ln w="12700">
+            <a:solidFill>
+              <a:schemeClr val="tx1"/>
+            </a:solidFill>
+            <a:tailEnd type="triangle"/>
+          </a:ln>
+        </p:spPr>
+        <p:style>
+          <a:lnRef idx="1">
+            <a:schemeClr val="accent1"/>
+          </a:lnRef>
+          <a:fillRef idx="0">
+            <a:schemeClr val="accent1"/>
+          </a:fillRef>
+          <a:effectRef idx="0">
+            <a:schemeClr val="accent1"/>
+          </a:effectRef>
+          <a:fontRef idx="minor">
+            <a:schemeClr val="tx1"/>
+          </a:fontRef>
+        </p:style>
+      </p:cxnSp>
+      <p:sp>
+        <p:nvSpPr>
+          <p:cNvPr id="365" name="Rounded Rectangle 364"/>
+          <p:cNvSpPr/>
+          <p:nvPr/>
+        </p:nvSpPr>
+        <p:spPr>
+          <a:xfrm>
+            <a:off x="9106769" y="3935619"/>
+            <a:ext cx="2383796" cy="1636708"/>
+          </a:xfrm>
+          <a:prstGeom prst="roundRect">
+            <a:avLst>
+              <a:gd name="adj" fmla="val 5363"/>
+            </a:avLst>
+          </a:prstGeom>
+          <a:solidFill>
+            <a:schemeClr val="bg1"/>
+          </a:solidFill>
+          <a:ln>
+            <a:solidFill>
+              <a:schemeClr val="tx1"/>
+            </a:solidFill>
+            <a:prstDash val="dash"/>
+          </a:ln>
+        </p:spPr>
+        <p:style>
+          <a:lnRef idx="2">
+            <a:schemeClr val="accent1">
+              <a:shade val="50000"/>
+            </a:schemeClr>
+          </a:lnRef>
+          <a:fillRef idx="1">
+            <a:schemeClr val="accent1"/>
+          </a:fillRef>
+          <a:effectRef idx="0">
+            <a:schemeClr val="accent1"/>
+          </a:effectRef>
+          <a:fontRef idx="minor">
+            <a:schemeClr val="lt1"/>
+          </a:fontRef>
+        </p:style>
+        <p:txBody>
+          <a:bodyPr rot="0" spcFirstLastPara="0" vertOverflow="overflow" horzOverflow="overflow" vert="horz" wrap="square" lIns="91440" tIns="45721" rIns="91440" bIns="45721" numCol="1" spcCol="0" rtlCol="0" fromWordArt="0" anchor="ctr" anchorCtr="0" forceAA="0" compatLnSpc="1">
+            <a:prstTxWarp prst="textNoShape">
+              <a:avLst/>
+            </a:prstTxWarp>
+            <a:noAutofit/>
+          </a:bodyPr>
+          <a:lstStyle/>
+          <a:p>
+            <a:pPr algn="ctr"/>
+            <a:endParaRPr lang="en-US" sz="1798" dirty="0">
+              <a:solidFill>
+                <a:schemeClr val="tx1"/>
+              </a:solidFill>
+            </a:endParaRPr>
+          </a:p>
+        </p:txBody>
+      </p:sp>
+      <p:grpSp>
+        <p:nvGrpSpPr>
+          <p:cNvPr id="395" name="Group 394"/>
+          <p:cNvGrpSpPr/>
+          <p:nvPr/>
+        </p:nvGrpSpPr>
+        <p:grpSpPr>
+          <a:xfrm>
+            <a:off x="10475239" y="4266653"/>
+            <a:ext cx="782690" cy="1084962"/>
+            <a:chOff x="10474585" y="4146267"/>
+            <a:chExt cx="790450" cy="1171631"/>
+          </a:xfrm>
+        </p:grpSpPr>
+        <p:grpSp>
+          <p:nvGrpSpPr>
+            <p:cNvPr id="391" name="Group 390"/>
+            <p:cNvGrpSpPr/>
+            <p:nvPr/>
+          </p:nvGrpSpPr>
+          <p:grpSpPr>
+            <a:xfrm rot="5400000">
+              <a:off x="10283994" y="4336858"/>
+              <a:ext cx="1171631" cy="790450"/>
+              <a:chOff x="13246100" y="1860782"/>
+              <a:chExt cx="1724765" cy="894744"/>
+            </a:xfrm>
+            <a:solidFill>
+              <a:schemeClr val="bg1"/>
+            </a:solidFill>
+          </p:grpSpPr>
+          <p:sp>
+            <p:nvSpPr>
+              <p:cNvPr id="389" name="Parallelogram 388"/>
+              <p:cNvSpPr/>
+              <p:nvPr/>
+            </p:nvSpPr>
+            <p:spPr>
+              <a:xfrm flipH="1">
+                <a:off x="14139639" y="1866630"/>
+                <a:ext cx="831226" cy="888896"/>
+              </a:xfrm>
+              <a:prstGeom prst="parallelogram">
+                <a:avLst/>
+              </a:prstGeom>
+              <a:grpFill/>
+              <a:ln>
+                <a:solidFill>
+                  <a:schemeClr val="tx1"/>
+                </a:solidFill>
+              </a:ln>
+            </p:spPr>
+            <p:style>
+              <a:lnRef idx="2">
+                <a:schemeClr val="accent1">
+                  <a:shade val="50000"/>
+                </a:schemeClr>
+              </a:lnRef>
+              <a:fillRef idx="1">
+                <a:schemeClr val="accent1"/>
+              </a:fillRef>
+              <a:effectRef idx="0">
+                <a:schemeClr val="accent1"/>
+              </a:effectRef>
+              <a:fontRef idx="minor">
+                <a:schemeClr val="lt1"/>
+              </a:fontRef>
+            </p:style>
+            <p:txBody>
+              <a:bodyPr rtlCol="0" anchor="ctr"/>
+              <a:lstStyle/>
+              <a:p>
+                <a:pPr algn="ctr"/>
+                <a:endParaRPr lang="en-US"/>
+              </a:p>
+            </p:txBody>
+          </p:sp>
+          <p:grpSp>
+            <p:nvGrpSpPr>
+              <p:cNvPr id="390" name="Group 389"/>
+              <p:cNvGrpSpPr/>
+              <p:nvPr/>
+            </p:nvGrpSpPr>
+            <p:grpSpPr>
+              <a:xfrm>
+                <a:off x="13246100" y="1860782"/>
+                <a:ext cx="1217288" cy="888896"/>
+                <a:chOff x="13246100" y="1860782"/>
+                <a:chExt cx="1217288" cy="888896"/>
+              </a:xfrm>
+              <a:grpFill/>
+            </p:grpSpPr>
+            <p:sp>
+              <p:nvSpPr>
+                <p:cNvPr id="387" name="Parallelogram 386"/>
+                <p:cNvSpPr/>
+                <p:nvPr/>
+              </p:nvSpPr>
+              <p:spPr>
+                <a:xfrm>
+                  <a:off x="13246100" y="1860783"/>
+                  <a:ext cx="825500" cy="888895"/>
+                </a:xfrm>
+                <a:prstGeom prst="parallelogram">
+                  <a:avLst/>
+                </a:prstGeom>
+                <a:grpFill/>
+                <a:ln>
+                  <a:solidFill>
+                    <a:schemeClr val="tx1"/>
+                  </a:solidFill>
+                </a:ln>
+              </p:spPr>
+              <p:style>
+                <a:lnRef idx="2">
+                  <a:schemeClr val="accent1">
+                    <a:shade val="50000"/>
+                  </a:schemeClr>
+                </a:lnRef>
+                <a:fillRef idx="1">
+                  <a:schemeClr val="accent1"/>
+                </a:fillRef>
+                <a:effectRef idx="0">
+                  <a:schemeClr val="accent1"/>
+                </a:effectRef>
+                <a:fontRef idx="minor">
+                  <a:schemeClr val="lt1"/>
+                </a:fontRef>
+              </p:style>
+              <p:txBody>
+                <a:bodyPr rtlCol="0" anchor="ctr"/>
+                <a:lstStyle/>
+                <a:p>
+                  <a:pPr algn="ctr"/>
+                  <a:endParaRPr lang="en-US"/>
+                </a:p>
+              </p:txBody>
+            </p:sp>
+            <p:sp>
+              <p:nvSpPr>
+                <p:cNvPr id="388" name="Rectangle 387"/>
+                <p:cNvSpPr/>
+                <p:nvPr/>
+              </p:nvSpPr>
+              <p:spPr>
+                <a:xfrm>
+                  <a:off x="13787809" y="1860782"/>
+                  <a:ext cx="675579" cy="607399"/>
+                </a:xfrm>
+                <a:prstGeom prst="rect">
+                  <a:avLst/>
+                </a:prstGeom>
+                <a:grpFill/>
+                <a:ln>
+                  <a:solidFill>
+                    <a:schemeClr val="tx1"/>
+                  </a:solidFill>
+                </a:ln>
+              </p:spPr>
+              <p:style>
+                <a:lnRef idx="2">
+                  <a:schemeClr val="accent1">
+                    <a:shade val="50000"/>
+                  </a:schemeClr>
+                </a:lnRef>
+                <a:fillRef idx="1">
+                  <a:schemeClr val="accent1"/>
+                </a:fillRef>
+                <a:effectRef idx="0">
+                  <a:schemeClr val="accent1"/>
+                </a:effectRef>
+                <a:fontRef idx="minor">
+                  <a:schemeClr val="lt1"/>
+                </a:fontRef>
+              </p:style>
+              <p:txBody>
+                <a:bodyPr rtlCol="0" anchor="ctr"/>
+                <a:lstStyle/>
+                <a:p>
+                  <a:pPr algn="ctr"/>
+                  <a:endParaRPr lang="en-US"/>
+                </a:p>
+              </p:txBody>
+            </p:sp>
+          </p:grpSp>
+        </p:grpSp>
+        <p:sp>
+          <p:nvSpPr>
+            <p:cNvPr id="392" name="Freeform 391"/>
+            <p:cNvSpPr/>
+            <p:nvPr/>
+          </p:nvSpPr>
+          <p:spPr>
+            <a:xfrm>
+              <a:off x="10578296" y="4470400"/>
+              <a:ext cx="679472" cy="609600"/>
+            </a:xfrm>
+            <a:custGeom>
+              <a:avLst/>
+              <a:gdLst>
+                <a:gd name="connsiteX0" fmla="*/ 35560 w 635000"/>
+                <a:gd name="connsiteY0" fmla="*/ 96520 h 629920"/>
+                <a:gd name="connsiteX1" fmla="*/ 35560 w 635000"/>
+                <a:gd name="connsiteY1" fmla="*/ 96520 h 629920"/>
+                <a:gd name="connsiteX2" fmla="*/ 243840 w 635000"/>
+                <a:gd name="connsiteY2" fmla="*/ 228600 h 629920"/>
+                <a:gd name="connsiteX3" fmla="*/ 137160 w 635000"/>
+                <a:gd name="connsiteY3" fmla="*/ 421640 h 629920"/>
+                <a:gd name="connsiteX4" fmla="*/ 116840 w 635000"/>
+                <a:gd name="connsiteY4" fmla="*/ 406400 h 629920"/>
+                <a:gd name="connsiteX5" fmla="*/ 0 w 635000"/>
+                <a:gd name="connsiteY5" fmla="*/ 472440 h 629920"/>
+                <a:gd name="connsiteX6" fmla="*/ 127000 w 635000"/>
+                <a:gd name="connsiteY6" fmla="*/ 629920 h 629920"/>
+                <a:gd name="connsiteX7" fmla="*/ 635000 w 635000"/>
+                <a:gd name="connsiteY7" fmla="*/ 604520 h 629920"/>
+                <a:gd name="connsiteX8" fmla="*/ 629920 w 635000"/>
+                <a:gd name="connsiteY8" fmla="*/ 0 h 629920"/>
+                <a:gd name="connsiteX9" fmla="*/ 35560 w 635000"/>
+                <a:gd name="connsiteY9" fmla="*/ 40640 h 629920"/>
+                <a:gd name="connsiteX10" fmla="*/ 35560 w 635000"/>
+                <a:gd name="connsiteY10" fmla="*/ 96520 h 629920"/>
+                <a:gd name="connsiteX0" fmla="*/ 86360 w 635000"/>
+                <a:gd name="connsiteY0" fmla="*/ 162560 h 629920"/>
+                <a:gd name="connsiteX1" fmla="*/ 35560 w 635000"/>
+                <a:gd name="connsiteY1" fmla="*/ 96520 h 629920"/>
+                <a:gd name="connsiteX2" fmla="*/ 243840 w 635000"/>
+                <a:gd name="connsiteY2" fmla="*/ 228600 h 629920"/>
+                <a:gd name="connsiteX3" fmla="*/ 137160 w 635000"/>
+                <a:gd name="connsiteY3" fmla="*/ 421640 h 629920"/>
+                <a:gd name="connsiteX4" fmla="*/ 116840 w 635000"/>
+                <a:gd name="connsiteY4" fmla="*/ 406400 h 629920"/>
+                <a:gd name="connsiteX5" fmla="*/ 0 w 635000"/>
+                <a:gd name="connsiteY5" fmla="*/ 472440 h 629920"/>
+                <a:gd name="connsiteX6" fmla="*/ 127000 w 635000"/>
+                <a:gd name="connsiteY6" fmla="*/ 629920 h 629920"/>
+                <a:gd name="connsiteX7" fmla="*/ 635000 w 635000"/>
+                <a:gd name="connsiteY7" fmla="*/ 604520 h 629920"/>
+                <a:gd name="connsiteX8" fmla="*/ 629920 w 635000"/>
+                <a:gd name="connsiteY8" fmla="*/ 0 h 629920"/>
+                <a:gd name="connsiteX9" fmla="*/ 35560 w 635000"/>
+                <a:gd name="connsiteY9" fmla="*/ 40640 h 629920"/>
+                <a:gd name="connsiteX10" fmla="*/ 86360 w 635000"/>
+                <a:gd name="connsiteY10" fmla="*/ 162560 h 629920"/>
+                <a:gd name="connsiteX0" fmla="*/ 130344 w 678984"/>
+                <a:gd name="connsiteY0" fmla="*/ 162560 h 629920"/>
+                <a:gd name="connsiteX1" fmla="*/ 3344 w 678984"/>
+                <a:gd name="connsiteY1" fmla="*/ 81280 h 629920"/>
+                <a:gd name="connsiteX2" fmla="*/ 287824 w 678984"/>
+                <a:gd name="connsiteY2" fmla="*/ 228600 h 629920"/>
+                <a:gd name="connsiteX3" fmla="*/ 181144 w 678984"/>
+                <a:gd name="connsiteY3" fmla="*/ 421640 h 629920"/>
+                <a:gd name="connsiteX4" fmla="*/ 160824 w 678984"/>
+                <a:gd name="connsiteY4" fmla="*/ 406400 h 629920"/>
+                <a:gd name="connsiteX5" fmla="*/ 43984 w 678984"/>
+                <a:gd name="connsiteY5" fmla="*/ 472440 h 629920"/>
+                <a:gd name="connsiteX6" fmla="*/ 170984 w 678984"/>
+                <a:gd name="connsiteY6" fmla="*/ 629920 h 629920"/>
+                <a:gd name="connsiteX7" fmla="*/ 678984 w 678984"/>
+                <a:gd name="connsiteY7" fmla="*/ 604520 h 629920"/>
+                <a:gd name="connsiteX8" fmla="*/ 673904 w 678984"/>
+                <a:gd name="connsiteY8" fmla="*/ 0 h 629920"/>
+                <a:gd name="connsiteX9" fmla="*/ 79544 w 678984"/>
+                <a:gd name="connsiteY9" fmla="*/ 40640 h 629920"/>
+                <a:gd name="connsiteX10" fmla="*/ 130344 w 678984"/>
+                <a:gd name="connsiteY10" fmla="*/ 162560 h 629920"/>
+                <a:gd name="connsiteX0" fmla="*/ 130344 w 679472"/>
+                <a:gd name="connsiteY0" fmla="*/ 142240 h 609600"/>
+                <a:gd name="connsiteX1" fmla="*/ 3344 w 679472"/>
+                <a:gd name="connsiteY1" fmla="*/ 60960 h 609600"/>
+                <a:gd name="connsiteX2" fmla="*/ 287824 w 679472"/>
+                <a:gd name="connsiteY2" fmla="*/ 208280 h 609600"/>
+                <a:gd name="connsiteX3" fmla="*/ 181144 w 679472"/>
+                <a:gd name="connsiteY3" fmla="*/ 401320 h 609600"/>
+                <a:gd name="connsiteX4" fmla="*/ 160824 w 679472"/>
+                <a:gd name="connsiteY4" fmla="*/ 386080 h 609600"/>
+                <a:gd name="connsiteX5" fmla="*/ 43984 w 679472"/>
+                <a:gd name="connsiteY5" fmla="*/ 452120 h 609600"/>
+                <a:gd name="connsiteX6" fmla="*/ 170984 w 679472"/>
+                <a:gd name="connsiteY6" fmla="*/ 609600 h 609600"/>
+                <a:gd name="connsiteX7" fmla="*/ 678984 w 679472"/>
+                <a:gd name="connsiteY7" fmla="*/ 584200 h 609600"/>
+                <a:gd name="connsiteX8" fmla="*/ 678984 w 679472"/>
+                <a:gd name="connsiteY8" fmla="*/ 0 h 609600"/>
+                <a:gd name="connsiteX9" fmla="*/ 79544 w 679472"/>
+                <a:gd name="connsiteY9" fmla="*/ 20320 h 609600"/>
+                <a:gd name="connsiteX10" fmla="*/ 130344 w 679472"/>
+                <a:gd name="connsiteY10" fmla="*/ 142240 h 609600"/>
+                <a:gd name="connsiteX0" fmla="*/ 130344 w 679472"/>
+                <a:gd name="connsiteY0" fmla="*/ 142240 h 609600"/>
+                <a:gd name="connsiteX1" fmla="*/ 3344 w 679472"/>
+                <a:gd name="connsiteY1" fmla="*/ 60960 h 609600"/>
+                <a:gd name="connsiteX2" fmla="*/ 287824 w 679472"/>
+                <a:gd name="connsiteY2" fmla="*/ 208280 h 609600"/>
+                <a:gd name="connsiteX3" fmla="*/ 181144 w 679472"/>
+                <a:gd name="connsiteY3" fmla="*/ 401320 h 609600"/>
+                <a:gd name="connsiteX4" fmla="*/ 160824 w 679472"/>
+                <a:gd name="connsiteY4" fmla="*/ 386080 h 609600"/>
+                <a:gd name="connsiteX5" fmla="*/ 43984 w 679472"/>
+                <a:gd name="connsiteY5" fmla="*/ 452120 h 609600"/>
+                <a:gd name="connsiteX6" fmla="*/ 170984 w 679472"/>
+                <a:gd name="connsiteY6" fmla="*/ 609600 h 609600"/>
+                <a:gd name="connsiteX7" fmla="*/ 678984 w 679472"/>
+                <a:gd name="connsiteY7" fmla="*/ 584200 h 609600"/>
+                <a:gd name="connsiteX8" fmla="*/ 678984 w 679472"/>
+                <a:gd name="connsiteY8" fmla="*/ 0 h 609600"/>
+                <a:gd name="connsiteX9" fmla="*/ 79544 w 679472"/>
+                <a:gd name="connsiteY9" fmla="*/ 20320 h 609600"/>
+                <a:gd name="connsiteX10" fmla="*/ 130344 w 679472"/>
+                <a:gd name="connsiteY10" fmla="*/ 142240 h 609600"/>
+              </a:gdLst>
+              <a:ahLst/>
+              <a:cxnLst>
+                <a:cxn ang="0">
+                  <a:pos x="connsiteX0" y="connsiteY0"/>
+                </a:cxn>
+                <a:cxn ang="0">
+                  <a:pos x="connsiteX1" y="connsiteY1"/>
+                </a:cxn>
+                <a:cxn ang="0">
+                  <a:pos x="connsiteX2" y="connsiteY2"/>
+                </a:cxn>
+                <a:cxn ang="0">
+                  <a:pos x="connsiteX3" y="connsiteY3"/>
+                </a:cxn>
+                <a:cxn ang="0">
+                  <a:pos x="connsiteX4" y="connsiteY4"/>
+                </a:cxn>
+                <a:cxn ang="0">
+                  <a:pos x="connsiteX5" y="connsiteY5"/>
+                </a:cxn>
+                <a:cxn ang="0">
+                  <a:pos x="connsiteX6" y="connsiteY6"/>
+                </a:cxn>
+                <a:cxn ang="0">
+                  <a:pos x="connsiteX7" y="connsiteY7"/>
+                </a:cxn>
+                <a:cxn ang="0">
+                  <a:pos x="connsiteX8" y="connsiteY8"/>
+                </a:cxn>
+                <a:cxn ang="0">
+                  <a:pos x="connsiteX9" y="connsiteY9"/>
+                </a:cxn>
+                <a:cxn ang="0">
+                  <a:pos x="connsiteX10" y="connsiteY10"/>
+                </a:cxn>
+              </a:cxnLst>
+              <a:rect l="l" t="t" r="r" b="b"/>
+              <a:pathLst>
+                <a:path w="679472" h="609600">
+                  <a:moveTo>
+                    <a:pt x="130344" y="142240"/>
+                  </a:moveTo>
+                  <a:cubicBezTo>
+                    <a:pt x="113411" y="120227"/>
+                    <a:pt x="-22903" y="49953"/>
+                    <a:pt x="3344" y="60960"/>
+                  </a:cubicBezTo>
+                  <a:cubicBezTo>
+                    <a:pt x="29591" y="71967"/>
+                    <a:pt x="218397" y="164253"/>
+                    <a:pt x="287824" y="208280"/>
+                  </a:cubicBezTo>
+                  <a:lnTo>
+                    <a:pt x="181144" y="401320"/>
+                  </a:lnTo>
+                  <a:lnTo>
+                    <a:pt x="160824" y="386080"/>
+                  </a:lnTo>
+                  <a:lnTo>
+                    <a:pt x="43984" y="452120"/>
+                  </a:lnTo>
+                  <a:lnTo>
+                    <a:pt x="170984" y="609600"/>
+                  </a:lnTo>
+                  <a:lnTo>
+                    <a:pt x="678984" y="584200"/>
+                  </a:lnTo>
+                  <a:cubicBezTo>
+                    <a:pt x="677291" y="382693"/>
+                    <a:pt x="680677" y="201507"/>
+                    <a:pt x="678984" y="0"/>
+                  </a:cubicBezTo>
+                  <a:lnTo>
+                    <a:pt x="79544" y="20320"/>
+                  </a:lnTo>
+                  <a:lnTo>
+                    <a:pt x="130344" y="142240"/>
+                  </a:lnTo>
+                  <a:close/>
+                </a:path>
+              </a:pathLst>
+            </a:custGeom>
+            <a:solidFill>
+              <a:schemeClr val="bg1"/>
+            </a:solidFill>
+            <a:ln>
+              <a:noFill/>
+            </a:ln>
+          </p:spPr>
+          <p:style>
+            <a:lnRef idx="2">
+              <a:schemeClr val="accent1">
+                <a:shade val="50000"/>
+              </a:schemeClr>
+            </a:lnRef>
+            <a:fillRef idx="1">
+              <a:schemeClr val="accent1"/>
+            </a:fillRef>
+            <a:effectRef idx="0">
+              <a:schemeClr val="accent1"/>
+            </a:effectRef>
+            <a:fontRef idx="minor">
+              <a:schemeClr val="lt1"/>
+            </a:fontRef>
+          </p:style>
+          <p:txBody>
+            <a:bodyPr rtlCol="0" anchor="ctr"/>
+            <a:lstStyle/>
+            <a:p>
+              <a:pPr algn="ctr"/>
+              <a:endParaRPr lang="en-US"/>
+            </a:p>
+          </p:txBody>
+        </p:sp>
+        <p:sp>
+          <p:nvSpPr>
+            <p:cNvPr id="393" name="TextBox 392"/>
+            <p:cNvSpPr txBox="1"/>
+            <p:nvPr/>
+          </p:nvSpPr>
+          <p:spPr>
+            <a:xfrm>
+              <a:off x="10725350" y="4574430"/>
+              <a:ext cx="516873" cy="338554"/>
+            </a:xfrm>
+            <a:prstGeom prst="rect">
+              <a:avLst/>
+            </a:prstGeom>
+            <a:noFill/>
+          </p:spPr>
+          <p:txBody>
+            <a:bodyPr wrap="none" rtlCol="0">
+              <a:spAutoFit/>
+            </a:bodyPr>
+            <a:lstStyle/>
+            <a:p>
+              <a:r>
+                <a:rPr lang="en-US" sz="1600" dirty="0" smtClean="0"/>
+                <a:t>ALU</a:t>
+              </a:r>
+              <a:endParaRPr lang="en-US" sz="1600" dirty="0"/>
+            </a:p>
+          </p:txBody>
+        </p:sp>
+      </p:grpSp>
+      <p:cxnSp>
+        <p:nvCxnSpPr>
+          <p:cNvPr id="397" name="Elbow Connector 396"/>
+          <p:cNvCxnSpPr>
+            <a:stCxn id="388" idx="0"/>
+          </p:cNvCxnSpPr>
+          <p:nvPr/>
+        </p:nvCxnSpPr>
+        <p:spPr>
+          <a:xfrm>
+            <a:off x="11257929" y="4819901"/>
+            <a:ext cx="392130" cy="1115772"/>
+          </a:xfrm>
+          <a:prstGeom prst="bentConnector2">
+            <a:avLst/>
+          </a:prstGeom>
+          <a:ln w="12700">
+            <a:solidFill>
+              <a:schemeClr val="tx1"/>
+            </a:solidFill>
+            <a:tailEnd type="triangle"/>
+          </a:ln>
+        </p:spPr>
+        <p:style>
+          <a:lnRef idx="1">
+            <a:schemeClr val="accent1"/>
+          </a:lnRef>
+          <a:fillRef idx="0">
+            <a:schemeClr val="accent1"/>
+          </a:fillRef>
+          <a:effectRef idx="0">
+            <a:schemeClr val="accent1"/>
+          </a:effectRef>
+          <a:fontRef idx="minor">
+            <a:schemeClr val="tx1"/>
+          </a:fontRef>
+        </p:style>
+      </p:cxnSp>
+      <p:sp>
+        <p:nvSpPr>
+          <p:cNvPr id="398" name="Trapezoid 397"/>
+          <p:cNvSpPr/>
+          <p:nvPr/>
+        </p:nvSpPr>
+        <p:spPr>
+          <a:xfrm rot="5400000">
+            <a:off x="9592963" y="4370083"/>
+            <a:ext cx="539293" cy="179086"/>
+          </a:xfrm>
+          <a:prstGeom prst="trapezoid">
+            <a:avLst>
+              <a:gd name="adj" fmla="val 50716"/>
+            </a:avLst>
+          </a:prstGeom>
+          <a:solidFill>
+            <a:schemeClr val="bg1"/>
+          </a:solidFill>
+          <a:ln>
+            <a:solidFill>
+              <a:schemeClr val="tx1"/>
+            </a:solidFill>
+          </a:ln>
+        </p:spPr>
+        <p:style>
+          <a:lnRef idx="2">
+            <a:schemeClr val="accent1">
+              <a:shade val="50000"/>
+            </a:schemeClr>
+          </a:lnRef>
+          <a:fillRef idx="1">
+            <a:schemeClr val="accent1"/>
+          </a:fillRef>
+          <a:effectRef idx="0">
+            <a:schemeClr val="accent1"/>
+          </a:effectRef>
+          <a:fontRef idx="minor">
+            <a:schemeClr val="lt1"/>
+          </a:fontRef>
+        </p:style>
+        <p:txBody>
+          <a:bodyPr rot="0" spcFirstLastPara="0" vertOverflow="overflow" horzOverflow="overflow" vert="horz" wrap="square" lIns="91440" tIns="45721" rIns="91440" bIns="45721" numCol="1" spcCol="0" rtlCol="0" fromWordArt="0" anchor="ctr" anchorCtr="0" forceAA="0" compatLnSpc="1">
+            <a:prstTxWarp prst="textNoShape">
+              <a:avLst/>
+            </a:prstTxWarp>
+            <a:noAutofit/>
+          </a:bodyPr>
+          <a:lstStyle/>
+          <a:p>
+            <a:pPr algn="ctr"/>
+            <a:endParaRPr lang="en-US" sz="1798" dirty="0">
+              <a:solidFill>
+                <a:sysClr val="windowText" lastClr="000000"/>
+              </a:solidFill>
+            </a:endParaRPr>
+          </a:p>
+        </p:txBody>
+      </p:sp>
+      <p:sp>
+        <p:nvSpPr>
+          <p:cNvPr id="400" name="Trapezoid 399"/>
+          <p:cNvSpPr/>
+          <p:nvPr/>
+        </p:nvSpPr>
+        <p:spPr>
+          <a:xfrm rot="5400000">
+            <a:off x="9596709" y="5069238"/>
+            <a:ext cx="539293" cy="179086"/>
+          </a:xfrm>
+          <a:prstGeom prst="trapezoid">
+            <a:avLst>
+              <a:gd name="adj" fmla="val 50716"/>
+            </a:avLst>
+          </a:prstGeom>
+          <a:solidFill>
+            <a:schemeClr val="bg1"/>
+          </a:solidFill>
+          <a:ln>
+            <a:solidFill>
+              <a:schemeClr val="tx1"/>
+            </a:solidFill>
+          </a:ln>
+        </p:spPr>
+        <p:style>
+          <a:lnRef idx="2">
+            <a:schemeClr val="accent1">
+              <a:shade val="50000"/>
+            </a:schemeClr>
+          </a:lnRef>
+          <a:fillRef idx="1">
+            <a:schemeClr val="accent1"/>
+          </a:fillRef>
+          <a:effectRef idx="0">
+            <a:schemeClr val="accent1"/>
+          </a:effectRef>
+          <a:fontRef idx="minor">
+            <a:schemeClr val="lt1"/>
+          </a:fontRef>
+        </p:style>
+        <p:txBody>
+          <a:bodyPr rot="0" spcFirstLastPara="0" vertOverflow="overflow" horzOverflow="overflow" vert="horz" wrap="square" lIns="91440" tIns="45721" rIns="91440" bIns="45721" numCol="1" spcCol="0" rtlCol="0" fromWordArt="0" anchor="ctr" anchorCtr="0" forceAA="0" compatLnSpc="1">
+            <a:prstTxWarp prst="textNoShape">
+              <a:avLst/>
+            </a:prstTxWarp>
+            <a:noAutofit/>
+          </a:bodyPr>
+          <a:lstStyle/>
+          <a:p>
+            <a:pPr algn="ctr"/>
+            <a:endParaRPr lang="en-US" sz="1798" dirty="0">
+              <a:solidFill>
+                <a:sysClr val="windowText" lastClr="000000"/>
+              </a:solidFill>
+            </a:endParaRPr>
+          </a:p>
+        </p:txBody>
+      </p:sp>
+      <p:cxnSp>
+        <p:nvCxnSpPr>
+          <p:cNvPr id="402" name="Straight Arrow Connector 401"/>
+          <p:cNvCxnSpPr>
+            <a:stCxn id="398" idx="0"/>
+            <a:endCxn id="387" idx="3"/>
+          </p:cNvCxnSpPr>
+          <p:nvPr/>
+        </p:nvCxnSpPr>
+        <p:spPr>
+          <a:xfrm>
+            <a:off x="9952153" y="4459627"/>
+            <a:ext cx="528203" cy="1756"/>
+          </a:xfrm>
+          <a:prstGeom prst="straightConnector1">
+            <a:avLst/>
+          </a:prstGeom>
+          <a:ln w="12700">
+            <a:solidFill>
+              <a:schemeClr val="tx1"/>
+            </a:solidFill>
+            <a:tailEnd type="triangle"/>
+          </a:ln>
+        </p:spPr>
+        <p:style>
+          <a:lnRef idx="1">
+            <a:schemeClr val="accent1"/>
+          </a:lnRef>
+          <a:fillRef idx="0">
+            <a:schemeClr val="accent1"/>
+          </a:fillRef>
+          <a:effectRef idx="0">
+            <a:schemeClr val="accent1"/>
+          </a:effectRef>
+          <a:fontRef idx="minor">
+            <a:schemeClr val="tx1"/>
+          </a:fontRef>
+        </p:style>
+      </p:cxnSp>
+      <p:cxnSp>
+        <p:nvCxnSpPr>
+          <p:cNvPr id="406" name="Straight Arrow Connector 405"/>
+          <p:cNvCxnSpPr>
+            <a:stCxn id="400" idx="0"/>
+            <a:endCxn id="389" idx="3"/>
+          </p:cNvCxnSpPr>
+          <p:nvPr/>
+        </p:nvCxnSpPr>
+        <p:spPr>
+          <a:xfrm flipV="1">
+            <a:off x="9955899" y="5155534"/>
+            <a:ext cx="519340" cy="3248"/>
+          </a:xfrm>
+          <a:prstGeom prst="straightConnector1">
+            <a:avLst/>
+          </a:prstGeom>
+          <a:ln w="12700">
+            <a:solidFill>
+              <a:schemeClr val="tx1"/>
+            </a:solidFill>
+            <a:tailEnd type="triangle"/>
+          </a:ln>
+        </p:spPr>
+        <p:style>
+          <a:lnRef idx="1">
+            <a:schemeClr val="accent1"/>
+          </a:lnRef>
+          <a:fillRef idx="0">
+            <a:schemeClr val="accent1"/>
+          </a:fillRef>
+          <a:effectRef idx="0">
+            <a:schemeClr val="accent1"/>
+          </a:effectRef>
+          <a:fontRef idx="minor">
+            <a:schemeClr val="tx1"/>
+          </a:fontRef>
+        </p:style>
+      </p:cxnSp>
+      <p:sp>
+        <p:nvSpPr>
+          <p:cNvPr id="410" name="TextBox 409"/>
+          <p:cNvSpPr txBox="1"/>
+          <p:nvPr/>
+        </p:nvSpPr>
+        <p:spPr>
+          <a:xfrm>
+            <a:off x="9825374" y="3993329"/>
+            <a:ext cx="862800" cy="276999"/>
+          </a:xfrm>
+          <a:prstGeom prst="rect">
+            <a:avLst/>
+          </a:prstGeom>
+          <a:noFill/>
+        </p:spPr>
+        <p:txBody>
+          <a:bodyPr wrap="none" rtlCol="0">
+            <a:spAutoFit/>
+          </a:bodyPr>
+          <a:lstStyle/>
+          <a:p>
+            <a:r>
+              <a:rPr lang="en-US" sz="1200" dirty="0"/>
+              <a:t>o</a:t>
+            </a:r>
+            <a:r>
+              <a:rPr lang="en-US" sz="1200" dirty="0" smtClean="0"/>
+              <a:t>perand_1</a:t>
+            </a:r>
+            <a:endParaRPr lang="en-US" sz="1200" dirty="0"/>
+          </a:p>
+        </p:txBody>
+      </p:sp>
+      <p:sp>
+        <p:nvSpPr>
+          <p:cNvPr id="411" name="TextBox 410"/>
+          <p:cNvSpPr txBox="1"/>
+          <p:nvPr/>
+        </p:nvSpPr>
+        <p:spPr>
+          <a:xfrm>
+            <a:off x="9808899" y="4709331"/>
+            <a:ext cx="862800" cy="276999"/>
+          </a:xfrm>
+          <a:prstGeom prst="rect">
+            <a:avLst/>
+          </a:prstGeom>
+          <a:noFill/>
+        </p:spPr>
+        <p:txBody>
+          <a:bodyPr wrap="none" rtlCol="0">
+            <a:spAutoFit/>
+          </a:bodyPr>
+          <a:lstStyle/>
+          <a:p>
+            <a:r>
+              <a:rPr lang="en-US" sz="1200" dirty="0" smtClean="0"/>
+              <a:t>operand_2</a:t>
+            </a:r>
+            <a:endParaRPr lang="en-US" sz="1200" dirty="0"/>
           </a:p>
         </p:txBody>
       </p:sp>

</xml_diff>

<commit_message>
📝 Update block diagram (stage 3 completed)
</commit_message>
<xml_diff>
--- a/Documents/Temporary_Documents/phoeniX Block diagram.pptx
+++ b/Documents/Temporary_Documents/phoeniX Block diagram.pptx
@@ -7287,114 +7287,169 @@
           <a:chExt cx="0" cy="0"/>
         </a:xfrm>
       </p:grpSpPr>
-      <p:cxnSp>
-        <p:nvCxnSpPr>
-          <p:cNvPr id="384" name="Straight Arrow Connector 383"/>
-          <p:cNvCxnSpPr/>
-          <p:nvPr/>
-        </p:nvCxnSpPr>
-        <p:spPr>
-          <a:xfrm>
-            <a:off x="10478468" y="3572605"/>
-            <a:ext cx="0" cy="372645"/>
-          </a:xfrm>
-          <a:prstGeom prst="straightConnector1">
+      <p:sp>
+        <p:nvSpPr>
+          <p:cNvPr id="421" name="Rectangle 420"/>
+          <p:cNvSpPr/>
+          <p:nvPr/>
+        </p:nvSpPr>
+        <p:spPr>
+          <a:xfrm>
+            <a:off x="8425628" y="7675047"/>
+            <a:ext cx="304637" cy="174797"/>
+          </a:xfrm>
+          <a:prstGeom prst="rect">
             <a:avLst/>
           </a:prstGeom>
-          <a:ln w="12700">
-            <a:solidFill>
-              <a:schemeClr val="tx1"/>
-            </a:solidFill>
-            <a:tailEnd type="triangle"/>
-          </a:ln>
-        </p:spPr>
-        <p:style>
-          <a:lnRef idx="1">
-            <a:schemeClr val="accent1"/>
-          </a:lnRef>
-          <a:fillRef idx="0">
-            <a:schemeClr val="accent1"/>
-          </a:fillRef>
-          <a:effectRef idx="0">
-            <a:schemeClr val="accent1"/>
-          </a:effectRef>
-          <a:fontRef idx="minor">
-            <a:schemeClr val="tx1"/>
-          </a:fontRef>
-        </p:style>
-      </p:cxnSp>
-      <p:cxnSp>
-        <p:nvCxnSpPr>
-          <p:cNvPr id="385" name="Straight Arrow Connector 384"/>
-          <p:cNvCxnSpPr/>
-          <p:nvPr/>
-        </p:nvCxnSpPr>
-        <p:spPr>
-          <a:xfrm>
-            <a:off x="10328679" y="3571702"/>
-            <a:ext cx="0" cy="372645"/>
-          </a:xfrm>
-          <a:prstGeom prst="straightConnector1">
-            <a:avLst/>
-          </a:prstGeom>
-          <a:ln w="12700">
-            <a:solidFill>
-              <a:schemeClr val="tx1"/>
-            </a:solidFill>
-            <a:tailEnd type="triangle"/>
-          </a:ln>
-        </p:spPr>
-        <p:style>
-          <a:lnRef idx="1">
-            <a:schemeClr val="accent1"/>
-          </a:lnRef>
-          <a:fillRef idx="0">
-            <a:schemeClr val="accent1"/>
-          </a:fillRef>
-          <a:effectRef idx="0">
-            <a:schemeClr val="accent1"/>
-          </a:effectRef>
-          <a:fontRef idx="minor">
-            <a:schemeClr val="tx1"/>
-          </a:fontRef>
-        </p:style>
-      </p:cxnSp>
-      <p:cxnSp>
-        <p:nvCxnSpPr>
-          <p:cNvPr id="386" name="Straight Arrow Connector 385"/>
-          <p:cNvCxnSpPr/>
-          <p:nvPr/>
-        </p:nvCxnSpPr>
-        <p:spPr>
+        </p:spPr>
+        <p:style>
+          <a:lnRef idx="2">
+            <a:schemeClr val="accent1">
+              <a:shade val="50000"/>
+            </a:schemeClr>
+          </a:lnRef>
+          <a:fillRef idx="1">
+            <a:schemeClr val="accent1"/>
+          </a:fillRef>
+          <a:effectRef idx="0">
+            <a:schemeClr val="accent1"/>
+          </a:effectRef>
+          <a:fontRef idx="minor">
+            <a:schemeClr val="lt1"/>
+          </a:fontRef>
+        </p:style>
+        <p:txBody>
+          <a:bodyPr rtlCol="0" anchor="ctr"/>
+          <a:lstStyle/>
+          <a:p>
+            <a:pPr algn="ctr"/>
+            <a:endParaRPr lang="en-US"/>
+          </a:p>
+        </p:txBody>
+      </p:sp>
+      <p:grpSp>
+        <p:nvGrpSpPr>
+          <p:cNvPr id="439" name="Group 438"/>
+          <p:cNvGrpSpPr/>
+          <p:nvPr/>
+        </p:nvGrpSpPr>
+        <p:grpSpPr>
           <a:xfrm>
             <a:off x="10171796" y="3569296"/>
-            <a:ext cx="0" cy="372645"/>
-          </a:xfrm>
-          <a:prstGeom prst="straightConnector1">
-            <a:avLst/>
-          </a:prstGeom>
-          <a:ln w="12700">
-            <a:solidFill>
-              <a:schemeClr val="tx1"/>
-            </a:solidFill>
-            <a:tailEnd type="triangle"/>
-          </a:ln>
-        </p:spPr>
-        <p:style>
-          <a:lnRef idx="1">
-            <a:schemeClr val="accent1"/>
-          </a:lnRef>
-          <a:fillRef idx="0">
-            <a:schemeClr val="accent1"/>
-          </a:fillRef>
-          <a:effectRef idx="0">
-            <a:schemeClr val="accent1"/>
-          </a:effectRef>
-          <a:fontRef idx="minor">
-            <a:schemeClr val="tx1"/>
-          </a:fontRef>
-        </p:style>
-      </p:cxnSp>
+            <a:ext cx="306672" cy="375954"/>
+            <a:chOff x="10171796" y="3569296"/>
+            <a:chExt cx="306672" cy="375954"/>
+          </a:xfrm>
+        </p:grpSpPr>
+        <p:cxnSp>
+          <p:nvCxnSpPr>
+            <p:cNvPr id="384" name="Straight Arrow Connector 383"/>
+            <p:cNvCxnSpPr/>
+            <p:nvPr/>
+          </p:nvCxnSpPr>
+          <p:spPr>
+            <a:xfrm>
+              <a:off x="10478468" y="3572605"/>
+              <a:ext cx="0" cy="372645"/>
+            </a:xfrm>
+            <a:prstGeom prst="straightConnector1">
+              <a:avLst/>
+            </a:prstGeom>
+            <a:ln w="12700">
+              <a:solidFill>
+                <a:schemeClr val="tx1"/>
+              </a:solidFill>
+              <a:tailEnd type="triangle"/>
+            </a:ln>
+          </p:spPr>
+          <p:style>
+            <a:lnRef idx="1">
+              <a:schemeClr val="accent1"/>
+            </a:lnRef>
+            <a:fillRef idx="0">
+              <a:schemeClr val="accent1"/>
+            </a:fillRef>
+            <a:effectRef idx="0">
+              <a:schemeClr val="accent1"/>
+            </a:effectRef>
+            <a:fontRef idx="minor">
+              <a:schemeClr val="tx1"/>
+            </a:fontRef>
+          </p:style>
+        </p:cxnSp>
+        <p:cxnSp>
+          <p:nvCxnSpPr>
+            <p:cNvPr id="385" name="Straight Arrow Connector 384"/>
+            <p:cNvCxnSpPr/>
+            <p:nvPr/>
+          </p:nvCxnSpPr>
+          <p:spPr>
+            <a:xfrm>
+              <a:off x="10328679" y="3571702"/>
+              <a:ext cx="0" cy="372645"/>
+            </a:xfrm>
+            <a:prstGeom prst="straightConnector1">
+              <a:avLst/>
+            </a:prstGeom>
+            <a:ln w="12700">
+              <a:solidFill>
+                <a:schemeClr val="tx1"/>
+              </a:solidFill>
+              <a:tailEnd type="triangle"/>
+            </a:ln>
+          </p:spPr>
+          <p:style>
+            <a:lnRef idx="1">
+              <a:schemeClr val="accent1"/>
+            </a:lnRef>
+            <a:fillRef idx="0">
+              <a:schemeClr val="accent1"/>
+            </a:fillRef>
+            <a:effectRef idx="0">
+              <a:schemeClr val="accent1"/>
+            </a:effectRef>
+            <a:fontRef idx="minor">
+              <a:schemeClr val="tx1"/>
+            </a:fontRef>
+          </p:style>
+        </p:cxnSp>
+        <p:cxnSp>
+          <p:nvCxnSpPr>
+            <p:cNvPr id="386" name="Straight Arrow Connector 385"/>
+            <p:cNvCxnSpPr/>
+            <p:nvPr/>
+          </p:nvCxnSpPr>
+          <p:spPr>
+            <a:xfrm>
+              <a:off x="10171796" y="3569296"/>
+              <a:ext cx="0" cy="372645"/>
+            </a:xfrm>
+            <a:prstGeom prst="straightConnector1">
+              <a:avLst/>
+            </a:prstGeom>
+            <a:ln w="12700">
+              <a:solidFill>
+                <a:schemeClr val="tx1"/>
+              </a:solidFill>
+              <a:tailEnd type="triangle"/>
+            </a:ln>
+          </p:spPr>
+          <p:style>
+            <a:lnRef idx="1">
+              <a:schemeClr val="accent1"/>
+            </a:lnRef>
+            <a:fillRef idx="0">
+              <a:schemeClr val="accent1"/>
+            </a:fillRef>
+            <a:effectRef idx="0">
+              <a:schemeClr val="accent1"/>
+            </a:effectRef>
+            <a:fontRef idx="minor">
+              <a:schemeClr val="tx1"/>
+            </a:fontRef>
+          </p:style>
+        </p:cxnSp>
+      </p:grpSp>
       <p:sp>
         <p:nvSpPr>
           <p:cNvPr id="250" name="Rounded Rectangle 249"/>
@@ -8606,8 +8661,8 @@
         </p:nvSpPr>
         <p:spPr>
           <a:xfrm rot="16200000">
-            <a:off x="-414807" y="3714445"/>
-            <a:ext cx="2204514" cy="369332"/>
+            <a:off x="-290831" y="3729834"/>
+            <a:ext cx="1956561" cy="338554"/>
           </a:xfrm>
           <a:prstGeom prst="rect">
             <a:avLst/>
@@ -8621,10 +8676,10 @@
           <a:lstStyle/>
           <a:p>
             <a:r>
-              <a:rPr lang="en-US" sz="1800" dirty="0" smtClean="0"/>
+              <a:rPr lang="en-US" sz="1600" dirty="0" smtClean="0"/>
               <a:t>jump_branch_enable</a:t>
             </a:r>
-            <a:endParaRPr lang="en-US" sz="1800" dirty="0"/>
+            <a:endParaRPr lang="en-US" sz="1600" dirty="0"/>
           </a:p>
         </p:txBody>
       </p:sp>
@@ -8639,8 +8694,8 @@
         </p:nvCxnSpPr>
         <p:spPr>
           <a:xfrm rot="16200000" flipH="1">
-            <a:off x="850244" y="4838574"/>
-            <a:ext cx="313928" cy="639516"/>
+            <a:off x="788256" y="4776586"/>
+            <a:ext cx="437904" cy="639516"/>
           </a:xfrm>
           <a:prstGeom prst="bentConnector3">
             <a:avLst/>
@@ -8869,12 +8924,12 @@
         </p:nvCxnSpPr>
         <p:spPr>
           <a:xfrm rot="10800000" flipH="1" flipV="1">
-            <a:off x="1338815" y="703968"/>
-            <a:ext cx="253046" cy="2791852"/>
+            <a:off x="1110065" y="2008952"/>
+            <a:ext cx="481796" cy="1486868"/>
           </a:xfrm>
           <a:prstGeom prst="bentConnector3">
             <a:avLst>
-              <a:gd name="adj1" fmla="val -90339"/>
+              <a:gd name="adj1" fmla="val -47447"/>
             </a:avLst>
           </a:prstGeom>
           <a:ln w="12700">
@@ -9045,8 +9100,8 @@
           <p:nvPr/>
         </p:nvSpPr>
         <p:spPr>
-          <a:xfrm rot="16200000">
-            <a:off x="352019" y="1909340"/>
+          <a:xfrm>
+            <a:off x="863108" y="2412473"/>
             <a:ext cx="1815112" cy="338554"/>
           </a:xfrm>
           <a:prstGeom prst="rect">
@@ -9076,8 +9131,8 @@
         </p:nvSpPr>
         <p:spPr>
           <a:xfrm>
-            <a:off x="1338815" y="397598"/>
-            <a:ext cx="14367726" cy="612740"/>
+            <a:off x="1110065" y="1702582"/>
+            <a:ext cx="2578256" cy="612740"/>
           </a:xfrm>
           <a:prstGeom prst="roundRect">
             <a:avLst>
@@ -9330,10 +9385,18 @@
           <a:lstStyle/>
           <a:p>
             <a:r>
-              <a:rPr lang="en-US" sz="1600" dirty="0" smtClean="0"/>
+              <a:rPr lang="en-US" sz="1600" dirty="0" smtClean="0">
+                <a:solidFill>
+                  <a:srgbClr val="7030A0"/>
+                </a:solidFill>
+              </a:rPr>
               <a:t>immediate</a:t>
             </a:r>
-            <a:endParaRPr lang="en-US" sz="1600" dirty="0"/>
+            <a:endParaRPr lang="en-US" sz="1600" dirty="0">
+              <a:solidFill>
+                <a:srgbClr val="7030A0"/>
+              </a:solidFill>
+            </a:endParaRPr>
           </a:p>
         </p:txBody>
       </p:sp>
@@ -10146,7 +10209,7 @@
           </a:prstGeom>
           <a:ln w="12700">
             <a:solidFill>
-              <a:schemeClr val="tx1"/>
+              <a:srgbClr val="7030A0"/>
             </a:solidFill>
             <a:tailEnd type="triangle"/>
           </a:ln>
@@ -11152,7 +11215,7 @@
           </a:prstGeom>
           <a:ln w="12700">
             <a:solidFill>
-              <a:schemeClr val="tx1"/>
+              <a:srgbClr val="7030A0"/>
             </a:solidFill>
             <a:tailEnd type="triangle"/>
           </a:ln>
@@ -11211,135 +11274,6 @@
           </a:fontRef>
         </p:style>
       </p:cxnSp>
-      <p:grpSp>
-        <p:nvGrpSpPr>
-          <p:cNvPr id="95" name="Group 94"/>
-          <p:cNvGrpSpPr/>
-          <p:nvPr/>
-        </p:nvGrpSpPr>
-        <p:grpSpPr>
-          <a:xfrm>
-            <a:off x="8324953" y="1696802"/>
-            <a:ext cx="507476" cy="6872530"/>
-            <a:chOff x="4944353" y="2024407"/>
-            <a:chExt cx="507477" cy="1545997"/>
-          </a:xfrm>
-          <a:solidFill>
-            <a:schemeClr val="bg2"/>
-          </a:solidFill>
-        </p:grpSpPr>
-        <p:sp>
-          <p:nvSpPr>
-            <p:cNvPr id="96" name="Rounded Rectangle 95"/>
-            <p:cNvSpPr/>
-            <p:nvPr/>
-          </p:nvSpPr>
-          <p:spPr>
-            <a:xfrm>
-              <a:off x="4944353" y="2024407"/>
-              <a:ext cx="507477" cy="1545996"/>
-            </a:xfrm>
-            <a:prstGeom prst="roundRect">
-              <a:avLst>
-                <a:gd name="adj" fmla="val 5363"/>
-              </a:avLst>
-            </a:prstGeom>
-            <a:grpFill/>
-            <a:ln>
-              <a:solidFill>
-                <a:schemeClr val="tx1"/>
-              </a:solidFill>
-            </a:ln>
-          </p:spPr>
-          <p:style>
-            <a:lnRef idx="2">
-              <a:schemeClr val="accent1">
-                <a:shade val="50000"/>
-              </a:schemeClr>
-            </a:lnRef>
-            <a:fillRef idx="1">
-              <a:schemeClr val="accent1"/>
-            </a:fillRef>
-            <a:effectRef idx="0">
-              <a:schemeClr val="accent1"/>
-            </a:effectRef>
-            <a:fontRef idx="minor">
-              <a:schemeClr val="lt1"/>
-            </a:fontRef>
-          </p:style>
-          <p:txBody>
-            <a:bodyPr rot="0" spcFirstLastPara="0" vertOverflow="overflow" horzOverflow="overflow" vert="horz" wrap="square" lIns="91440" tIns="45721" rIns="91440" bIns="45721" numCol="1" spcCol="0" rtlCol="0" fromWordArt="0" anchor="ctr" anchorCtr="0" forceAA="0" compatLnSpc="1">
-              <a:prstTxWarp prst="textNoShape">
-                <a:avLst/>
-              </a:prstTxWarp>
-              <a:noAutofit/>
-            </a:bodyPr>
-            <a:lstStyle/>
-            <a:p>
-              <a:pPr algn="ctr"/>
-              <a:r>
-                <a:rPr lang="en-US" sz="1798" dirty="0">
-                  <a:solidFill>
-                    <a:schemeClr val="tx1"/>
-                  </a:solidFill>
-                </a:rPr>
-                <a:t>ID</a:t>
-              </a:r>
-            </a:p>
-          </p:txBody>
-        </p:sp>
-        <p:sp>
-          <p:nvSpPr>
-            <p:cNvPr id="97" name="Isosceles Triangle 96"/>
-            <p:cNvSpPr/>
-            <p:nvPr/>
-          </p:nvSpPr>
-          <p:spPr>
-            <a:xfrm>
-              <a:off x="5094978" y="3534070"/>
-              <a:ext cx="185057" cy="36334"/>
-            </a:xfrm>
-            <a:prstGeom prst="triangle">
-              <a:avLst/>
-            </a:prstGeom>
-            <a:grpFill/>
-            <a:ln>
-              <a:solidFill>
-                <a:schemeClr val="tx1"/>
-              </a:solidFill>
-            </a:ln>
-          </p:spPr>
-          <p:style>
-            <a:lnRef idx="2">
-              <a:schemeClr val="accent1">
-                <a:shade val="50000"/>
-              </a:schemeClr>
-            </a:lnRef>
-            <a:fillRef idx="1">
-              <a:schemeClr val="accent1"/>
-            </a:fillRef>
-            <a:effectRef idx="0">
-              <a:schemeClr val="accent1"/>
-            </a:effectRef>
-            <a:fontRef idx="minor">
-              <a:schemeClr val="lt1"/>
-            </a:fontRef>
-          </p:style>
-          <p:txBody>
-            <a:bodyPr rot="0" spcFirstLastPara="0" vertOverflow="overflow" horzOverflow="overflow" vert="horz" wrap="square" lIns="91440" tIns="45721" rIns="91440" bIns="45721" numCol="1" spcCol="0" rtlCol="0" fromWordArt="0" anchor="ctr" anchorCtr="0" forceAA="0" compatLnSpc="1">
-              <a:prstTxWarp prst="textNoShape">
-                <a:avLst/>
-              </a:prstTxWarp>
-              <a:noAutofit/>
-            </a:bodyPr>
-            <a:lstStyle/>
-            <a:p>
-              <a:pPr algn="ctr"/>
-              <a:endParaRPr lang="en-US" sz="1798"/>
-            </a:p>
-          </p:txBody>
-        </p:sp>
-      </p:grpSp>
       <p:cxnSp>
         <p:nvCxnSpPr>
           <p:cNvPr id="328" name="Straight Arrow Connector 327"/>
@@ -11431,10 +11365,18 @@
           <a:lstStyle/>
           <a:p>
             <a:r>
-              <a:rPr lang="en-US" sz="1600" dirty="0" smtClean="0"/>
+              <a:rPr lang="en-US" sz="1600" dirty="0" smtClean="0">
+                <a:solidFill>
+                  <a:srgbClr val="7030A0"/>
+                </a:solidFill>
+              </a:rPr>
               <a:t>immediate</a:t>
             </a:r>
-            <a:endParaRPr lang="en-US" sz="1600" dirty="0"/>
+            <a:endParaRPr lang="en-US" sz="1600" dirty="0">
+              <a:solidFill>
+                <a:srgbClr val="7030A0"/>
+              </a:solidFill>
+            </a:endParaRPr>
           </a:p>
         </p:txBody>
       </p:sp>
@@ -11482,8 +11424,8 @@
         </p:nvSpPr>
         <p:spPr>
           <a:xfrm>
-            <a:off x="9181324" y="3182197"/>
-            <a:ext cx="373820" cy="307777"/>
+            <a:off x="9181323" y="3182197"/>
+            <a:ext cx="387739" cy="307777"/>
           </a:xfrm>
           <a:prstGeom prst="rect">
             <a:avLst/>
@@ -11491,7 +11433,7 @@
           <a:noFill/>
         </p:spPr>
         <p:txBody>
-          <a:bodyPr wrap="none" rtlCol="0">
+          <a:bodyPr wrap="square" rtlCol="0">
             <a:spAutoFit/>
           </a:bodyPr>
           <a:lstStyle/>
@@ -11854,10 +11796,10 @@
         </p:nvGrpSpPr>
         <p:grpSpPr>
           <a:xfrm>
-            <a:off x="10475239" y="4266653"/>
-            <a:ext cx="782690" cy="1084962"/>
-            <a:chOff x="10474585" y="4146267"/>
-            <a:chExt cx="790450" cy="1171631"/>
+            <a:off x="10480351" y="4266654"/>
+            <a:ext cx="778320" cy="1084962"/>
+            <a:chOff x="10479752" y="4146268"/>
+            <a:chExt cx="786037" cy="1171631"/>
           </a:xfrm>
         </p:grpSpPr>
         <p:grpSp>
@@ -11868,10 +11810,10 @@
           </p:nvGrpSpPr>
           <p:grpSpPr>
             <a:xfrm rot="5400000">
-              <a:off x="10283994" y="4336858"/>
-              <a:ext cx="1171631" cy="790450"/>
-              <a:chOff x="13246100" y="1860782"/>
-              <a:chExt cx="1724765" cy="894744"/>
+              <a:off x="10286955" y="4339065"/>
+              <a:ext cx="1171631" cy="786037"/>
+              <a:chOff x="13246100" y="1859929"/>
+              <a:chExt cx="1724765" cy="889749"/>
             </a:xfrm>
             <a:solidFill>
               <a:schemeClr val="bg1"/>
@@ -11885,7 +11827,7 @@
             </p:nvSpPr>
             <p:spPr>
               <a:xfrm flipH="1">
-                <a:off x="14139639" y="1866630"/>
+                <a:off x="14139639" y="1859929"/>
                 <a:ext cx="831226" cy="888896"/>
               </a:xfrm>
               <a:prstGeom prst="parallelogram">
@@ -12279,8 +12221,8 @@
           </p:nvSpPr>
           <p:spPr>
             <a:xfrm>
-              <a:off x="10725350" y="4574430"/>
-              <a:ext cx="516873" cy="338554"/>
+              <a:off x="10725350" y="4574431"/>
+              <a:ext cx="519128" cy="365598"/>
             </a:xfrm>
             <a:prstGeom prst="rect">
               <a:avLst/>
@@ -12288,7 +12230,7 @@
             <a:noFill/>
           </p:spPr>
           <p:txBody>
-            <a:bodyPr wrap="none" rtlCol="0">
+            <a:bodyPr wrap="square" rtlCol="0">
               <a:spAutoFit/>
             </a:bodyPr>
             <a:lstStyle/>
@@ -12312,11 +12254,13 @@
         </p:nvCxnSpPr>
         <p:spPr>
           <a:xfrm>
-            <a:off x="11257929" y="4819901"/>
-            <a:ext cx="392130" cy="1115772"/>
-          </a:xfrm>
-          <a:prstGeom prst="bentConnector2">
-            <a:avLst/>
+            <a:off x="11257925" y="4819902"/>
+            <a:ext cx="502596" cy="166428"/>
+          </a:xfrm>
+          <a:prstGeom prst="bentConnector3">
+            <a:avLst>
+              <a:gd name="adj1" fmla="val 62129"/>
+            </a:avLst>
           </a:prstGeom>
           <a:ln w="12700">
             <a:solidFill>
@@ -12508,8 +12452,8 @@
         </p:nvCxnSpPr>
         <p:spPr>
           <a:xfrm flipV="1">
-            <a:off x="9955899" y="5155534"/>
-            <a:ext cx="519340" cy="3248"/>
+            <a:off x="9955899" y="5155535"/>
+            <a:ext cx="525198" cy="3247"/>
           </a:xfrm>
           <a:prstGeom prst="straightConnector1">
             <a:avLst/>
@@ -12597,6 +12541,1305 @@
               <a:t>operand_2</a:t>
             </a:r>
             <a:endParaRPr lang="en-US" sz="1200" dirty="0"/>
+          </a:p>
+        </p:txBody>
+      </p:sp>
+      <p:cxnSp>
+        <p:nvCxnSpPr>
+          <p:cNvPr id="412" name="Straight Arrow Connector 411"/>
+          <p:cNvCxnSpPr/>
+          <p:nvPr/>
+        </p:nvCxnSpPr>
+        <p:spPr>
+          <a:xfrm>
+            <a:off x="9443112" y="4619850"/>
+            <a:ext cx="333994" cy="0"/>
+          </a:xfrm>
+          <a:prstGeom prst="straightConnector1">
+            <a:avLst/>
+          </a:prstGeom>
+          <a:ln w="12700">
+            <a:solidFill>
+              <a:schemeClr val="tx1"/>
+            </a:solidFill>
+            <a:tailEnd type="triangle"/>
+          </a:ln>
+        </p:spPr>
+        <p:style>
+          <a:lnRef idx="1">
+            <a:schemeClr val="accent1"/>
+          </a:lnRef>
+          <a:fillRef idx="0">
+            <a:schemeClr val="accent1"/>
+          </a:fillRef>
+          <a:effectRef idx="0">
+            <a:schemeClr val="accent1"/>
+          </a:effectRef>
+          <a:fontRef idx="minor">
+            <a:schemeClr val="tx1"/>
+          </a:fontRef>
+        </p:style>
+      </p:cxnSp>
+      <p:sp>
+        <p:nvSpPr>
+          <p:cNvPr id="413" name="TextBox 412"/>
+          <p:cNvSpPr txBox="1"/>
+          <p:nvPr/>
+        </p:nvSpPr>
+        <p:spPr>
+          <a:xfrm>
+            <a:off x="9385790" y="4378422"/>
+            <a:ext cx="387739" cy="307777"/>
+          </a:xfrm>
+          <a:prstGeom prst="rect">
+            <a:avLst/>
+          </a:prstGeom>
+          <a:noFill/>
+        </p:spPr>
+        <p:txBody>
+          <a:bodyPr wrap="square" rtlCol="0">
+            <a:spAutoFit/>
+          </a:bodyPr>
+          <a:lstStyle/>
+          <a:p>
+            <a:r>
+              <a:rPr lang="en-US" sz="1400" dirty="0" smtClean="0"/>
+              <a:t>PC</a:t>
+            </a:r>
+            <a:endParaRPr lang="en-US" sz="1400" dirty="0"/>
+          </a:p>
+        </p:txBody>
+      </p:sp>
+      <p:cxnSp>
+        <p:nvCxnSpPr>
+          <p:cNvPr id="414" name="Straight Arrow Connector 413"/>
+          <p:cNvCxnSpPr/>
+          <p:nvPr/>
+        </p:nvCxnSpPr>
+        <p:spPr>
+          <a:xfrm>
+            <a:off x="8970020" y="4312372"/>
+            <a:ext cx="798355" cy="0"/>
+          </a:xfrm>
+          <a:prstGeom prst="straightConnector1">
+            <a:avLst/>
+          </a:prstGeom>
+          <a:ln w="12700">
+            <a:solidFill>
+              <a:schemeClr val="tx1"/>
+            </a:solidFill>
+            <a:tailEnd type="triangle"/>
+          </a:ln>
+        </p:spPr>
+        <p:style>
+          <a:lnRef idx="1">
+            <a:schemeClr val="accent1"/>
+          </a:lnRef>
+          <a:fillRef idx="0">
+            <a:schemeClr val="accent1"/>
+          </a:fillRef>
+          <a:effectRef idx="0">
+            <a:schemeClr val="accent1"/>
+          </a:effectRef>
+          <a:fontRef idx="minor">
+            <a:schemeClr val="tx1"/>
+          </a:fontRef>
+        </p:style>
+      </p:cxnSp>
+      <p:sp>
+        <p:nvSpPr>
+          <p:cNvPr id="416" name="TextBox 415"/>
+          <p:cNvSpPr txBox="1"/>
+          <p:nvPr/>
+        </p:nvSpPr>
+        <p:spPr>
+          <a:xfrm>
+            <a:off x="9197841" y="4038439"/>
+            <a:ext cx="495777" cy="307777"/>
+          </a:xfrm>
+          <a:prstGeom prst="rect">
+            <a:avLst/>
+          </a:prstGeom>
+          <a:noFill/>
+        </p:spPr>
+        <p:txBody>
+          <a:bodyPr wrap="none" rtlCol="0">
+            <a:spAutoFit/>
+          </a:bodyPr>
+          <a:lstStyle/>
+          <a:p>
+            <a:r>
+              <a:rPr lang="en-US" sz="1400" dirty="0" smtClean="0"/>
+              <a:t>rs_1</a:t>
+            </a:r>
+            <a:endParaRPr lang="en-US" sz="1400" dirty="0"/>
+          </a:p>
+        </p:txBody>
+      </p:sp>
+      <p:cxnSp>
+        <p:nvCxnSpPr>
+          <p:cNvPr id="418" name="Elbow Connector 417"/>
+          <p:cNvCxnSpPr>
+            <a:stCxn id="421" idx="3"/>
+            <a:endCxn id="400" idx="2"/>
+          </p:cNvCxnSpPr>
+          <p:nvPr/>
+        </p:nvCxnSpPr>
+        <p:spPr>
+          <a:xfrm flipV="1">
+            <a:off x="8730265" y="5158782"/>
+            <a:ext cx="1046548" cy="2603664"/>
+          </a:xfrm>
+          <a:prstGeom prst="bentConnector3">
+            <a:avLst>
+              <a:gd name="adj1" fmla="val 50000"/>
+            </a:avLst>
+          </a:prstGeom>
+          <a:ln w="12700">
+            <a:solidFill>
+              <a:schemeClr val="tx1"/>
+            </a:solidFill>
+            <a:tailEnd type="triangle"/>
+          </a:ln>
+        </p:spPr>
+        <p:style>
+          <a:lnRef idx="1">
+            <a:schemeClr val="accent1"/>
+          </a:lnRef>
+          <a:fillRef idx="0">
+            <a:schemeClr val="accent1"/>
+          </a:fillRef>
+          <a:effectRef idx="0">
+            <a:schemeClr val="accent1"/>
+          </a:effectRef>
+          <a:fontRef idx="minor">
+            <a:schemeClr val="tx1"/>
+          </a:fontRef>
+        </p:style>
+      </p:cxnSp>
+      <p:grpSp>
+        <p:nvGrpSpPr>
+          <p:cNvPr id="95" name="Group 94"/>
+          <p:cNvGrpSpPr/>
+          <p:nvPr/>
+        </p:nvGrpSpPr>
+        <p:grpSpPr>
+          <a:xfrm>
+            <a:off x="8324953" y="1696802"/>
+            <a:ext cx="507476" cy="6872530"/>
+            <a:chOff x="4944353" y="2024407"/>
+            <a:chExt cx="507477" cy="1545997"/>
+          </a:xfrm>
+          <a:solidFill>
+            <a:schemeClr val="bg2"/>
+          </a:solidFill>
+        </p:grpSpPr>
+        <p:sp>
+          <p:nvSpPr>
+            <p:cNvPr id="96" name="Rounded Rectangle 95"/>
+            <p:cNvSpPr/>
+            <p:nvPr/>
+          </p:nvSpPr>
+          <p:spPr>
+            <a:xfrm>
+              <a:off x="4944353" y="2024407"/>
+              <a:ext cx="507477" cy="1545996"/>
+            </a:xfrm>
+            <a:prstGeom prst="roundRect">
+              <a:avLst>
+                <a:gd name="adj" fmla="val 5363"/>
+              </a:avLst>
+            </a:prstGeom>
+            <a:grpFill/>
+            <a:ln>
+              <a:solidFill>
+                <a:schemeClr val="tx1"/>
+              </a:solidFill>
+            </a:ln>
+          </p:spPr>
+          <p:style>
+            <a:lnRef idx="2">
+              <a:schemeClr val="accent1">
+                <a:shade val="50000"/>
+              </a:schemeClr>
+            </a:lnRef>
+            <a:fillRef idx="1">
+              <a:schemeClr val="accent1"/>
+            </a:fillRef>
+            <a:effectRef idx="0">
+              <a:schemeClr val="accent1"/>
+            </a:effectRef>
+            <a:fontRef idx="minor">
+              <a:schemeClr val="lt1"/>
+            </a:fontRef>
+          </p:style>
+          <p:txBody>
+            <a:bodyPr rot="0" spcFirstLastPara="0" vertOverflow="overflow" horzOverflow="overflow" vert="horz" wrap="square" lIns="91440" tIns="45721" rIns="91440" bIns="45721" numCol="1" spcCol="0" rtlCol="0" fromWordArt="0" anchor="ctr" anchorCtr="0" forceAA="0" compatLnSpc="1">
+              <a:prstTxWarp prst="textNoShape">
+                <a:avLst/>
+              </a:prstTxWarp>
+              <a:noAutofit/>
+            </a:bodyPr>
+            <a:lstStyle/>
+            <a:p>
+              <a:pPr algn="ctr"/>
+              <a:r>
+                <a:rPr lang="en-US" sz="1798" dirty="0">
+                  <a:solidFill>
+                    <a:schemeClr val="tx1"/>
+                  </a:solidFill>
+                </a:rPr>
+                <a:t>ID</a:t>
+              </a:r>
+            </a:p>
+          </p:txBody>
+        </p:sp>
+        <p:sp>
+          <p:nvSpPr>
+            <p:cNvPr id="97" name="Isosceles Triangle 96"/>
+            <p:cNvSpPr/>
+            <p:nvPr/>
+          </p:nvSpPr>
+          <p:spPr>
+            <a:xfrm>
+              <a:off x="5094978" y="3534070"/>
+              <a:ext cx="185057" cy="36334"/>
+            </a:xfrm>
+            <a:prstGeom prst="triangle">
+              <a:avLst/>
+            </a:prstGeom>
+            <a:grpFill/>
+            <a:ln>
+              <a:solidFill>
+                <a:schemeClr val="tx1"/>
+              </a:solidFill>
+            </a:ln>
+          </p:spPr>
+          <p:style>
+            <a:lnRef idx="2">
+              <a:schemeClr val="accent1">
+                <a:shade val="50000"/>
+              </a:schemeClr>
+            </a:lnRef>
+            <a:fillRef idx="1">
+              <a:schemeClr val="accent1"/>
+            </a:fillRef>
+            <a:effectRef idx="0">
+              <a:schemeClr val="accent1"/>
+            </a:effectRef>
+            <a:fontRef idx="minor">
+              <a:schemeClr val="lt1"/>
+            </a:fontRef>
+          </p:style>
+          <p:txBody>
+            <a:bodyPr rot="0" spcFirstLastPara="0" vertOverflow="overflow" horzOverflow="overflow" vert="horz" wrap="square" lIns="91440" tIns="45721" rIns="91440" bIns="45721" numCol="1" spcCol="0" rtlCol="0" fromWordArt="0" anchor="ctr" anchorCtr="0" forceAA="0" compatLnSpc="1">
+              <a:prstTxWarp prst="textNoShape">
+                <a:avLst/>
+              </a:prstTxWarp>
+              <a:noAutofit/>
+            </a:bodyPr>
+            <a:lstStyle/>
+            <a:p>
+              <a:pPr algn="ctr"/>
+              <a:endParaRPr lang="en-US" sz="1798"/>
+            </a:p>
+          </p:txBody>
+        </p:sp>
+      </p:grpSp>
+      <p:sp>
+        <p:nvSpPr>
+          <p:cNvPr id="424" name="TextBox 423"/>
+          <p:cNvSpPr txBox="1"/>
+          <p:nvPr/>
+        </p:nvSpPr>
+        <p:spPr>
+          <a:xfrm>
+            <a:off x="9266208" y="4897116"/>
+            <a:ext cx="495777" cy="307777"/>
+          </a:xfrm>
+          <a:prstGeom prst="rect">
+            <a:avLst/>
+          </a:prstGeom>
+          <a:noFill/>
+        </p:spPr>
+        <p:txBody>
+          <a:bodyPr wrap="none" rtlCol="0">
+            <a:spAutoFit/>
+          </a:bodyPr>
+          <a:lstStyle/>
+          <a:p>
+            <a:r>
+              <a:rPr lang="en-US" sz="1400" dirty="0" smtClean="0"/>
+              <a:t>rs_2</a:t>
+            </a:r>
+            <a:endParaRPr lang="en-US" sz="1400" dirty="0"/>
+          </a:p>
+        </p:txBody>
+      </p:sp>
+      <p:cxnSp>
+        <p:nvCxnSpPr>
+          <p:cNvPr id="426" name="Elbow Connector 425"/>
+          <p:cNvCxnSpPr/>
+          <p:nvPr/>
+        </p:nvCxnSpPr>
+        <p:spPr>
+          <a:xfrm rot="16200000" flipH="1">
+            <a:off x="8235811" y="3425688"/>
+            <a:ext cx="2354737" cy="721038"/>
+          </a:xfrm>
+          <a:prstGeom prst="bentConnector3">
+            <a:avLst>
+              <a:gd name="adj1" fmla="val 100063"/>
+            </a:avLst>
+          </a:prstGeom>
+          <a:ln w="12700">
+            <a:solidFill>
+              <a:srgbClr val="7030A0"/>
+            </a:solidFill>
+            <a:tailEnd type="triangle"/>
+          </a:ln>
+        </p:spPr>
+        <p:style>
+          <a:lnRef idx="1">
+            <a:schemeClr val="accent1"/>
+          </a:lnRef>
+          <a:fillRef idx="0">
+            <a:schemeClr val="accent1"/>
+          </a:fillRef>
+          <a:effectRef idx="0">
+            <a:schemeClr val="accent1"/>
+          </a:effectRef>
+          <a:fontRef idx="minor">
+            <a:schemeClr val="tx1"/>
+          </a:fontRef>
+        </p:style>
+      </p:cxnSp>
+      <p:sp>
+        <p:nvSpPr>
+          <p:cNvPr id="431" name="TextBox 430"/>
+          <p:cNvSpPr txBox="1"/>
+          <p:nvPr/>
+        </p:nvSpPr>
+        <p:spPr>
+          <a:xfrm>
+            <a:off x="9064532" y="4710113"/>
+            <a:ext cx="801823" cy="261610"/>
+          </a:xfrm>
+          <a:prstGeom prst="rect">
+            <a:avLst/>
+          </a:prstGeom>
+          <a:noFill/>
+        </p:spPr>
+        <p:txBody>
+          <a:bodyPr wrap="none" rtlCol="0">
+            <a:spAutoFit/>
+          </a:bodyPr>
+          <a:lstStyle/>
+          <a:p>
+            <a:r>
+              <a:rPr lang="en-US" sz="1100" dirty="0" smtClean="0">
+                <a:solidFill>
+                  <a:srgbClr val="7030A0"/>
+                </a:solidFill>
+              </a:rPr>
+              <a:t>immediate</a:t>
+            </a:r>
+            <a:endParaRPr lang="en-US" sz="1100" dirty="0">
+              <a:solidFill>
+                <a:srgbClr val="7030A0"/>
+              </a:solidFill>
+            </a:endParaRPr>
+          </a:p>
+        </p:txBody>
+      </p:sp>
+      <p:cxnSp>
+        <p:nvCxnSpPr>
+          <p:cNvPr id="432" name="Straight Arrow Connector 431"/>
+          <p:cNvCxnSpPr/>
+          <p:nvPr/>
+        </p:nvCxnSpPr>
+        <p:spPr>
+          <a:xfrm>
+            <a:off x="9434605" y="5366768"/>
+            <a:ext cx="333994" cy="0"/>
+          </a:xfrm>
+          <a:prstGeom prst="straightConnector1">
+            <a:avLst/>
+          </a:prstGeom>
+          <a:ln w="12700">
+            <a:solidFill>
+              <a:schemeClr val="tx1"/>
+            </a:solidFill>
+            <a:tailEnd type="triangle"/>
+          </a:ln>
+        </p:spPr>
+        <p:style>
+          <a:lnRef idx="1">
+            <a:schemeClr val="accent1"/>
+          </a:lnRef>
+          <a:fillRef idx="0">
+            <a:schemeClr val="accent1"/>
+          </a:fillRef>
+          <a:effectRef idx="0">
+            <a:schemeClr val="accent1"/>
+          </a:effectRef>
+          <a:fontRef idx="minor">
+            <a:schemeClr val="tx1"/>
+          </a:fontRef>
+        </p:style>
+      </p:cxnSp>
+      <p:sp>
+        <p:nvSpPr>
+          <p:cNvPr id="433" name="TextBox 432"/>
+          <p:cNvSpPr txBox="1"/>
+          <p:nvPr/>
+        </p:nvSpPr>
+        <p:spPr>
+          <a:xfrm>
+            <a:off x="9233206" y="5131315"/>
+            <a:ext cx="626736" cy="276999"/>
+          </a:xfrm>
+          <a:prstGeom prst="rect">
+            <a:avLst/>
+          </a:prstGeom>
+          <a:noFill/>
+        </p:spPr>
+        <p:txBody>
+          <a:bodyPr wrap="square" rtlCol="0">
+            <a:spAutoFit/>
+          </a:bodyPr>
+          <a:lstStyle/>
+          <a:p>
+            <a:r>
+              <a:rPr lang="en-US" sz="1200" dirty="0" smtClean="0"/>
+              <a:t>32’d4</a:t>
+            </a:r>
+            <a:endParaRPr lang="en-US" sz="1200" dirty="0"/>
+          </a:p>
+        </p:txBody>
+      </p:sp>
+      <p:sp>
+        <p:nvSpPr>
+          <p:cNvPr id="438" name="Rounded Rectangle 437"/>
+          <p:cNvSpPr/>
+          <p:nvPr/>
+        </p:nvSpPr>
+        <p:spPr>
+          <a:xfrm>
+            <a:off x="9475166" y="5949079"/>
+            <a:ext cx="2016738" cy="979983"/>
+          </a:xfrm>
+          <a:prstGeom prst="roundRect">
+            <a:avLst>
+              <a:gd name="adj" fmla="val 5363"/>
+            </a:avLst>
+          </a:prstGeom>
+          <a:solidFill>
+            <a:schemeClr val="bg1"/>
+          </a:solidFill>
+          <a:ln>
+            <a:solidFill>
+              <a:schemeClr val="tx1"/>
+            </a:solidFill>
+            <a:prstDash val="dash"/>
+          </a:ln>
+        </p:spPr>
+        <p:style>
+          <a:lnRef idx="2">
+            <a:schemeClr val="accent1">
+              <a:shade val="50000"/>
+            </a:schemeClr>
+          </a:lnRef>
+          <a:fillRef idx="1">
+            <a:schemeClr val="accent1"/>
+          </a:fillRef>
+          <a:effectRef idx="0">
+            <a:schemeClr val="accent1"/>
+          </a:effectRef>
+          <a:fontRef idx="minor">
+            <a:schemeClr val="lt1"/>
+          </a:fontRef>
+        </p:style>
+        <p:txBody>
+          <a:bodyPr rot="0" spcFirstLastPara="0" vertOverflow="overflow" horzOverflow="overflow" vert="horz" wrap="square" lIns="91440" tIns="45721" rIns="91440" bIns="45721" numCol="1" spcCol="0" rtlCol="0" fromWordArt="0" anchor="ctr" anchorCtr="0" forceAA="0" compatLnSpc="1">
+            <a:prstTxWarp prst="textNoShape">
+              <a:avLst/>
+            </a:prstTxWarp>
+            <a:noAutofit/>
+          </a:bodyPr>
+          <a:lstStyle/>
+          <a:p>
+            <a:pPr algn="ctr"/>
+            <a:r>
+              <a:rPr lang="en-US" sz="1798" dirty="0" smtClean="0">
+                <a:solidFill>
+                  <a:schemeClr val="tx1"/>
+                </a:solidFill>
+              </a:rPr>
+              <a:t>Jump Branch Unit</a:t>
+            </a:r>
+            <a:endParaRPr lang="en-US" sz="1798" dirty="0">
+              <a:solidFill>
+                <a:schemeClr val="tx1"/>
+              </a:solidFill>
+            </a:endParaRPr>
+          </a:p>
+        </p:txBody>
+      </p:sp>
+      <p:grpSp>
+        <p:nvGrpSpPr>
+          <p:cNvPr id="440" name="Group 439"/>
+          <p:cNvGrpSpPr/>
+          <p:nvPr/>
+        </p:nvGrpSpPr>
+        <p:grpSpPr>
+          <a:xfrm>
+            <a:off x="10171796" y="5566993"/>
+            <a:ext cx="306672" cy="375954"/>
+            <a:chOff x="10171796" y="3569296"/>
+            <a:chExt cx="306672" cy="375954"/>
+          </a:xfrm>
+        </p:grpSpPr>
+        <p:cxnSp>
+          <p:nvCxnSpPr>
+            <p:cNvPr id="441" name="Straight Arrow Connector 440"/>
+            <p:cNvCxnSpPr/>
+            <p:nvPr/>
+          </p:nvCxnSpPr>
+          <p:spPr>
+            <a:xfrm>
+              <a:off x="10478468" y="3572605"/>
+              <a:ext cx="0" cy="372645"/>
+            </a:xfrm>
+            <a:prstGeom prst="straightConnector1">
+              <a:avLst/>
+            </a:prstGeom>
+            <a:ln w="12700">
+              <a:solidFill>
+                <a:schemeClr val="tx1"/>
+              </a:solidFill>
+              <a:tailEnd type="triangle"/>
+            </a:ln>
+          </p:spPr>
+          <p:style>
+            <a:lnRef idx="1">
+              <a:schemeClr val="accent1"/>
+            </a:lnRef>
+            <a:fillRef idx="0">
+              <a:schemeClr val="accent1"/>
+            </a:fillRef>
+            <a:effectRef idx="0">
+              <a:schemeClr val="accent1"/>
+            </a:effectRef>
+            <a:fontRef idx="minor">
+              <a:schemeClr val="tx1"/>
+            </a:fontRef>
+          </p:style>
+        </p:cxnSp>
+        <p:cxnSp>
+          <p:nvCxnSpPr>
+            <p:cNvPr id="442" name="Straight Arrow Connector 441"/>
+            <p:cNvCxnSpPr/>
+            <p:nvPr/>
+          </p:nvCxnSpPr>
+          <p:spPr>
+            <a:xfrm>
+              <a:off x="10328679" y="3571702"/>
+              <a:ext cx="0" cy="372645"/>
+            </a:xfrm>
+            <a:prstGeom prst="straightConnector1">
+              <a:avLst/>
+            </a:prstGeom>
+            <a:ln w="12700">
+              <a:solidFill>
+                <a:schemeClr val="tx1"/>
+              </a:solidFill>
+              <a:tailEnd type="triangle"/>
+            </a:ln>
+          </p:spPr>
+          <p:style>
+            <a:lnRef idx="1">
+              <a:schemeClr val="accent1"/>
+            </a:lnRef>
+            <a:fillRef idx="0">
+              <a:schemeClr val="accent1"/>
+            </a:fillRef>
+            <a:effectRef idx="0">
+              <a:schemeClr val="accent1"/>
+            </a:effectRef>
+            <a:fontRef idx="minor">
+              <a:schemeClr val="tx1"/>
+            </a:fontRef>
+          </p:style>
+        </p:cxnSp>
+        <p:cxnSp>
+          <p:nvCxnSpPr>
+            <p:cNvPr id="443" name="Straight Arrow Connector 442"/>
+            <p:cNvCxnSpPr/>
+            <p:nvPr/>
+          </p:nvCxnSpPr>
+          <p:spPr>
+            <a:xfrm>
+              <a:off x="10171796" y="3569296"/>
+              <a:ext cx="0" cy="372645"/>
+            </a:xfrm>
+            <a:prstGeom prst="straightConnector1">
+              <a:avLst/>
+            </a:prstGeom>
+            <a:ln w="12700">
+              <a:solidFill>
+                <a:schemeClr val="tx1"/>
+              </a:solidFill>
+              <a:tailEnd type="triangle"/>
+            </a:ln>
+          </p:spPr>
+          <p:style>
+            <a:lnRef idx="1">
+              <a:schemeClr val="accent1"/>
+            </a:lnRef>
+            <a:fillRef idx="0">
+              <a:schemeClr val="accent1"/>
+            </a:fillRef>
+            <a:effectRef idx="0">
+              <a:schemeClr val="accent1"/>
+            </a:effectRef>
+            <a:fontRef idx="minor">
+              <a:schemeClr val="tx1"/>
+            </a:fontRef>
+          </p:style>
+        </p:cxnSp>
+      </p:grpSp>
+      <p:cxnSp>
+        <p:nvCxnSpPr>
+          <p:cNvPr id="457" name="Straight Arrow Connector 456"/>
+          <p:cNvCxnSpPr/>
+          <p:nvPr/>
+        </p:nvCxnSpPr>
+        <p:spPr>
+          <a:xfrm>
+            <a:off x="9266208" y="6707723"/>
+            <a:ext cx="208958" cy="0"/>
+          </a:xfrm>
+          <a:prstGeom prst="straightConnector1">
+            <a:avLst/>
+          </a:prstGeom>
+          <a:ln w="12700">
+            <a:solidFill>
+              <a:schemeClr val="tx1"/>
+            </a:solidFill>
+            <a:tailEnd type="triangle"/>
+          </a:ln>
+        </p:spPr>
+        <p:style>
+          <a:lnRef idx="1">
+            <a:schemeClr val="accent1"/>
+          </a:lnRef>
+          <a:fillRef idx="0">
+            <a:schemeClr val="accent1"/>
+          </a:fillRef>
+          <a:effectRef idx="0">
+            <a:schemeClr val="accent1"/>
+          </a:effectRef>
+          <a:fontRef idx="minor">
+            <a:schemeClr val="tx1"/>
+          </a:fontRef>
+        </p:style>
+      </p:cxnSp>
+      <p:cxnSp>
+        <p:nvCxnSpPr>
+          <p:cNvPr id="459" name="Straight Arrow Connector 458"/>
+          <p:cNvCxnSpPr/>
+          <p:nvPr/>
+        </p:nvCxnSpPr>
+        <p:spPr>
+          <a:xfrm>
+            <a:off x="8970020" y="6123955"/>
+            <a:ext cx="505146" cy="0"/>
+          </a:xfrm>
+          <a:prstGeom prst="straightConnector1">
+            <a:avLst/>
+          </a:prstGeom>
+          <a:ln w="12700">
+            <a:solidFill>
+              <a:schemeClr val="tx1"/>
+            </a:solidFill>
+            <a:tailEnd type="triangle"/>
+          </a:ln>
+        </p:spPr>
+        <p:style>
+          <a:lnRef idx="1">
+            <a:schemeClr val="accent1"/>
+          </a:lnRef>
+          <a:fillRef idx="0">
+            <a:schemeClr val="accent1"/>
+          </a:fillRef>
+          <a:effectRef idx="0">
+            <a:schemeClr val="accent1"/>
+          </a:effectRef>
+          <a:fontRef idx="minor">
+            <a:schemeClr val="tx1"/>
+          </a:fontRef>
+        </p:style>
+      </p:cxnSp>
+      <p:cxnSp>
+        <p:nvCxnSpPr>
+          <p:cNvPr id="461" name="Straight Arrow Connector 460"/>
+          <p:cNvCxnSpPr>
+            <a:stCxn id="438" idx="3"/>
+          </p:cNvCxnSpPr>
+          <p:nvPr/>
+        </p:nvCxnSpPr>
+        <p:spPr>
+          <a:xfrm flipV="1">
+            <a:off x="11491904" y="6436009"/>
+            <a:ext cx="627765" cy="3062"/>
+          </a:xfrm>
+          <a:prstGeom prst="straightConnector1">
+            <a:avLst/>
+          </a:prstGeom>
+          <a:ln w="12700">
+            <a:solidFill>
+              <a:schemeClr val="tx1"/>
+            </a:solidFill>
+            <a:tailEnd type="triangle"/>
+          </a:ln>
+        </p:spPr>
+        <p:style>
+          <a:lnRef idx="1">
+            <a:schemeClr val="accent1"/>
+          </a:lnRef>
+          <a:fillRef idx="0">
+            <a:schemeClr val="accent1"/>
+          </a:fillRef>
+          <a:effectRef idx="0">
+            <a:schemeClr val="accent1"/>
+          </a:effectRef>
+          <a:fontRef idx="minor">
+            <a:schemeClr val="tx1"/>
+          </a:fontRef>
+        </p:style>
+      </p:cxnSp>
+      <p:sp>
+        <p:nvSpPr>
+          <p:cNvPr id="464" name="TextBox 463"/>
+          <p:cNvSpPr txBox="1"/>
+          <p:nvPr/>
+        </p:nvSpPr>
+        <p:spPr>
+          <a:xfrm>
+            <a:off x="9160688" y="8147734"/>
+            <a:ext cx="1562544" cy="338554"/>
+          </a:xfrm>
+          <a:prstGeom prst="rect">
+            <a:avLst/>
+          </a:prstGeom>
+          <a:noFill/>
+        </p:spPr>
+        <p:txBody>
+          <a:bodyPr wrap="none" rtlCol="0">
+            <a:spAutoFit/>
+          </a:bodyPr>
+          <a:lstStyle/>
+          <a:p>
+            <a:r>
+              <a:rPr lang="en-US" sz="1600" dirty="0"/>
+              <a:t>i</a:t>
+            </a:r>
+            <a:r>
+              <a:rPr lang="en-US" sz="1600" dirty="0" smtClean="0"/>
+              <a:t>nstruction_type</a:t>
+            </a:r>
+            <a:endParaRPr lang="en-US" sz="1600" dirty="0"/>
+          </a:p>
+        </p:txBody>
+      </p:sp>
+      <p:cxnSp>
+        <p:nvCxnSpPr>
+          <p:cNvPr id="466" name="Elbow Connector 465"/>
+          <p:cNvCxnSpPr>
+            <a:stCxn id="464" idx="1"/>
+          </p:cNvCxnSpPr>
+          <p:nvPr/>
+        </p:nvCxnSpPr>
+        <p:spPr>
+          <a:xfrm rot="10800000" flipH="1">
+            <a:off x="9160687" y="6917347"/>
+            <a:ext cx="578765" cy="1399665"/>
+          </a:xfrm>
+          <a:prstGeom prst="bentConnector4">
+            <a:avLst>
+              <a:gd name="adj1" fmla="val -21066"/>
+              <a:gd name="adj2" fmla="val 86534"/>
+            </a:avLst>
+          </a:prstGeom>
+          <a:ln w="12700">
+            <a:solidFill>
+              <a:schemeClr val="tx1"/>
+            </a:solidFill>
+            <a:tailEnd type="triangle"/>
+          </a:ln>
+        </p:spPr>
+        <p:style>
+          <a:lnRef idx="1">
+            <a:schemeClr val="accent1"/>
+          </a:lnRef>
+          <a:fillRef idx="0">
+            <a:schemeClr val="accent1"/>
+          </a:fillRef>
+          <a:effectRef idx="0">
+            <a:schemeClr val="accent1"/>
+          </a:effectRef>
+          <a:fontRef idx="minor">
+            <a:schemeClr val="tx1"/>
+          </a:fontRef>
+        </p:style>
+      </p:cxnSp>
+      <p:sp>
+        <p:nvSpPr>
+          <p:cNvPr id="470" name="Trapezoid 469"/>
+          <p:cNvSpPr/>
+          <p:nvPr/>
+        </p:nvSpPr>
+        <p:spPr>
+          <a:xfrm rot="5400000">
+            <a:off x="11580417" y="5049125"/>
+            <a:ext cx="539293" cy="179086"/>
+          </a:xfrm>
+          <a:prstGeom prst="trapezoid">
+            <a:avLst>
+              <a:gd name="adj" fmla="val 50716"/>
+            </a:avLst>
+          </a:prstGeom>
+          <a:solidFill>
+            <a:schemeClr val="bg1"/>
+          </a:solidFill>
+          <a:ln>
+            <a:solidFill>
+              <a:schemeClr val="tx1"/>
+            </a:solidFill>
+          </a:ln>
+        </p:spPr>
+        <p:style>
+          <a:lnRef idx="2">
+            <a:schemeClr val="accent1">
+              <a:shade val="50000"/>
+            </a:schemeClr>
+          </a:lnRef>
+          <a:fillRef idx="1">
+            <a:schemeClr val="accent1"/>
+          </a:fillRef>
+          <a:effectRef idx="0">
+            <a:schemeClr val="accent1"/>
+          </a:effectRef>
+          <a:fontRef idx="minor">
+            <a:schemeClr val="lt1"/>
+          </a:fontRef>
+        </p:style>
+        <p:txBody>
+          <a:bodyPr rot="0" spcFirstLastPara="0" vertOverflow="overflow" horzOverflow="overflow" vert="horz" wrap="square" lIns="91440" tIns="45721" rIns="91440" bIns="45721" numCol="1" spcCol="0" rtlCol="0" fromWordArt="0" anchor="ctr" anchorCtr="0" forceAA="0" compatLnSpc="1">
+            <a:prstTxWarp prst="textNoShape">
+              <a:avLst/>
+            </a:prstTxWarp>
+            <a:noAutofit/>
+          </a:bodyPr>
+          <a:lstStyle/>
+          <a:p>
+            <a:pPr algn="ctr"/>
+            <a:endParaRPr lang="en-US" sz="1798" dirty="0">
+              <a:solidFill>
+                <a:sysClr val="windowText" lastClr="000000"/>
+              </a:solidFill>
+            </a:endParaRPr>
+          </a:p>
+        </p:txBody>
+      </p:sp>
+      <p:cxnSp>
+        <p:nvCxnSpPr>
+          <p:cNvPr id="474" name="Straight Arrow Connector 473"/>
+          <p:cNvCxnSpPr>
+            <a:stCxn id="470" idx="0"/>
+            <a:endCxn id="164" idx="1"/>
+          </p:cNvCxnSpPr>
+          <p:nvPr/>
+        </p:nvCxnSpPr>
+        <p:spPr>
+          <a:xfrm flipV="1">
+            <a:off x="11939607" y="5131346"/>
+            <a:ext cx="193695" cy="7323"/>
+          </a:xfrm>
+          <a:prstGeom prst="straightConnector1">
+            <a:avLst/>
+          </a:prstGeom>
+          <a:ln w="12700">
+            <a:solidFill>
+              <a:schemeClr val="tx1"/>
+            </a:solidFill>
+            <a:tailEnd type="triangle"/>
+          </a:ln>
+        </p:spPr>
+        <p:style>
+          <a:lnRef idx="1">
+            <a:schemeClr val="accent1"/>
+          </a:lnRef>
+          <a:fillRef idx="0">
+            <a:schemeClr val="accent1"/>
+          </a:fillRef>
+          <a:effectRef idx="0">
+            <a:schemeClr val="accent1"/>
+          </a:effectRef>
+          <a:fontRef idx="minor">
+            <a:schemeClr val="tx1"/>
+          </a:fontRef>
+        </p:style>
+      </p:cxnSp>
+      <p:sp>
+        <p:nvSpPr>
+          <p:cNvPr id="479" name="Rounded Rectangle 478"/>
+          <p:cNvSpPr/>
+          <p:nvPr/>
+        </p:nvSpPr>
+        <p:spPr>
+          <a:xfrm>
+            <a:off x="9473827" y="7297944"/>
+            <a:ext cx="2016738" cy="717717"/>
+          </a:xfrm>
+          <a:prstGeom prst="roundRect">
+            <a:avLst>
+              <a:gd name="adj" fmla="val 5363"/>
+            </a:avLst>
+          </a:prstGeom>
+          <a:solidFill>
+            <a:schemeClr val="bg1"/>
+          </a:solidFill>
+          <a:ln>
+            <a:solidFill>
+              <a:schemeClr val="tx1"/>
+            </a:solidFill>
+            <a:prstDash val="dash"/>
+          </a:ln>
+        </p:spPr>
+        <p:style>
+          <a:lnRef idx="2">
+            <a:schemeClr val="accent1">
+              <a:shade val="50000"/>
+            </a:schemeClr>
+          </a:lnRef>
+          <a:fillRef idx="1">
+            <a:schemeClr val="accent1"/>
+          </a:fillRef>
+          <a:effectRef idx="0">
+            <a:schemeClr val="accent1"/>
+          </a:effectRef>
+          <a:fontRef idx="minor">
+            <a:schemeClr val="lt1"/>
+          </a:fontRef>
+        </p:style>
+        <p:txBody>
+          <a:bodyPr rot="0" spcFirstLastPara="0" vertOverflow="overflow" horzOverflow="overflow" vert="horz" wrap="square" lIns="91440" tIns="45721" rIns="91440" bIns="45721" numCol="1" spcCol="0" rtlCol="0" fromWordArt="0" anchor="ctr" anchorCtr="0" forceAA="0" compatLnSpc="1">
+            <a:prstTxWarp prst="textNoShape">
+              <a:avLst/>
+            </a:prstTxWarp>
+            <a:noAutofit/>
+          </a:bodyPr>
+          <a:lstStyle/>
+          <a:p>
+            <a:pPr algn="ctr"/>
+            <a:r>
+              <a:rPr lang="en-US" sz="1600" dirty="0" smtClean="0">
+                <a:solidFill>
+                  <a:schemeClr val="tx1"/>
+                </a:solidFill>
+              </a:rPr>
+              <a:t>Additional EXEC Unit (MUL/DIV/FPU)</a:t>
+            </a:r>
+            <a:endParaRPr lang="en-US" sz="1600" dirty="0">
+              <a:solidFill>
+                <a:schemeClr val="tx1"/>
+              </a:solidFill>
+            </a:endParaRPr>
+          </a:p>
+        </p:txBody>
+      </p:sp>
+      <p:cxnSp>
+        <p:nvCxnSpPr>
+          <p:cNvPr id="483" name="Elbow Connector 482"/>
+          <p:cNvCxnSpPr>
+            <a:stCxn id="479" idx="3"/>
+            <a:endCxn id="470" idx="2"/>
+          </p:cNvCxnSpPr>
+          <p:nvPr/>
+        </p:nvCxnSpPr>
+        <p:spPr>
+          <a:xfrm flipV="1">
+            <a:off x="11490565" y="5138669"/>
+            <a:ext cx="269956" cy="2518134"/>
+          </a:xfrm>
+          <a:prstGeom prst="bentConnector3">
+            <a:avLst>
+              <a:gd name="adj1" fmla="val 50000"/>
+            </a:avLst>
+          </a:prstGeom>
+          <a:ln w="12700">
+            <a:solidFill>
+              <a:schemeClr val="tx1"/>
+            </a:solidFill>
+            <a:tailEnd type="triangle"/>
+          </a:ln>
+        </p:spPr>
+        <p:style>
+          <a:lnRef idx="1">
+            <a:schemeClr val="accent1"/>
+          </a:lnRef>
+          <a:fillRef idx="0">
+            <a:schemeClr val="accent1"/>
+          </a:fillRef>
+          <a:effectRef idx="0">
+            <a:schemeClr val="accent1"/>
+          </a:effectRef>
+          <a:fontRef idx="minor">
+            <a:schemeClr val="tx1"/>
+          </a:fontRef>
+        </p:style>
+      </p:cxnSp>
+      <p:grpSp>
+        <p:nvGrpSpPr>
+          <p:cNvPr id="489" name="Group 488"/>
+          <p:cNvGrpSpPr/>
+          <p:nvPr/>
+        </p:nvGrpSpPr>
+        <p:grpSpPr>
+          <a:xfrm>
+            <a:off x="10203810" y="6922893"/>
+            <a:ext cx="306672" cy="375954"/>
+            <a:chOff x="10171796" y="3569296"/>
+            <a:chExt cx="306672" cy="375954"/>
+          </a:xfrm>
+        </p:grpSpPr>
+        <p:cxnSp>
+          <p:nvCxnSpPr>
+            <p:cNvPr id="490" name="Straight Arrow Connector 489"/>
+            <p:cNvCxnSpPr/>
+            <p:nvPr/>
+          </p:nvCxnSpPr>
+          <p:spPr>
+            <a:xfrm>
+              <a:off x="10478468" y="3572605"/>
+              <a:ext cx="0" cy="372645"/>
+            </a:xfrm>
+            <a:prstGeom prst="straightConnector1">
+              <a:avLst/>
+            </a:prstGeom>
+            <a:ln w="12700">
+              <a:solidFill>
+                <a:schemeClr val="tx1"/>
+              </a:solidFill>
+              <a:tailEnd type="triangle"/>
+            </a:ln>
+          </p:spPr>
+          <p:style>
+            <a:lnRef idx="1">
+              <a:schemeClr val="accent1"/>
+            </a:lnRef>
+            <a:fillRef idx="0">
+              <a:schemeClr val="accent1"/>
+            </a:fillRef>
+            <a:effectRef idx="0">
+              <a:schemeClr val="accent1"/>
+            </a:effectRef>
+            <a:fontRef idx="minor">
+              <a:schemeClr val="tx1"/>
+            </a:fontRef>
+          </p:style>
+        </p:cxnSp>
+        <p:cxnSp>
+          <p:nvCxnSpPr>
+            <p:cNvPr id="491" name="Straight Arrow Connector 490"/>
+            <p:cNvCxnSpPr/>
+            <p:nvPr/>
+          </p:nvCxnSpPr>
+          <p:spPr>
+            <a:xfrm>
+              <a:off x="10328679" y="3571702"/>
+              <a:ext cx="0" cy="372645"/>
+            </a:xfrm>
+            <a:prstGeom prst="straightConnector1">
+              <a:avLst/>
+            </a:prstGeom>
+            <a:ln w="12700">
+              <a:solidFill>
+                <a:schemeClr val="tx1"/>
+              </a:solidFill>
+              <a:tailEnd type="triangle"/>
+            </a:ln>
+          </p:spPr>
+          <p:style>
+            <a:lnRef idx="1">
+              <a:schemeClr val="accent1"/>
+            </a:lnRef>
+            <a:fillRef idx="0">
+              <a:schemeClr val="accent1"/>
+            </a:fillRef>
+            <a:effectRef idx="0">
+              <a:schemeClr val="accent1"/>
+            </a:effectRef>
+            <a:fontRef idx="minor">
+              <a:schemeClr val="tx1"/>
+            </a:fontRef>
+          </p:style>
+        </p:cxnSp>
+        <p:cxnSp>
+          <p:nvCxnSpPr>
+            <p:cNvPr id="492" name="Straight Arrow Connector 491"/>
+            <p:cNvCxnSpPr/>
+            <p:nvPr/>
+          </p:nvCxnSpPr>
+          <p:spPr>
+            <a:xfrm>
+              <a:off x="10171796" y="3569296"/>
+              <a:ext cx="0" cy="372645"/>
+            </a:xfrm>
+            <a:prstGeom prst="straightConnector1">
+              <a:avLst/>
+            </a:prstGeom>
+            <a:ln w="12700">
+              <a:solidFill>
+                <a:schemeClr val="tx1"/>
+              </a:solidFill>
+              <a:tailEnd type="triangle"/>
+            </a:ln>
+          </p:spPr>
+          <p:style>
+            <a:lnRef idx="1">
+              <a:schemeClr val="accent1"/>
+            </a:lnRef>
+            <a:fillRef idx="0">
+              <a:schemeClr val="accent1"/>
+            </a:fillRef>
+            <a:effectRef idx="0">
+              <a:schemeClr val="accent1"/>
+            </a:effectRef>
+            <a:fontRef idx="minor">
+              <a:schemeClr val="tx1"/>
+            </a:fontRef>
+          </p:style>
+        </p:cxnSp>
+      </p:grpSp>
+      <p:sp>
+        <p:nvSpPr>
+          <p:cNvPr id="501" name="TextBox 500"/>
+          <p:cNvSpPr txBox="1"/>
+          <p:nvPr/>
+        </p:nvSpPr>
+        <p:spPr>
+          <a:xfrm rot="16200000">
+            <a:off x="11349263" y="5699178"/>
+            <a:ext cx="1058034" cy="461665"/>
+          </a:xfrm>
+          <a:prstGeom prst="rect">
+            <a:avLst/>
+          </a:prstGeom>
+          <a:noFill/>
+        </p:spPr>
+        <p:txBody>
+          <a:bodyPr wrap="square" rtlCol="0">
+            <a:spAutoFit/>
+          </a:bodyPr>
+          <a:lstStyle/>
+          <a:p>
+            <a:r>
+              <a:rPr lang="en-US" sz="1200" dirty="0" smtClean="0"/>
+              <a:t>jump_branch_enable</a:t>
+            </a:r>
+            <a:endParaRPr lang="en-US" sz="1200" dirty="0"/>
+          </a:p>
+        </p:txBody>
+      </p:sp>
+      <p:sp>
+        <p:nvSpPr>
+          <p:cNvPr id="502" name="Rounded Rectangle 501"/>
+          <p:cNvSpPr/>
+          <p:nvPr/>
+        </p:nvSpPr>
+        <p:spPr>
+          <a:xfrm>
+            <a:off x="12834473" y="2485762"/>
+            <a:ext cx="1336735" cy="3056791"/>
+          </a:xfrm>
+          <a:prstGeom prst="roundRect">
+            <a:avLst>
+              <a:gd name="adj" fmla="val 5363"/>
+            </a:avLst>
+          </a:prstGeom>
+          <a:solidFill>
+            <a:schemeClr val="bg1"/>
+          </a:solidFill>
+          <a:ln>
+            <a:solidFill>
+              <a:schemeClr val="tx1"/>
+            </a:solidFill>
+          </a:ln>
+        </p:spPr>
+        <p:style>
+          <a:lnRef idx="2">
+            <a:schemeClr val="accent1">
+              <a:shade val="50000"/>
+            </a:schemeClr>
+          </a:lnRef>
+          <a:fillRef idx="1">
+            <a:schemeClr val="accent1"/>
+          </a:fillRef>
+          <a:effectRef idx="0">
+            <a:schemeClr val="accent1"/>
+          </a:effectRef>
+          <a:fontRef idx="minor">
+            <a:schemeClr val="lt1"/>
+          </a:fontRef>
+        </p:style>
+        <p:txBody>
+          <a:bodyPr rot="0" spcFirstLastPara="0" vertOverflow="overflow" horzOverflow="overflow" vert="horz" wrap="square" lIns="91440" tIns="45721" rIns="91440" bIns="45721" numCol="1" spcCol="0" rtlCol="0" fromWordArt="0" anchor="ctr" anchorCtr="0" forceAA="0" compatLnSpc="1">
+            <a:prstTxWarp prst="textNoShape">
+              <a:avLst/>
+            </a:prstTxWarp>
+            <a:noAutofit/>
+          </a:bodyPr>
+          <a:lstStyle/>
+          <a:p>
+            <a:pPr algn="ctr"/>
+            <a:r>
+              <a:rPr lang="en-US" sz="1798" dirty="0" smtClean="0">
+                <a:solidFill>
+                  <a:schemeClr val="tx1"/>
+                </a:solidFill>
+              </a:rPr>
+              <a:t>Load</a:t>
+            </a:r>
+          </a:p>
+          <a:p>
+            <a:pPr algn="ctr"/>
+            <a:r>
+              <a:rPr lang="en-US" sz="1798" dirty="0" smtClean="0">
+                <a:solidFill>
+                  <a:schemeClr val="tx1"/>
+                </a:solidFill>
+              </a:rPr>
+              <a:t>Store</a:t>
+            </a:r>
+          </a:p>
+          <a:p>
+            <a:pPr algn="ctr"/>
+            <a:r>
+              <a:rPr lang="en-US" sz="1798" dirty="0" smtClean="0">
+                <a:solidFill>
+                  <a:schemeClr val="tx1"/>
+                </a:solidFill>
+              </a:rPr>
+              <a:t>Unit</a:t>
+            </a:r>
+            <a:endParaRPr lang="en-US" sz="1798" dirty="0">
+              <a:solidFill>
+                <a:schemeClr val="tx1"/>
+              </a:solidFill>
+            </a:endParaRPr>
           </a:p>
         </p:txBody>
       </p:sp>

</xml_diff>

<commit_message>
✏️ Minor edit in block diagram
</commit_message>
<xml_diff>
--- a/Documents/Temporary_Documents/phoeniX Block diagram.pptx
+++ b/Documents/Temporary_Documents/phoeniX Block diagram.pptx
@@ -14428,12 +14428,12 @@
             <a:p>
               <a:pPr algn="ctr"/>
               <a:r>
-                <a:rPr lang="en-US" sz="1798" dirty="0" smtClean="0">
+                <a:rPr lang="en-US" sz="1798" smtClean="0">
                   <a:solidFill>
                     <a:schemeClr val="tx1"/>
                   </a:solidFill>
                 </a:rPr>
-                <a:t>(Read)</a:t>
+                <a:t>(Write)</a:t>
               </a:r>
               <a:endParaRPr lang="en-US" sz="1798" dirty="0">
                 <a:solidFill>

</xml_diff>

<commit_message>
📝 Update block diagram
</commit_message>
<xml_diff>
--- a/Documents/Temporary_Documents/phoeniX Block diagram.pptx
+++ b/Documents/Temporary_Documents/phoeniX Block diagram.pptx
@@ -199,7 +199,7 @@
           <a:p>
             <a:fld id="{87E192EE-1CBA-45FF-A343-E00F18BD090C}" type="datetimeFigureOut">
               <a:rPr lang="en-US" smtClean="0"/>
-              <a:t>9/16/2023</a:t>
+              <a:t>9/17/2023</a:t>
             </a:fld>
             <a:endParaRPr lang="en-US"/>
           </a:p>
@@ -598,7 +598,7 @@
           <a:p>
             <a:fld id="{28B2D070-F00F-4AC8-9322-098FFF76E378}" type="datetimeFigureOut">
               <a:rPr lang="en-US" smtClean="0"/>
-              <a:t>9/16/2023</a:t>
+              <a:t>9/17/2023</a:t>
             </a:fld>
             <a:endParaRPr lang="en-US"/>
           </a:p>
@@ -768,7 +768,7 @@
           <a:p>
             <a:fld id="{28B2D070-F00F-4AC8-9322-098FFF76E378}" type="datetimeFigureOut">
               <a:rPr lang="en-US" smtClean="0"/>
-              <a:t>9/16/2023</a:t>
+              <a:t>9/17/2023</a:t>
             </a:fld>
             <a:endParaRPr lang="en-US"/>
           </a:p>
@@ -948,7 +948,7 @@
           <a:p>
             <a:fld id="{28B2D070-F00F-4AC8-9322-098FFF76E378}" type="datetimeFigureOut">
               <a:rPr lang="en-US" smtClean="0"/>
-              <a:t>9/16/2023</a:t>
+              <a:t>9/17/2023</a:t>
             </a:fld>
             <a:endParaRPr lang="en-US"/>
           </a:p>
@@ -1118,7 +1118,7 @@
           <a:p>
             <a:fld id="{28B2D070-F00F-4AC8-9322-098FFF76E378}" type="datetimeFigureOut">
               <a:rPr lang="en-US" smtClean="0"/>
-              <a:t>9/16/2023</a:t>
+              <a:t>9/17/2023</a:t>
             </a:fld>
             <a:endParaRPr lang="en-US"/>
           </a:p>
@@ -1364,7 +1364,7 @@
           <a:p>
             <a:fld id="{28B2D070-F00F-4AC8-9322-098FFF76E378}" type="datetimeFigureOut">
               <a:rPr lang="en-US" smtClean="0"/>
-              <a:t>9/16/2023</a:t>
+              <a:t>9/17/2023</a:t>
             </a:fld>
             <a:endParaRPr lang="en-US"/>
           </a:p>
@@ -1596,7 +1596,7 @@
           <a:p>
             <a:fld id="{28B2D070-F00F-4AC8-9322-098FFF76E378}" type="datetimeFigureOut">
               <a:rPr lang="en-US" smtClean="0"/>
-              <a:t>9/16/2023</a:t>
+              <a:t>9/17/2023</a:t>
             </a:fld>
             <a:endParaRPr lang="en-US"/>
           </a:p>
@@ -1963,7 +1963,7 @@
           <a:p>
             <a:fld id="{28B2D070-F00F-4AC8-9322-098FFF76E378}" type="datetimeFigureOut">
               <a:rPr lang="en-US" smtClean="0"/>
-              <a:t>9/16/2023</a:t>
+              <a:t>9/17/2023</a:t>
             </a:fld>
             <a:endParaRPr lang="en-US"/>
           </a:p>
@@ -2081,7 +2081,7 @@
           <a:p>
             <a:fld id="{28B2D070-F00F-4AC8-9322-098FFF76E378}" type="datetimeFigureOut">
               <a:rPr lang="en-US" smtClean="0"/>
-              <a:t>9/16/2023</a:t>
+              <a:t>9/17/2023</a:t>
             </a:fld>
             <a:endParaRPr lang="en-US"/>
           </a:p>
@@ -2176,7 +2176,7 @@
           <a:p>
             <a:fld id="{28B2D070-F00F-4AC8-9322-098FFF76E378}" type="datetimeFigureOut">
               <a:rPr lang="en-US" smtClean="0"/>
-              <a:t>9/16/2023</a:t>
+              <a:t>9/17/2023</a:t>
             </a:fld>
             <a:endParaRPr lang="en-US"/>
           </a:p>
@@ -2453,7 +2453,7 @@
           <a:p>
             <a:fld id="{28B2D070-F00F-4AC8-9322-098FFF76E378}" type="datetimeFigureOut">
               <a:rPr lang="en-US" smtClean="0"/>
-              <a:t>9/16/2023</a:t>
+              <a:t>9/17/2023</a:t>
             </a:fld>
             <a:endParaRPr lang="en-US"/>
           </a:p>
@@ -2710,7 +2710,7 @@
           <a:p>
             <a:fld id="{28B2D070-F00F-4AC8-9322-098FFF76E378}" type="datetimeFigureOut">
               <a:rPr lang="en-US" smtClean="0"/>
-              <a:t>9/16/2023</a:t>
+              <a:t>9/17/2023</a:t>
             </a:fld>
             <a:endParaRPr lang="en-US"/>
           </a:p>
@@ -2923,7 +2923,7 @@
           <a:p>
             <a:fld id="{28B2D070-F00F-4AC8-9322-098FFF76E378}" type="datetimeFigureOut">
               <a:rPr lang="en-US" smtClean="0"/>
-              <a:t>9/16/2023</a:t>
+              <a:t>9/17/2023</a:t>
             </a:fld>
             <a:endParaRPr lang="en-US"/>
           </a:p>
@@ -9589,11 +9589,7 @@
             <a:p>
               <a:r>
                 <a:rPr lang="en-US" sz="1400" dirty="0" smtClean="0"/>
-                <a:t>r</a:t>
-              </a:r>
-              <a:r>
-                <a:rPr lang="en-US" sz="1400" dirty="0" smtClean="0"/>
-                <a:t>ead_index_1</a:t>
+                <a:t>read_index_1</a:t>
               </a:r>
               <a:endParaRPr lang="en-US" sz="1400" dirty="0"/>
             </a:p>
@@ -9659,11 +9655,7 @@
             <a:p>
               <a:r>
                 <a:rPr lang="en-US" sz="1400" dirty="0" smtClean="0"/>
-                <a:t>r</a:t>
-              </a:r>
-              <a:r>
-                <a:rPr lang="en-US" sz="1400" dirty="0" smtClean="0"/>
-                <a:t>ead_index_2</a:t>
+                <a:t>read_index_2</a:t>
               </a:r>
               <a:endParaRPr lang="en-US" sz="1400" dirty="0"/>
             </a:p>
@@ -9733,11 +9725,7 @@
             <a:p>
               <a:r>
                 <a:rPr lang="en-US" sz="1400" dirty="0" smtClean="0"/>
-                <a:t>write</a:t>
-              </a:r>
-              <a:r>
-                <a:rPr lang="en-US" sz="1400" dirty="0" smtClean="0"/>
-                <a:t>_index</a:t>
+                <a:t>write_index</a:t>
               </a:r>
               <a:endParaRPr lang="en-US" sz="1400" dirty="0"/>
             </a:p>
@@ -9894,15 +9882,7 @@
                     <a:srgbClr val="FF0000"/>
                   </a:solidFill>
                 </a:rPr>
-                <a:t>r</a:t>
-              </a:r>
-              <a:r>
-                <a:rPr lang="en-US" sz="1400" dirty="0" smtClean="0">
-                  <a:solidFill>
-                    <a:srgbClr val="FF0000"/>
-                  </a:solidFill>
-                </a:rPr>
-                <a:t>ead_enable_2</a:t>
+                <a:t>read_enable_2</a:t>
               </a:r>
               <a:endParaRPr lang="en-US" sz="1400" dirty="0">
                 <a:solidFill>
@@ -10040,15 +10020,7 @@
                     <a:srgbClr val="FF0000"/>
                   </a:solidFill>
                 </a:rPr>
-                <a:t>write</a:t>
-              </a:r>
-              <a:r>
-                <a:rPr lang="en-US" sz="1400" dirty="0" smtClean="0">
-                  <a:solidFill>
-                    <a:srgbClr val="FF0000"/>
-                  </a:solidFill>
-                </a:rPr>
-                <a:t>_enable</a:t>
+                <a:t>write_enable</a:t>
               </a:r>
               <a:endParaRPr lang="en-US" sz="1400" dirty="0">
                 <a:solidFill>
@@ -14741,11 +14713,7 @@
             <a:p>
               <a:r>
                 <a:rPr lang="en-US" sz="1400" dirty="0" smtClean="0"/>
-                <a:t>write</a:t>
-              </a:r>
-              <a:r>
-                <a:rPr lang="en-US" sz="1400" dirty="0" smtClean="0"/>
-                <a:t>_index</a:t>
+                <a:t>write_index</a:t>
               </a:r>
               <a:endParaRPr lang="en-US" sz="1400" dirty="0"/>
             </a:p>
@@ -14779,15 +14747,7 @@
                     <a:srgbClr val="FF0000"/>
                   </a:solidFill>
                 </a:rPr>
-                <a:t>write</a:t>
-              </a:r>
-              <a:r>
-                <a:rPr lang="en-US" sz="1400" dirty="0" smtClean="0">
-                  <a:solidFill>
-                    <a:srgbClr val="FF0000"/>
-                  </a:solidFill>
-                </a:rPr>
-                <a:t>_enable</a:t>
+                <a:t>write_enable</a:t>
               </a:r>
               <a:endParaRPr lang="en-US" sz="1400" dirty="0">
                 <a:solidFill>
@@ -16651,7 +16611,7 @@
           <p:spPr>
             <a:xfrm>
               <a:off x="863108" y="2412473"/>
-              <a:ext cx="1815112" cy="338554"/>
+              <a:ext cx="1793183" cy="338554"/>
             </a:xfrm>
             <a:prstGeom prst="rect">
               <a:avLst/>
@@ -16666,7 +16626,7 @@
             <a:p>
               <a:r>
                 <a:rPr lang="en-US" sz="1600" dirty="0" smtClean="0"/>
-                <a:t>fetched_instruction</a:t>
+                <a:t>Fetched instruction</a:t>
               </a:r>
               <a:endParaRPr lang="en-US" sz="1600" dirty="0"/>
             </a:p>
@@ -17192,8 +17152,8 @@
           </p:nvSpPr>
           <p:spPr>
             <a:xfrm rot="16200000">
-              <a:off x="4232105" y="4255785"/>
-              <a:ext cx="1183081" cy="307777"/>
+              <a:off x="4467362" y="4255785"/>
+              <a:ext cx="712567" cy="307777"/>
             </a:xfrm>
             <a:prstGeom prst="rect">
               <a:avLst/>
@@ -17208,11 +17168,7 @@
             <a:p>
               <a:r>
                 <a:rPr lang="en-US" sz="1400" dirty="0" smtClean="0"/>
-                <a:t>r</a:t>
-              </a:r>
-              <a:r>
-                <a:rPr lang="en-US" sz="1400" dirty="0" smtClean="0"/>
-                <a:t>ead_index_1</a:t>
+                <a:t>Index 1</a:t>
               </a:r>
               <a:endParaRPr lang="en-US" sz="1400" dirty="0"/>
             </a:p>
@@ -17262,8 +17218,8 @@
           </p:nvSpPr>
           <p:spPr>
             <a:xfrm rot="16200000">
-              <a:off x="4627173" y="4257433"/>
-              <a:ext cx="1183081" cy="307777"/>
+              <a:off x="4862430" y="4257433"/>
+              <a:ext cx="712567" cy="307777"/>
             </a:xfrm>
             <a:prstGeom prst="rect">
               <a:avLst/>
@@ -17278,11 +17234,7 @@
             <a:p>
               <a:r>
                 <a:rPr lang="en-US" sz="1400" dirty="0" smtClean="0"/>
-                <a:t>r</a:t>
-              </a:r>
-              <a:r>
-                <a:rPr lang="en-US" sz="1400" dirty="0" smtClean="0"/>
-                <a:t>ead_index_2</a:t>
+                <a:t>Index 2</a:t>
               </a:r>
               <a:endParaRPr lang="en-US" sz="1400" dirty="0"/>
             </a:p>
@@ -17337,7 +17289,7 @@
           <p:spPr>
             <a:xfrm>
               <a:off x="5948789" y="3958875"/>
-              <a:ext cx="1052083" cy="307777"/>
+              <a:ext cx="1029193" cy="307777"/>
             </a:xfrm>
             <a:prstGeom prst="rect">
               <a:avLst/>
@@ -17352,11 +17304,7 @@
             <a:p>
               <a:r>
                 <a:rPr lang="en-US" sz="1400" dirty="0" smtClean="0"/>
-                <a:t>write</a:t>
-              </a:r>
-              <a:r>
-                <a:rPr lang="en-US" sz="1400" dirty="0" smtClean="0"/>
-                <a:t>_index</a:t>
+                <a:t>Write index</a:t>
               </a:r>
               <a:endParaRPr lang="en-US" sz="1400" dirty="0"/>
             </a:p>
@@ -17448,7 +17396,7 @@
           <p:spPr>
             <a:xfrm>
               <a:off x="6013883" y="5816178"/>
-              <a:ext cx="1283557" cy="307777"/>
+              <a:ext cx="1218667" cy="307777"/>
             </a:xfrm>
             <a:prstGeom prst="rect">
               <a:avLst/>
@@ -17462,20 +17410,12 @@
             <a:lstStyle/>
             <a:p>
               <a:r>
-                <a:rPr lang="en-US" sz="1400" dirty="0">
-                  <a:solidFill>
-                    <a:srgbClr val="FF0000"/>
-                  </a:solidFill>
-                </a:rPr>
-                <a:t>r</a:t>
-              </a:r>
-              <a:r>
                 <a:rPr lang="en-US" sz="1400" dirty="0" smtClean="0">
                   <a:solidFill>
                     <a:srgbClr val="FF0000"/>
                   </a:solidFill>
                 </a:rPr>
-                <a:t>ead_enable_1</a:t>
+                <a:t>Read enable 1</a:t>
               </a:r>
               <a:endParaRPr lang="en-US" sz="1400" dirty="0">
                 <a:solidFill>
@@ -17494,7 +17434,7 @@
           <p:spPr>
             <a:xfrm>
               <a:off x="6013883" y="5998441"/>
-              <a:ext cx="1283557" cy="307777"/>
+              <a:ext cx="1218667" cy="307777"/>
             </a:xfrm>
             <a:prstGeom prst="rect">
               <a:avLst/>
@@ -17513,15 +17453,7 @@
                     <a:srgbClr val="FF0000"/>
                   </a:solidFill>
                 </a:rPr>
-                <a:t>r</a:t>
-              </a:r>
-              <a:r>
-                <a:rPr lang="en-US" sz="1400" dirty="0" smtClean="0">
-                  <a:solidFill>
-                    <a:srgbClr val="FF0000"/>
-                  </a:solidFill>
-                </a:rPr>
-                <a:t>ead_enable_2</a:t>
+                <a:t>Read enable 2</a:t>
               </a:r>
               <a:endParaRPr lang="en-US" sz="1400" dirty="0">
                 <a:solidFill>
@@ -17640,7 +17572,7 @@
           <p:spPr>
             <a:xfrm>
               <a:off x="7196626" y="4894832"/>
-              <a:ext cx="1152560" cy="307777"/>
+              <a:ext cx="1129668" cy="307777"/>
             </a:xfrm>
             <a:prstGeom prst="rect">
               <a:avLst/>
@@ -17659,15 +17591,7 @@
                     <a:srgbClr val="FF0000"/>
                   </a:solidFill>
                 </a:rPr>
-                <a:t>write</a:t>
-              </a:r>
-              <a:r>
-                <a:rPr lang="en-US" sz="1400" dirty="0" smtClean="0">
-                  <a:solidFill>
-                    <a:srgbClr val="FF0000"/>
-                  </a:solidFill>
-                </a:rPr>
-                <a:t>_enable</a:t>
+                <a:t>Write enable</a:t>
               </a:r>
               <a:endParaRPr lang="en-US" sz="1400" dirty="0">
                 <a:solidFill>
@@ -17822,8 +17746,8 @@
           </p:nvCxnSpPr>
           <p:spPr>
             <a:xfrm>
-              <a:off x="7000872" y="4112764"/>
-              <a:ext cx="1302825" cy="0"/>
+              <a:off x="6977982" y="4112764"/>
+              <a:ext cx="1325715" cy="0"/>
             </a:xfrm>
             <a:prstGeom prst="straightConnector1">
               <a:avLst/>
@@ -17934,8 +17858,8 @@
           </p:nvSpPr>
           <p:spPr>
             <a:xfrm>
-              <a:off x="7215816" y="6632956"/>
-              <a:ext cx="758669" cy="307777"/>
+              <a:off x="6460003" y="6620838"/>
+              <a:ext cx="1731500" cy="307777"/>
             </a:xfrm>
             <a:prstGeom prst="rect">
               <a:avLst/>
@@ -17950,37 +17874,7 @@
             <a:p>
               <a:r>
                 <a:rPr lang="en-US" sz="1400" dirty="0" smtClean="0"/>
-                <a:t>bus_rs1</a:t>
-              </a:r>
-              <a:endParaRPr lang="en-US" sz="1400" dirty="0"/>
-            </a:p>
-          </p:txBody>
-        </p:sp>
-        <p:sp>
-          <p:nvSpPr>
-            <p:cNvPr id="241" name="TextBox 240"/>
-            <p:cNvSpPr txBox="1"/>
-            <p:nvPr/>
-          </p:nvSpPr>
-          <p:spPr>
-            <a:xfrm>
-              <a:off x="7215816" y="7454669"/>
-              <a:ext cx="755463" cy="307777"/>
-            </a:xfrm>
-            <a:prstGeom prst="rect">
-              <a:avLst/>
-            </a:prstGeom>
-            <a:noFill/>
-          </p:spPr>
-          <p:txBody>
-            <a:bodyPr wrap="none" rtlCol="0">
-              <a:spAutoFit/>
-            </a:bodyPr>
-            <a:lstStyle/>
-            <a:p>
-              <a:r>
-                <a:rPr lang="en-US" sz="1400" dirty="0" smtClean="0"/>
-                <a:t>bus_rs2</a:t>
+                <a:t>Register source 1 bus</a:t>
               </a:r>
               <a:endParaRPr lang="en-US" sz="1400" dirty="0"/>
             </a:p>
@@ -18032,8 +17926,8 @@
           </p:nvSpPr>
           <p:spPr>
             <a:xfrm rot="16200000">
-              <a:off x="4943637" y="6842018"/>
-              <a:ext cx="1119794" cy="307777"/>
+              <a:off x="5097525" y="6842018"/>
+              <a:ext cx="812017" cy="307777"/>
             </a:xfrm>
             <a:prstGeom prst="rect">
               <a:avLst/>
@@ -18048,7 +17942,11 @@
             <a:p>
               <a:r>
                 <a:rPr lang="en-US" sz="1400" dirty="0" smtClean="0"/>
-                <a:t>RF_source_1</a:t>
+                <a:t>S</a:t>
+              </a:r>
+              <a:r>
+                <a:rPr lang="en-US" sz="1400" dirty="0" smtClean="0"/>
+                <a:t>ource 1</a:t>
               </a:r>
               <a:endParaRPr lang="en-US" sz="1400" dirty="0"/>
             </a:p>
@@ -18102,8 +18000,8 @@
           </p:nvSpPr>
           <p:spPr>
             <a:xfrm rot="16200000">
-              <a:off x="4639847" y="6856108"/>
-              <a:ext cx="1119794" cy="307777"/>
+              <a:off x="4793735" y="6856108"/>
+              <a:ext cx="812017" cy="307777"/>
             </a:xfrm>
             <a:prstGeom prst="rect">
               <a:avLst/>
@@ -18117,8 +18015,12 @@
             <a:lstStyle/>
             <a:p>
               <a:r>
+                <a:rPr lang="en-US" sz="1400" dirty="0"/>
+                <a:t>S</a:t>
+              </a:r>
+              <a:r>
                 <a:rPr lang="en-US" sz="1400" dirty="0" smtClean="0"/>
-                <a:t>RF_source_2</a:t>
+                <a:t>ource 2</a:t>
               </a:r>
               <a:endParaRPr lang="en-US" sz="1400" dirty="0"/>
             </a:p>
@@ -21699,11 +21601,7 @@
             <a:p>
               <a:r>
                 <a:rPr lang="en-US" sz="1400" dirty="0" smtClean="0"/>
-                <a:t>L</a:t>
-              </a:r>
-              <a:r>
-                <a:rPr lang="en-US" sz="1400" dirty="0" smtClean="0"/>
-                <a:t>oad Data</a:t>
+                <a:t>Load Data</a:t>
               </a:r>
               <a:endParaRPr lang="en-US" sz="1400" dirty="0"/>
             </a:p>
@@ -22065,7 +21963,7 @@
           <p:spPr>
             <a:xfrm>
               <a:off x="15030864" y="7131491"/>
-              <a:ext cx="1052083" cy="307777"/>
+              <a:ext cx="1029193" cy="307777"/>
             </a:xfrm>
             <a:prstGeom prst="rect">
               <a:avLst/>
@@ -22080,11 +21978,7 @@
             <a:p>
               <a:r>
                 <a:rPr lang="en-US" sz="1400" dirty="0" smtClean="0"/>
-                <a:t>write</a:t>
-              </a:r>
-              <a:r>
-                <a:rPr lang="en-US" sz="1400" dirty="0" smtClean="0"/>
-                <a:t>_index</a:t>
+                <a:t>Write index</a:t>
               </a:r>
               <a:endParaRPr lang="en-US" sz="1400" dirty="0"/>
             </a:p>
@@ -22099,7 +21993,7 @@
           <p:spPr>
             <a:xfrm>
               <a:off x="15036692" y="7349026"/>
-              <a:ext cx="1152560" cy="307777"/>
+              <a:ext cx="1129668" cy="307777"/>
             </a:xfrm>
             <a:prstGeom prst="rect">
               <a:avLst/>
@@ -22118,15 +22012,7 @@
                     <a:srgbClr val="FF0000"/>
                   </a:solidFill>
                 </a:rPr>
-                <a:t>write</a:t>
-              </a:r>
-              <a:r>
-                <a:rPr lang="en-US" sz="1400" dirty="0" smtClean="0">
-                  <a:solidFill>
-                    <a:srgbClr val="FF0000"/>
-                  </a:solidFill>
-                </a:rPr>
-                <a:t>_enable</a:t>
+                <a:t>Write enable</a:t>
               </a:r>
               <a:endParaRPr lang="en-US" sz="1400" dirty="0">
                 <a:solidFill>
@@ -22146,8 +22032,8 @@
           </p:nvCxnSpPr>
           <p:spPr>
             <a:xfrm flipV="1">
-              <a:off x="16189252" y="6524405"/>
-              <a:ext cx="190338" cy="978510"/>
+              <a:off x="16166360" y="6524405"/>
+              <a:ext cx="213230" cy="978510"/>
             </a:xfrm>
             <a:prstGeom prst="bentConnector2">
               <a:avLst/>
@@ -22184,8 +22070,8 @@
           </p:nvCxnSpPr>
           <p:spPr>
             <a:xfrm flipV="1">
-              <a:off x="16082947" y="6524405"/>
-              <a:ext cx="106305" cy="760975"/>
+              <a:off x="16060057" y="6524406"/>
+              <a:ext cx="129195" cy="760974"/>
             </a:xfrm>
             <a:prstGeom prst="bentConnector2">
               <a:avLst/>
@@ -22285,6 +22171,36 @@
                 <a:schemeClr val="tx1"/>
               </a:solidFill>
             </a:endParaRPr>
+          </a:p>
+        </p:txBody>
+      </p:sp>
+      <p:sp>
+        <p:nvSpPr>
+          <p:cNvPr id="183" name="TextBox 182"/>
+          <p:cNvSpPr txBox="1"/>
+          <p:nvPr/>
+        </p:nvSpPr>
+        <p:spPr>
+          <a:xfrm>
+            <a:off x="6450578" y="6593459"/>
+            <a:ext cx="1731500" cy="307777"/>
+          </a:xfrm>
+          <a:prstGeom prst="rect">
+            <a:avLst/>
+          </a:prstGeom>
+          <a:noFill/>
+        </p:spPr>
+        <p:txBody>
+          <a:bodyPr wrap="none" rtlCol="0">
+            <a:spAutoFit/>
+          </a:bodyPr>
+          <a:lstStyle/>
+          <a:p>
+            <a:r>
+              <a:rPr lang="en-US" sz="1400" dirty="0" smtClean="0"/>
+              <a:t>Register source 2 bus</a:t>
+            </a:r>
+            <a:endParaRPr lang="en-US" sz="1400" dirty="0"/>
           </a:p>
         </p:txBody>
       </p:sp>

</xml_diff>

<commit_message>
📝 Minor edit in block diagram
</commit_message>
<xml_diff>
--- a/Documents/Temporary_Documents/phoeniX Block diagram.pptx
+++ b/Documents/Temporary_Documents/phoeniX Block diagram.pptx
@@ -17441,7 +17441,7 @@
           </a:prstGeom>
           <a:ln w="12700">
             <a:solidFill>
-              <a:srgbClr val="7030A0"/>
+              <a:schemeClr val="tx1"/>
             </a:solidFill>
             <a:tailEnd type="triangle"/>
           </a:ln>
@@ -18420,7 +18420,7 @@
           </a:prstGeom>
           <a:ln w="12700">
             <a:solidFill>
-              <a:srgbClr val="7030A0"/>
+              <a:schemeClr val="tx1"/>
             </a:solidFill>
             <a:tailEnd type="triangle"/>
           </a:ln>
@@ -19922,7 +19922,7 @@
           </a:prstGeom>
           <a:ln w="12700">
             <a:solidFill>
-              <a:srgbClr val="7030A0"/>
+              <a:schemeClr val="tx1"/>
             </a:solidFill>
             <a:tailEnd type="triangle"/>
           </a:ln>

</xml_diff>

<commit_message>
📝 phoeniX block diagram
</commit_message>
<xml_diff>
--- a/Documents/Temporary_Documents/phoeniX Block diagram.pptx
+++ b/Documents/Temporary_Documents/phoeniX Block diagram.pptx
@@ -199,7 +199,7 @@
           <a:p>
             <a:fld id="{87E192EE-1CBA-45FF-A343-E00F18BD090C}" type="datetimeFigureOut">
               <a:rPr lang="en-US" smtClean="0"/>
-              <a:t>9/17/2023</a:t>
+              <a:t>9/19/2023</a:t>
             </a:fld>
             <a:endParaRPr lang="en-US"/>
           </a:p>
@@ -263,38 +263,37 @@
           <a:p>
             <a:pPr lvl="0"/>
             <a:r>
-              <a:rPr lang="en-US" smtClean="0"/>
+              <a:rPr lang="en-US"/>
               <a:t>Edit Master text styles</a:t>
             </a:r>
           </a:p>
           <a:p>
             <a:pPr lvl="1"/>
             <a:r>
-              <a:rPr lang="en-US" smtClean="0"/>
+              <a:rPr lang="en-US"/>
               <a:t>Second level</a:t>
             </a:r>
           </a:p>
           <a:p>
             <a:pPr lvl="2"/>
             <a:r>
-              <a:rPr lang="en-US" smtClean="0"/>
+              <a:rPr lang="en-US"/>
               <a:t>Third level</a:t>
             </a:r>
           </a:p>
           <a:p>
             <a:pPr lvl="3"/>
             <a:r>
-              <a:rPr lang="en-US" smtClean="0"/>
+              <a:rPr lang="en-US"/>
               <a:t>Fourth level</a:t>
             </a:r>
           </a:p>
           <a:p>
             <a:pPr lvl="4"/>
             <a:r>
-              <a:rPr lang="en-US" smtClean="0"/>
+              <a:rPr lang="en-US"/>
               <a:t>Fifth level</a:t>
             </a:r>
-            <a:endParaRPr lang="en-US"/>
           </a:p>
         </p:txBody>
       </p:sp>
@@ -509,7 +508,7 @@
           </a:lstStyle>
           <a:p>
             <a:r>
-              <a:rPr lang="en-US" smtClean="0"/>
+              <a:rPr lang="en-US"/>
               <a:t>Click to edit Master title style</a:t>
             </a:r>
             <a:endParaRPr lang="en-US" dirty="0"/>
@@ -574,7 +573,7 @@
           </a:lstStyle>
           <a:p>
             <a:r>
-              <a:rPr lang="en-US" smtClean="0"/>
+              <a:rPr lang="en-US"/>
               <a:t>Click to edit Master subtitle style</a:t>
             </a:r>
             <a:endParaRPr lang="en-US" dirty="0"/>
@@ -598,7 +597,7 @@
           <a:p>
             <a:fld id="{28B2D070-F00F-4AC8-9322-098FFF76E378}" type="datetimeFigureOut">
               <a:rPr lang="en-US" smtClean="0"/>
-              <a:t>9/17/2023</a:t>
+              <a:t>9/19/2023</a:t>
             </a:fld>
             <a:endParaRPr lang="en-US"/>
           </a:p>
@@ -692,7 +691,7 @@
           <a:lstStyle/>
           <a:p>
             <a:r>
-              <a:rPr lang="en-US" smtClean="0"/>
+              <a:rPr lang="en-US"/>
               <a:t>Click to edit Master title style</a:t>
             </a:r>
             <a:endParaRPr lang="en-US" dirty="0"/>
@@ -716,35 +715,35 @@
           <a:p>
             <a:pPr lvl="0"/>
             <a:r>
-              <a:rPr lang="en-US" smtClean="0"/>
+              <a:rPr lang="en-US"/>
               <a:t>Edit Master text styles</a:t>
             </a:r>
           </a:p>
           <a:p>
             <a:pPr lvl="1"/>
             <a:r>
-              <a:rPr lang="en-US" smtClean="0"/>
+              <a:rPr lang="en-US"/>
               <a:t>Second level</a:t>
             </a:r>
           </a:p>
           <a:p>
             <a:pPr lvl="2"/>
             <a:r>
-              <a:rPr lang="en-US" smtClean="0"/>
+              <a:rPr lang="en-US"/>
               <a:t>Third level</a:t>
             </a:r>
           </a:p>
           <a:p>
             <a:pPr lvl="3"/>
             <a:r>
-              <a:rPr lang="en-US" smtClean="0"/>
+              <a:rPr lang="en-US"/>
               <a:t>Fourth level</a:t>
             </a:r>
           </a:p>
           <a:p>
             <a:pPr lvl="4"/>
             <a:r>
-              <a:rPr lang="en-US" smtClean="0"/>
+              <a:rPr lang="en-US"/>
               <a:t>Fifth level</a:t>
             </a:r>
             <a:endParaRPr lang="en-US" dirty="0"/>
@@ -768,7 +767,7 @@
           <a:p>
             <a:fld id="{28B2D070-F00F-4AC8-9322-098FFF76E378}" type="datetimeFigureOut">
               <a:rPr lang="en-US" smtClean="0"/>
-              <a:t>9/17/2023</a:t>
+              <a:t>9/19/2023</a:t>
             </a:fld>
             <a:endParaRPr lang="en-US"/>
           </a:p>
@@ -867,7 +866,7 @@
           <a:lstStyle/>
           <a:p>
             <a:r>
-              <a:rPr lang="en-US" smtClean="0"/>
+              <a:rPr lang="en-US"/>
               <a:t>Click to edit Master title style</a:t>
             </a:r>
             <a:endParaRPr lang="en-US" dirty="0"/>
@@ -896,35 +895,35 @@
           <a:p>
             <a:pPr lvl="0"/>
             <a:r>
-              <a:rPr lang="en-US" smtClean="0"/>
+              <a:rPr lang="en-US"/>
               <a:t>Edit Master text styles</a:t>
             </a:r>
           </a:p>
           <a:p>
             <a:pPr lvl="1"/>
             <a:r>
-              <a:rPr lang="en-US" smtClean="0"/>
+              <a:rPr lang="en-US"/>
               <a:t>Second level</a:t>
             </a:r>
           </a:p>
           <a:p>
             <a:pPr lvl="2"/>
             <a:r>
-              <a:rPr lang="en-US" smtClean="0"/>
+              <a:rPr lang="en-US"/>
               <a:t>Third level</a:t>
             </a:r>
           </a:p>
           <a:p>
             <a:pPr lvl="3"/>
             <a:r>
-              <a:rPr lang="en-US" smtClean="0"/>
+              <a:rPr lang="en-US"/>
               <a:t>Fourth level</a:t>
             </a:r>
           </a:p>
           <a:p>
             <a:pPr lvl="4"/>
             <a:r>
-              <a:rPr lang="en-US" smtClean="0"/>
+              <a:rPr lang="en-US"/>
               <a:t>Fifth level</a:t>
             </a:r>
             <a:endParaRPr lang="en-US" dirty="0"/>
@@ -948,7 +947,7 @@
           <a:p>
             <a:fld id="{28B2D070-F00F-4AC8-9322-098FFF76E378}" type="datetimeFigureOut">
               <a:rPr lang="en-US" smtClean="0"/>
-              <a:t>9/17/2023</a:t>
+              <a:t>9/19/2023</a:t>
             </a:fld>
             <a:endParaRPr lang="en-US"/>
           </a:p>
@@ -1042,7 +1041,7 @@
           <a:lstStyle/>
           <a:p>
             <a:r>
-              <a:rPr lang="en-US" smtClean="0"/>
+              <a:rPr lang="en-US"/>
               <a:t>Click to edit Master title style</a:t>
             </a:r>
             <a:endParaRPr lang="en-US" dirty="0"/>
@@ -1066,35 +1065,35 @@
           <a:p>
             <a:pPr lvl="0"/>
             <a:r>
-              <a:rPr lang="en-US" smtClean="0"/>
+              <a:rPr lang="en-US"/>
               <a:t>Edit Master text styles</a:t>
             </a:r>
           </a:p>
           <a:p>
             <a:pPr lvl="1"/>
             <a:r>
-              <a:rPr lang="en-US" smtClean="0"/>
+              <a:rPr lang="en-US"/>
               <a:t>Second level</a:t>
             </a:r>
           </a:p>
           <a:p>
             <a:pPr lvl="2"/>
             <a:r>
-              <a:rPr lang="en-US" smtClean="0"/>
+              <a:rPr lang="en-US"/>
               <a:t>Third level</a:t>
             </a:r>
           </a:p>
           <a:p>
             <a:pPr lvl="3"/>
             <a:r>
-              <a:rPr lang="en-US" smtClean="0"/>
+              <a:rPr lang="en-US"/>
               <a:t>Fourth level</a:t>
             </a:r>
           </a:p>
           <a:p>
             <a:pPr lvl="4"/>
             <a:r>
-              <a:rPr lang="en-US" smtClean="0"/>
+              <a:rPr lang="en-US"/>
               <a:t>Fifth level</a:t>
             </a:r>
             <a:endParaRPr lang="en-US" dirty="0"/>
@@ -1118,7 +1117,7 @@
           <a:p>
             <a:fld id="{28B2D070-F00F-4AC8-9322-098FFF76E378}" type="datetimeFigureOut">
               <a:rPr lang="en-US" smtClean="0"/>
-              <a:t>9/17/2023</a:t>
+              <a:t>9/19/2023</a:t>
             </a:fld>
             <a:endParaRPr lang="en-US"/>
           </a:p>
@@ -1221,7 +1220,7 @@
           </a:lstStyle>
           <a:p>
             <a:r>
-              <a:rPr lang="en-US" smtClean="0"/>
+              <a:rPr lang="en-US"/>
               <a:t>Click to edit Master title style</a:t>
             </a:r>
             <a:endParaRPr lang="en-US" dirty="0"/>
@@ -1341,7 +1340,7 @@
           <a:p>
             <a:pPr lvl="0"/>
             <a:r>
-              <a:rPr lang="en-US" smtClean="0"/>
+              <a:rPr lang="en-US"/>
               <a:t>Edit Master text styles</a:t>
             </a:r>
           </a:p>
@@ -1364,7 +1363,7 @@
           <a:p>
             <a:fld id="{28B2D070-F00F-4AC8-9322-098FFF76E378}" type="datetimeFigureOut">
               <a:rPr lang="en-US" smtClean="0"/>
-              <a:t>9/17/2023</a:t>
+              <a:t>9/19/2023</a:t>
             </a:fld>
             <a:endParaRPr lang="en-US"/>
           </a:p>
@@ -1458,7 +1457,7 @@
           <a:lstStyle/>
           <a:p>
             <a:r>
-              <a:rPr lang="en-US" smtClean="0"/>
+              <a:rPr lang="en-US"/>
               <a:t>Click to edit Master title style</a:t>
             </a:r>
             <a:endParaRPr lang="en-US" dirty="0"/>
@@ -1487,35 +1486,35 @@
           <a:p>
             <a:pPr lvl="0"/>
             <a:r>
-              <a:rPr lang="en-US" smtClean="0"/>
+              <a:rPr lang="en-US"/>
               <a:t>Edit Master text styles</a:t>
             </a:r>
           </a:p>
           <a:p>
             <a:pPr lvl="1"/>
             <a:r>
-              <a:rPr lang="en-US" smtClean="0"/>
+              <a:rPr lang="en-US"/>
               <a:t>Second level</a:t>
             </a:r>
           </a:p>
           <a:p>
             <a:pPr lvl="2"/>
             <a:r>
-              <a:rPr lang="en-US" smtClean="0"/>
+              <a:rPr lang="en-US"/>
               <a:t>Third level</a:t>
             </a:r>
           </a:p>
           <a:p>
             <a:pPr lvl="3"/>
             <a:r>
-              <a:rPr lang="en-US" smtClean="0"/>
+              <a:rPr lang="en-US"/>
               <a:t>Fourth level</a:t>
             </a:r>
           </a:p>
           <a:p>
             <a:pPr lvl="4"/>
             <a:r>
-              <a:rPr lang="en-US" smtClean="0"/>
+              <a:rPr lang="en-US"/>
               <a:t>Fifth level</a:t>
             </a:r>
             <a:endParaRPr lang="en-US" dirty="0"/>
@@ -1544,35 +1543,35 @@
           <a:p>
             <a:pPr lvl="0"/>
             <a:r>
-              <a:rPr lang="en-US" smtClean="0"/>
+              <a:rPr lang="en-US"/>
               <a:t>Edit Master text styles</a:t>
             </a:r>
           </a:p>
           <a:p>
             <a:pPr lvl="1"/>
             <a:r>
-              <a:rPr lang="en-US" smtClean="0"/>
+              <a:rPr lang="en-US"/>
               <a:t>Second level</a:t>
             </a:r>
           </a:p>
           <a:p>
             <a:pPr lvl="2"/>
             <a:r>
-              <a:rPr lang="en-US" smtClean="0"/>
+              <a:rPr lang="en-US"/>
               <a:t>Third level</a:t>
             </a:r>
           </a:p>
           <a:p>
             <a:pPr lvl="3"/>
             <a:r>
-              <a:rPr lang="en-US" smtClean="0"/>
+              <a:rPr lang="en-US"/>
               <a:t>Fourth level</a:t>
             </a:r>
           </a:p>
           <a:p>
             <a:pPr lvl="4"/>
             <a:r>
-              <a:rPr lang="en-US" smtClean="0"/>
+              <a:rPr lang="en-US"/>
               <a:t>Fifth level</a:t>
             </a:r>
             <a:endParaRPr lang="en-US" dirty="0"/>
@@ -1596,7 +1595,7 @@
           <a:p>
             <a:fld id="{28B2D070-F00F-4AC8-9322-098FFF76E378}" type="datetimeFigureOut">
               <a:rPr lang="en-US" smtClean="0"/>
-              <a:t>9/17/2023</a:t>
+              <a:t>9/19/2023</a:t>
             </a:fld>
             <a:endParaRPr lang="en-US"/>
           </a:p>
@@ -1695,7 +1694,7 @@
           <a:lstStyle/>
           <a:p>
             <a:r>
-              <a:rPr lang="en-US" smtClean="0"/>
+              <a:rPr lang="en-US"/>
               <a:t>Click to edit Master title style</a:t>
             </a:r>
             <a:endParaRPr lang="en-US" dirty="0"/>
@@ -1761,7 +1760,7 @@
           <a:p>
             <a:pPr lvl="0"/>
             <a:r>
-              <a:rPr lang="en-US" smtClean="0"/>
+              <a:rPr lang="en-US"/>
               <a:t>Edit Master text styles</a:t>
             </a:r>
           </a:p>
@@ -1789,35 +1788,35 @@
           <a:p>
             <a:pPr lvl="0"/>
             <a:r>
-              <a:rPr lang="en-US" smtClean="0"/>
+              <a:rPr lang="en-US"/>
               <a:t>Edit Master text styles</a:t>
             </a:r>
           </a:p>
           <a:p>
             <a:pPr lvl="1"/>
             <a:r>
-              <a:rPr lang="en-US" smtClean="0"/>
+              <a:rPr lang="en-US"/>
               <a:t>Second level</a:t>
             </a:r>
           </a:p>
           <a:p>
             <a:pPr lvl="2"/>
             <a:r>
-              <a:rPr lang="en-US" smtClean="0"/>
+              <a:rPr lang="en-US"/>
               <a:t>Third level</a:t>
             </a:r>
           </a:p>
           <a:p>
             <a:pPr lvl="3"/>
             <a:r>
-              <a:rPr lang="en-US" smtClean="0"/>
+              <a:rPr lang="en-US"/>
               <a:t>Fourth level</a:t>
             </a:r>
           </a:p>
           <a:p>
             <a:pPr lvl="4"/>
             <a:r>
-              <a:rPr lang="en-US" smtClean="0"/>
+              <a:rPr lang="en-US"/>
               <a:t>Fifth level</a:t>
             </a:r>
             <a:endParaRPr lang="en-US" dirty="0"/>
@@ -1883,7 +1882,7 @@
           <a:p>
             <a:pPr lvl="0"/>
             <a:r>
-              <a:rPr lang="en-US" smtClean="0"/>
+              <a:rPr lang="en-US"/>
               <a:t>Edit Master text styles</a:t>
             </a:r>
           </a:p>
@@ -1911,35 +1910,35 @@
           <a:p>
             <a:pPr lvl="0"/>
             <a:r>
-              <a:rPr lang="en-US" smtClean="0"/>
+              <a:rPr lang="en-US"/>
               <a:t>Edit Master text styles</a:t>
             </a:r>
           </a:p>
           <a:p>
             <a:pPr lvl="1"/>
             <a:r>
-              <a:rPr lang="en-US" smtClean="0"/>
+              <a:rPr lang="en-US"/>
               <a:t>Second level</a:t>
             </a:r>
           </a:p>
           <a:p>
             <a:pPr lvl="2"/>
             <a:r>
-              <a:rPr lang="en-US" smtClean="0"/>
+              <a:rPr lang="en-US"/>
               <a:t>Third level</a:t>
             </a:r>
           </a:p>
           <a:p>
             <a:pPr lvl="3"/>
             <a:r>
-              <a:rPr lang="en-US" smtClean="0"/>
+              <a:rPr lang="en-US"/>
               <a:t>Fourth level</a:t>
             </a:r>
           </a:p>
           <a:p>
             <a:pPr lvl="4"/>
             <a:r>
-              <a:rPr lang="en-US" smtClean="0"/>
+              <a:rPr lang="en-US"/>
               <a:t>Fifth level</a:t>
             </a:r>
             <a:endParaRPr lang="en-US" dirty="0"/>
@@ -1963,7 +1962,7 @@
           <a:p>
             <a:fld id="{28B2D070-F00F-4AC8-9322-098FFF76E378}" type="datetimeFigureOut">
               <a:rPr lang="en-US" smtClean="0"/>
-              <a:t>9/17/2023</a:t>
+              <a:t>9/19/2023</a:t>
             </a:fld>
             <a:endParaRPr lang="en-US"/>
           </a:p>
@@ -2057,7 +2056,7 @@
           <a:lstStyle/>
           <a:p>
             <a:r>
-              <a:rPr lang="en-US" smtClean="0"/>
+              <a:rPr lang="en-US"/>
               <a:t>Click to edit Master title style</a:t>
             </a:r>
             <a:endParaRPr lang="en-US" dirty="0"/>
@@ -2081,7 +2080,7 @@
           <a:p>
             <a:fld id="{28B2D070-F00F-4AC8-9322-098FFF76E378}" type="datetimeFigureOut">
               <a:rPr lang="en-US" smtClean="0"/>
-              <a:t>9/17/2023</a:t>
+              <a:t>9/19/2023</a:t>
             </a:fld>
             <a:endParaRPr lang="en-US"/>
           </a:p>
@@ -2176,7 +2175,7 @@
           <a:p>
             <a:fld id="{28B2D070-F00F-4AC8-9322-098FFF76E378}" type="datetimeFigureOut">
               <a:rPr lang="en-US" smtClean="0"/>
-              <a:t>9/17/2023</a:t>
+              <a:t>9/19/2023</a:t>
             </a:fld>
             <a:endParaRPr lang="en-US"/>
           </a:p>
@@ -2279,7 +2278,7 @@
           </a:lstStyle>
           <a:p>
             <a:r>
-              <a:rPr lang="en-US" smtClean="0"/>
+              <a:rPr lang="en-US"/>
               <a:t>Click to edit Master title style</a:t>
             </a:r>
             <a:endParaRPr lang="en-US" dirty="0"/>
@@ -2336,35 +2335,35 @@
           <a:p>
             <a:pPr lvl="0"/>
             <a:r>
-              <a:rPr lang="en-US" smtClean="0"/>
+              <a:rPr lang="en-US"/>
               <a:t>Edit Master text styles</a:t>
             </a:r>
           </a:p>
           <a:p>
             <a:pPr lvl="1"/>
             <a:r>
-              <a:rPr lang="en-US" smtClean="0"/>
+              <a:rPr lang="en-US"/>
               <a:t>Second level</a:t>
             </a:r>
           </a:p>
           <a:p>
             <a:pPr lvl="2"/>
             <a:r>
-              <a:rPr lang="en-US" smtClean="0"/>
+              <a:rPr lang="en-US"/>
               <a:t>Third level</a:t>
             </a:r>
           </a:p>
           <a:p>
             <a:pPr lvl="3"/>
             <a:r>
-              <a:rPr lang="en-US" smtClean="0"/>
+              <a:rPr lang="en-US"/>
               <a:t>Fourth level</a:t>
             </a:r>
           </a:p>
           <a:p>
             <a:pPr lvl="4"/>
             <a:r>
-              <a:rPr lang="en-US" smtClean="0"/>
+              <a:rPr lang="en-US"/>
               <a:t>Fifth level</a:t>
             </a:r>
             <a:endParaRPr lang="en-US" dirty="0"/>
@@ -2430,7 +2429,7 @@
           <a:p>
             <a:pPr lvl="0"/>
             <a:r>
-              <a:rPr lang="en-US" smtClean="0"/>
+              <a:rPr lang="en-US"/>
               <a:t>Edit Master text styles</a:t>
             </a:r>
           </a:p>
@@ -2453,7 +2452,7 @@
           <a:p>
             <a:fld id="{28B2D070-F00F-4AC8-9322-098FFF76E378}" type="datetimeFigureOut">
               <a:rPr lang="en-US" smtClean="0"/>
-              <a:t>9/17/2023</a:t>
+              <a:t>9/19/2023</a:t>
             </a:fld>
             <a:endParaRPr lang="en-US"/>
           </a:p>
@@ -2556,7 +2555,7 @@
           </a:lstStyle>
           <a:p>
             <a:r>
-              <a:rPr lang="en-US" smtClean="0"/>
+              <a:rPr lang="en-US"/>
               <a:t>Click to edit Master title style</a:t>
             </a:r>
             <a:endParaRPr lang="en-US" dirty="0"/>
@@ -2621,7 +2620,7 @@
           </a:lstStyle>
           <a:p>
             <a:r>
-              <a:rPr lang="en-US" smtClean="0"/>
+              <a:rPr lang="en-US"/>
               <a:t>Click icon to add picture</a:t>
             </a:r>
             <a:endParaRPr lang="en-US" dirty="0"/>
@@ -2687,7 +2686,7 @@
           <a:p>
             <a:pPr lvl="0"/>
             <a:r>
-              <a:rPr lang="en-US" smtClean="0"/>
+              <a:rPr lang="en-US"/>
               <a:t>Edit Master text styles</a:t>
             </a:r>
           </a:p>
@@ -2710,7 +2709,7 @@
           <a:p>
             <a:fld id="{28B2D070-F00F-4AC8-9322-098FFF76E378}" type="datetimeFigureOut">
               <a:rPr lang="en-US" smtClean="0"/>
-              <a:t>9/17/2023</a:t>
+              <a:t>9/19/2023</a:t>
             </a:fld>
             <a:endParaRPr lang="en-US"/>
           </a:p>
@@ -2819,7 +2818,7 @@
           <a:lstStyle/>
           <a:p>
             <a:r>
-              <a:rPr lang="en-US" smtClean="0"/>
+              <a:rPr lang="en-US"/>
               <a:t>Click to edit Master title style</a:t>
             </a:r>
             <a:endParaRPr lang="en-US" dirty="0"/>
@@ -2853,35 +2852,35 @@
           <a:p>
             <a:pPr lvl="0"/>
             <a:r>
-              <a:rPr lang="en-US" smtClean="0"/>
+              <a:rPr lang="en-US"/>
               <a:t>Edit Master text styles</a:t>
             </a:r>
           </a:p>
           <a:p>
             <a:pPr lvl="1"/>
             <a:r>
-              <a:rPr lang="en-US" smtClean="0"/>
+              <a:rPr lang="en-US"/>
               <a:t>Second level</a:t>
             </a:r>
           </a:p>
           <a:p>
             <a:pPr lvl="2"/>
             <a:r>
-              <a:rPr lang="en-US" smtClean="0"/>
+              <a:rPr lang="en-US"/>
               <a:t>Third level</a:t>
             </a:r>
           </a:p>
           <a:p>
             <a:pPr lvl="3"/>
             <a:r>
-              <a:rPr lang="en-US" smtClean="0"/>
+              <a:rPr lang="en-US"/>
               <a:t>Fourth level</a:t>
             </a:r>
           </a:p>
           <a:p>
             <a:pPr lvl="4"/>
             <a:r>
-              <a:rPr lang="en-US" smtClean="0"/>
+              <a:rPr lang="en-US"/>
               <a:t>Fifth level</a:t>
             </a:r>
             <a:endParaRPr lang="en-US" dirty="0"/>
@@ -2923,7 +2922,7 @@
           <a:p>
             <a:fld id="{28B2D070-F00F-4AC8-9322-098FFF76E378}" type="datetimeFigureOut">
               <a:rPr lang="en-US" smtClean="0"/>
-              <a:t>9/17/2023</a:t>
+              <a:t>9/19/2023</a:t>
             </a:fld>
             <a:endParaRPr lang="en-US"/>
           </a:p>
@@ -6813,18 +6812,13 @@
           <a:p>
             <a:pPr algn="ctr"/>
             <a:r>
-              <a:rPr lang="en-US" sz="1798" dirty="0" smtClean="0">
+              <a:rPr lang="en-US" sz="1798" dirty="0">
                 <a:solidFill>
                   <a:schemeClr val="tx1"/>
                 </a:solidFill>
               </a:rPr>
               <a:t>Scoreboard/Aligner</a:t>
             </a:r>
-            <a:endParaRPr lang="en-US" sz="1798" dirty="0">
-              <a:solidFill>
-                <a:schemeClr val="tx1"/>
-              </a:solidFill>
-            </a:endParaRPr>
           </a:p>
         </p:txBody>
       </p:sp>
@@ -7261,13 +7255,6 @@
   <p:clrMapOvr>
     <a:masterClrMapping/>
   </p:clrMapOvr>
-  <p:timing>
-    <p:tnLst>
-      <p:par>
-        <p:cTn id="1" dur="indefinite" restart="never" nodeType="tmRoot"/>
-      </p:par>
-    </p:tnLst>
-  </p:timing>
 </p:sld>
 </file>
 
@@ -7652,7 +7639,7 @@
             <a:p>
               <a:pPr algn="ctr"/>
               <a:r>
-                <a:rPr lang="en-US" sz="1798" dirty="0" smtClean="0">
+                <a:rPr lang="en-US" sz="1798" dirty="0">
                   <a:solidFill>
                     <a:schemeClr val="tx1"/>
                   </a:solidFill>
@@ -7663,18 +7650,13 @@
             <a:p>
               <a:pPr algn="ctr"/>
               <a:r>
-                <a:rPr lang="en-US" sz="1798" dirty="0" smtClean="0">
+                <a:rPr lang="en-US" sz="1798" dirty="0">
                   <a:solidFill>
                     <a:schemeClr val="tx1"/>
                   </a:solidFill>
                 </a:rPr>
                 <a:t>(Read)</a:t>
               </a:r>
-              <a:endParaRPr lang="en-US" sz="1798" dirty="0">
-                <a:solidFill>
-                  <a:schemeClr val="tx1"/>
-                </a:solidFill>
-              </a:endParaRPr>
             </a:p>
           </p:txBody>
         </p:sp>
@@ -7769,21 +7751,8 @@
                     <a:schemeClr val="tx1"/>
                   </a:solidFill>
                 </a:rPr>
-                <a:t>I</a:t>
+                <a:t>Immediate Generator</a:t>
               </a:r>
-              <a:r>
-                <a:rPr lang="en-US" sz="1798" dirty="0" smtClean="0">
-                  <a:solidFill>
-                    <a:schemeClr val="tx1"/>
-                  </a:solidFill>
-                </a:rPr>
-                <a:t>mmediate Generator</a:t>
-              </a:r>
-              <a:endParaRPr lang="en-US" sz="1798" dirty="0">
-                <a:solidFill>
-                  <a:schemeClr val="tx1"/>
-                </a:solidFill>
-              </a:endParaRPr>
             </a:p>
           </p:txBody>
         </p:sp>
@@ -8197,10 +8166,9 @@
             <a:lstStyle/>
             <a:p>
               <a:r>
-                <a:rPr lang="en-US" sz="1800" dirty="0" smtClean="0"/>
+                <a:rPr lang="en-US" sz="1800" dirty="0"/>
                 <a:t>PC</a:t>
               </a:r>
-              <a:endParaRPr lang="en-US" sz="1800" dirty="0"/>
             </a:p>
           </p:txBody>
         </p:sp>
@@ -8327,10 +8295,9 @@
             <a:lstStyle/>
             <a:p>
               <a:r>
-                <a:rPr lang="en-US" sz="1800" dirty="0" smtClean="0"/>
+                <a:rPr lang="en-US" sz="1800" dirty="0"/>
                 <a:t>next_PC</a:t>
               </a:r>
-              <a:endParaRPr lang="en-US" sz="1800" dirty="0"/>
             </a:p>
           </p:txBody>
         </p:sp>
@@ -8398,10 +8365,9 @@
             <a:lstStyle/>
             <a:p>
               <a:r>
-                <a:rPr lang="en-US" sz="1800" dirty="0" smtClean="0"/>
+                <a:rPr lang="en-US" sz="1800" dirty="0"/>
                 <a:t>RESET_ADDRESS</a:t>
               </a:r>
-              <a:endParaRPr lang="en-US" sz="1800" dirty="0"/>
             </a:p>
           </p:txBody>
         </p:sp>
@@ -8466,10 +8432,9 @@
             <a:lstStyle/>
             <a:p>
               <a:r>
-                <a:rPr lang="en-US" sz="1800" dirty="0" smtClean="0"/>
+                <a:rPr lang="en-US" sz="1800" dirty="0"/>
                 <a:t>PC</a:t>
               </a:r>
-              <a:endParaRPr lang="en-US" sz="1800" dirty="0"/>
             </a:p>
           </p:txBody>
         </p:sp>
@@ -8534,10 +8499,9 @@
             <a:lstStyle/>
             <a:p>
               <a:r>
-                <a:rPr lang="en-US" sz="1800" dirty="0" smtClean="0"/>
+                <a:rPr lang="en-US" sz="1800" dirty="0"/>
                 <a:t>address</a:t>
               </a:r>
-              <a:endParaRPr lang="en-US" sz="1800" dirty="0"/>
             </a:p>
           </p:txBody>
         </p:sp>
@@ -8602,10 +8566,9 @@
             <a:lstStyle/>
             <a:p>
               <a:r>
-                <a:rPr lang="en-US" sz="1600" dirty="0" smtClean="0"/>
+                <a:rPr lang="en-US" sz="1600" dirty="0"/>
                 <a:t>jump_branch_enable</a:t>
               </a:r>
-              <a:endParaRPr lang="en-US" sz="1600" dirty="0"/>
             </a:p>
           </p:txBody>
         </p:sp>
@@ -8671,10 +8634,9 @@
             <a:lstStyle/>
             <a:p>
               <a:r>
-                <a:rPr lang="en-US" sz="1800" dirty="0" smtClean="0"/>
+                <a:rPr lang="en-US" sz="1800" dirty="0"/>
                 <a:t>clock</a:t>
               </a:r>
-              <a:endParaRPr lang="en-US" sz="1800" dirty="0"/>
             </a:p>
           </p:txBody>
         </p:sp>
@@ -8701,10 +8663,9 @@
             <a:lstStyle/>
             <a:p>
               <a:r>
-                <a:rPr lang="en-US" sz="1800" dirty="0" smtClean="0"/>
+                <a:rPr lang="en-US" sz="1800" dirty="0"/>
                 <a:t>enable</a:t>
               </a:r>
-              <a:endParaRPr lang="en-US" sz="1800" dirty="0"/>
             </a:p>
           </p:txBody>
         </p:sp>
@@ -8938,10 +8899,9 @@
             <a:lstStyle/>
             <a:p>
               <a:r>
-                <a:rPr lang="en-US" sz="1800" dirty="0" smtClean="0"/>
+                <a:rPr lang="en-US" sz="1800" dirty="0"/>
                 <a:t>fetch_done</a:t>
               </a:r>
-              <a:endParaRPr lang="en-US" sz="1800" dirty="0"/>
             </a:p>
           </p:txBody>
         </p:sp>
@@ -9042,10 +9002,9 @@
             <a:lstStyle/>
             <a:p>
               <a:r>
-                <a:rPr lang="en-US" sz="1600" dirty="0" smtClean="0"/>
+                <a:rPr lang="en-US" sz="1600" dirty="0"/>
                 <a:t>fetched_instruction</a:t>
               </a:r>
-              <a:endParaRPr lang="en-US" sz="1600" dirty="0"/>
             </a:p>
           </p:txBody>
         </p:sp>
@@ -9101,7 +9060,7 @@
             <a:p>
               <a:pPr algn="ctr"/>
               <a:r>
-                <a:rPr lang="en-US" sz="1798" dirty="0" smtClean="0">
+                <a:rPr lang="en-US" sz="1798" dirty="0">
                   <a:solidFill>
                     <a:schemeClr val="tx1"/>
                   </a:solidFill>
@@ -9109,7 +9068,7 @@
                 <a:t>Memory</a:t>
               </a:r>
               <a:r>
-                <a:rPr lang="fa-IR" sz="1798" dirty="0" smtClean="0">
+                <a:rPr lang="fa-IR" sz="1798" dirty="0">
                   <a:solidFill>
                     <a:schemeClr val="tx1"/>
                   </a:solidFill>
@@ -9117,18 +9076,13 @@
                 <a:t> </a:t>
               </a:r>
               <a:r>
-                <a:rPr lang="en-US" sz="1798" dirty="0" smtClean="0">
+                <a:rPr lang="en-US" sz="1798" dirty="0">
                   <a:solidFill>
                     <a:schemeClr val="tx1"/>
                   </a:solidFill>
                 </a:rPr>
                 <a:t> Interface</a:t>
               </a:r>
-              <a:endParaRPr lang="en-US" sz="1798" dirty="0">
-                <a:solidFill>
-                  <a:schemeClr val="tx1"/>
-                </a:solidFill>
-              </a:endParaRPr>
             </a:p>
           </p:txBody>
         </p:sp>
@@ -9280,10 +9234,9 @@
               <a:lstStyle/>
               <a:p>
                 <a:r>
-                  <a:rPr lang="en-US" sz="1800" dirty="0" smtClean="0"/>
+                  <a:rPr lang="en-US" sz="1800" dirty="0"/>
                   <a:t>instruction</a:t>
                 </a:r>
-                <a:endParaRPr lang="en-US" sz="1800" dirty="0"/>
               </a:p>
             </p:txBody>
           </p:sp>
@@ -9311,18 +9264,13 @@
             <a:lstStyle/>
             <a:p>
               <a:r>
-                <a:rPr lang="en-US" sz="1600" dirty="0" smtClean="0">
+                <a:rPr lang="en-US" sz="1600" dirty="0">
                   <a:solidFill>
                     <a:srgbClr val="7030A0"/>
                   </a:solidFill>
                 </a:rPr>
                 <a:t>immediate</a:t>
               </a:r>
-              <a:endParaRPr lang="en-US" sz="1600" dirty="0">
-                <a:solidFill>
-                  <a:srgbClr val="7030A0"/>
-                </a:solidFill>
-              </a:endParaRPr>
             </a:p>
           </p:txBody>
         </p:sp>
@@ -9350,13 +9298,8 @@
             <a:p>
               <a:r>
                 <a:rPr lang="en-US" sz="1600" dirty="0"/>
-                <a:t>i</a:t>
+                <a:t>instruction_type</a:t>
               </a:r>
-              <a:r>
-                <a:rPr lang="en-US" sz="1600" dirty="0" smtClean="0"/>
-                <a:t>nstruction_type</a:t>
-              </a:r>
-              <a:endParaRPr lang="en-US" sz="1600" dirty="0"/>
             </a:p>
           </p:txBody>
         </p:sp>
@@ -9588,10 +9531,9 @@
             <a:lstStyle/>
             <a:p>
               <a:r>
-                <a:rPr lang="en-US" sz="1400" dirty="0" smtClean="0"/>
+                <a:rPr lang="en-US" sz="1400" dirty="0"/>
                 <a:t>read_index_1</a:t>
               </a:r>
-              <a:endParaRPr lang="en-US" sz="1400" dirty="0"/>
             </a:p>
           </p:txBody>
         </p:sp>
@@ -9654,10 +9596,9 @@
             <a:lstStyle/>
             <a:p>
               <a:r>
-                <a:rPr lang="en-US" sz="1400" dirty="0" smtClean="0"/>
+                <a:rPr lang="en-US" sz="1400" dirty="0"/>
                 <a:t>read_index_2</a:t>
               </a:r>
-              <a:endParaRPr lang="en-US" sz="1400" dirty="0"/>
             </a:p>
           </p:txBody>
         </p:sp>
@@ -9724,10 +9665,9 @@
             <a:lstStyle/>
             <a:p>
               <a:r>
-                <a:rPr lang="en-US" sz="1400" dirty="0" smtClean="0"/>
+                <a:rPr lang="en-US" sz="1400" dirty="0"/>
                 <a:t>write_index</a:t>
               </a:r>
-              <a:endParaRPr lang="en-US" sz="1400" dirty="0"/>
             </a:p>
           </p:txBody>
         </p:sp>
@@ -9836,21 +9776,8 @@
                     <a:srgbClr val="FF0000"/>
                   </a:solidFill>
                 </a:rPr>
-                <a:t>r</a:t>
+                <a:t>read_enable_1</a:t>
               </a:r>
-              <a:r>
-                <a:rPr lang="en-US" sz="1400" dirty="0" smtClean="0">
-                  <a:solidFill>
-                    <a:srgbClr val="FF0000"/>
-                  </a:solidFill>
-                </a:rPr>
-                <a:t>ead_enable_1</a:t>
-              </a:r>
-              <a:endParaRPr lang="en-US" sz="1400" dirty="0">
-                <a:solidFill>
-                  <a:srgbClr val="FF0000"/>
-                </a:solidFill>
-              </a:endParaRPr>
             </a:p>
           </p:txBody>
         </p:sp>
@@ -9877,18 +9804,13 @@
             <a:lstStyle/>
             <a:p>
               <a:r>
-                <a:rPr lang="en-US" sz="1400" dirty="0" smtClean="0">
+                <a:rPr lang="en-US" sz="1400" dirty="0">
                   <a:solidFill>
                     <a:srgbClr val="FF0000"/>
                   </a:solidFill>
                 </a:rPr>
                 <a:t>read_enable_2</a:t>
               </a:r>
-              <a:endParaRPr lang="en-US" sz="1400" dirty="0">
-                <a:solidFill>
-                  <a:srgbClr val="FF0000"/>
-                </a:solidFill>
-              </a:endParaRPr>
             </a:p>
           </p:txBody>
         </p:sp>
@@ -9939,18 +9861,13 @@
             <a:p>
               <a:pPr algn="ctr"/>
               <a:r>
-                <a:rPr lang="en-US" sz="1600" dirty="0" smtClean="0">
+                <a:rPr lang="en-US" sz="1600" dirty="0">
                   <a:solidFill>
                     <a:srgbClr val="FF0000"/>
                   </a:solidFill>
                 </a:rPr>
                 <a:t>RegFile Control Logic</a:t>
               </a:r>
-              <a:endParaRPr lang="en-US" sz="1600" dirty="0">
-                <a:solidFill>
-                  <a:srgbClr val="FF0000"/>
-                </a:solidFill>
-              </a:endParaRPr>
             </a:p>
           </p:txBody>
         </p:sp>
@@ -10015,18 +9932,13 @@
             <a:lstStyle/>
             <a:p>
               <a:r>
-                <a:rPr lang="en-US" sz="1400" dirty="0" smtClean="0">
+                <a:rPr lang="en-US" sz="1400" dirty="0">
                   <a:solidFill>
                     <a:srgbClr val="FF0000"/>
                   </a:solidFill>
                 </a:rPr>
                 <a:t>write_enable</a:t>
               </a:r>
-              <a:endParaRPr lang="en-US" sz="1400" dirty="0">
-                <a:solidFill>
-                  <a:srgbClr val="FF0000"/>
-                </a:solidFill>
-              </a:endParaRPr>
             </a:p>
           </p:txBody>
         </p:sp>
@@ -10302,10 +10214,9 @@
             <a:lstStyle/>
             <a:p>
               <a:r>
-                <a:rPr lang="en-US" sz="1400" dirty="0" smtClean="0"/>
+                <a:rPr lang="en-US" sz="1400" dirty="0"/>
                 <a:t>bus_rs1</a:t>
               </a:r>
-              <a:endParaRPr lang="en-US" sz="1400" dirty="0"/>
             </a:p>
           </p:txBody>
         </p:sp>
@@ -10332,10 +10243,9 @@
             <a:lstStyle/>
             <a:p>
               <a:r>
-                <a:rPr lang="en-US" sz="1400" dirty="0" smtClean="0"/>
+                <a:rPr lang="en-US" sz="1400" dirty="0"/>
                 <a:t>bus_rs2</a:t>
               </a:r>
-              <a:endParaRPr lang="en-US" sz="1400" dirty="0"/>
             </a:p>
           </p:txBody>
         </p:sp>
@@ -10400,10 +10310,9 @@
             <a:lstStyle/>
             <a:p>
               <a:r>
-                <a:rPr lang="en-US" sz="1400" dirty="0" smtClean="0"/>
+                <a:rPr lang="en-US" sz="1400" dirty="0"/>
                 <a:t>RF_source_1</a:t>
               </a:r>
-              <a:endParaRPr lang="en-US" sz="1400" dirty="0"/>
             </a:p>
           </p:txBody>
         </p:sp>
@@ -10470,10 +10379,9 @@
             <a:lstStyle/>
             <a:p>
               <a:r>
-                <a:rPr lang="en-US" sz="1400" dirty="0" smtClean="0"/>
+                <a:rPr lang="en-US" sz="1400" dirty="0"/>
                 <a:t>RF_source_2</a:t>
               </a:r>
-              <a:endParaRPr lang="en-US" sz="1400" dirty="0"/>
             </a:p>
           </p:txBody>
         </p:sp>
@@ -10635,18 +10543,13 @@
             <a:lstStyle/>
             <a:p>
               <a:r>
-                <a:rPr lang="en-US" sz="1400" dirty="0" smtClean="0">
+                <a:rPr lang="en-US" sz="1400" dirty="0">
                   <a:solidFill>
                     <a:srgbClr val="00B050"/>
                   </a:solidFill>
                 </a:rPr>
                 <a:t>FWD_data</a:t>
               </a:r>
-              <a:endParaRPr lang="en-US" sz="1400" dirty="0">
-                <a:solidFill>
-                  <a:srgbClr val="00B050"/>
-                </a:solidFill>
-              </a:endParaRPr>
             </a:p>
           </p:txBody>
         </p:sp>
@@ -10849,10 +10752,9 @@
             <a:lstStyle/>
             <a:p>
               <a:r>
-                <a:rPr lang="en-US" sz="1400" dirty="0" smtClean="0"/>
+                <a:rPr lang="en-US" sz="1400" dirty="0"/>
                 <a:t>opcode</a:t>
               </a:r>
-              <a:endParaRPr lang="en-US" sz="1400" dirty="0"/>
             </a:p>
           </p:txBody>
         </p:sp>
@@ -10879,10 +10781,9 @@
             <a:lstStyle/>
             <a:p>
               <a:r>
-                <a:rPr lang="en-US" sz="1400" dirty="0" smtClean="0"/>
+                <a:rPr lang="en-US" sz="1400" dirty="0"/>
                 <a:t>funct7</a:t>
               </a:r>
-              <a:endParaRPr lang="en-US" sz="1400" dirty="0"/>
             </a:p>
           </p:txBody>
         </p:sp>
@@ -10909,10 +10810,9 @@
             <a:lstStyle/>
             <a:p>
               <a:r>
-                <a:rPr lang="en-US" sz="1400" dirty="0" smtClean="0"/>
+                <a:rPr lang="en-US" sz="1400" dirty="0"/>
                 <a:t>funct3</a:t>
               </a:r>
-              <a:endParaRPr lang="en-US" sz="1400" dirty="0"/>
             </a:p>
           </p:txBody>
         </p:sp>
@@ -11080,18 +10980,13 @@
             <a:p>
               <a:pPr algn="ctr"/>
               <a:r>
-                <a:rPr lang="en-US" dirty="0" smtClean="0">
+                <a:rPr lang="en-US" dirty="0">
                   <a:solidFill>
                     <a:schemeClr val="tx1"/>
                   </a:solidFill>
                 </a:rPr>
                 <a:t>+</a:t>
               </a:r>
-              <a:endParaRPr lang="en-US" dirty="0">
-                <a:solidFill>
-                  <a:schemeClr val="tx1"/>
-                </a:solidFill>
-              </a:endParaRPr>
             </a:p>
           </p:txBody>
         </p:sp>
@@ -11233,10 +11128,9 @@
             <a:lstStyle/>
             <a:p>
               <a:r>
-                <a:rPr lang="en-US" sz="1600" dirty="0" smtClean="0"/>
+                <a:rPr lang="en-US" sz="1600" dirty="0"/>
                 <a:t>address</a:t>
               </a:r>
-              <a:endParaRPr lang="en-US" sz="1600" dirty="0"/>
             </a:p>
           </p:txBody>
         </p:sp>
@@ -11263,18 +11157,13 @@
             <a:lstStyle/>
             <a:p>
               <a:r>
-                <a:rPr lang="en-US" sz="1600" dirty="0" smtClean="0">
+                <a:rPr lang="en-US" sz="1600" dirty="0">
                   <a:solidFill>
                     <a:srgbClr val="7030A0"/>
                   </a:solidFill>
                 </a:rPr>
                 <a:t>immediate</a:t>
               </a:r>
-              <a:endParaRPr lang="en-US" sz="1600" dirty="0">
-                <a:solidFill>
-                  <a:srgbClr val="7030A0"/>
-                </a:solidFill>
-              </a:endParaRPr>
             </a:p>
           </p:txBody>
         </p:sp>
@@ -11337,10 +11226,9 @@
             <a:lstStyle/>
             <a:p>
               <a:r>
-                <a:rPr lang="en-US" sz="1400" dirty="0" smtClean="0"/>
+                <a:rPr lang="en-US" sz="1400" dirty="0"/>
                 <a:t>PC</a:t>
               </a:r>
-              <a:endParaRPr lang="en-US" sz="1400" dirty="0"/>
             </a:p>
           </p:txBody>
         </p:sp>
@@ -11403,10 +11291,9 @@
             <a:lstStyle/>
             <a:p>
               <a:r>
-                <a:rPr lang="en-US" sz="1400" dirty="0" smtClean="0"/>
+                <a:rPr lang="en-US" sz="1400" dirty="0"/>
                 <a:t>rs_1</a:t>
               </a:r>
-              <a:endParaRPr lang="en-US" sz="1400" dirty="0"/>
             </a:p>
           </p:txBody>
         </p:sp>
@@ -12149,10 +12036,9 @@
               <a:lstStyle/>
               <a:p>
                 <a:r>
-                  <a:rPr lang="en-US" sz="1600" dirty="0" smtClean="0"/>
+                  <a:rPr lang="en-US" sz="1600" dirty="0"/>
                   <a:t>ALU</a:t>
                 </a:r>
-                <a:endParaRPr lang="en-US" sz="1600" dirty="0"/>
               </a:p>
             </p:txBody>
           </p:sp>
@@ -12417,13 +12303,8 @@
             <a:p>
               <a:r>
                 <a:rPr lang="en-US" sz="1200" dirty="0"/>
-                <a:t>o</a:t>
+                <a:t>operand_1</a:t>
               </a:r>
-              <a:r>
-                <a:rPr lang="en-US" sz="1200" dirty="0" smtClean="0"/>
-                <a:t>perand_1</a:t>
-              </a:r>
-              <a:endParaRPr lang="en-US" sz="1200" dirty="0"/>
             </a:p>
           </p:txBody>
         </p:sp>
@@ -12450,10 +12331,9 @@
             <a:lstStyle/>
             <a:p>
               <a:r>
-                <a:rPr lang="en-US" sz="1200" dirty="0" smtClean="0"/>
+                <a:rPr lang="en-US" sz="1200" dirty="0"/>
                 <a:t>operand_2</a:t>
               </a:r>
-              <a:endParaRPr lang="en-US" sz="1200" dirty="0"/>
             </a:p>
           </p:txBody>
         </p:sp>
@@ -12516,10 +12396,9 @@
             <a:lstStyle/>
             <a:p>
               <a:r>
-                <a:rPr lang="en-US" sz="1400" dirty="0" smtClean="0"/>
+                <a:rPr lang="en-US" sz="1400" dirty="0"/>
                 <a:t>PC</a:t>
               </a:r>
-              <a:endParaRPr lang="en-US" sz="1400" dirty="0"/>
             </a:p>
           </p:txBody>
         </p:sp>
@@ -12582,10 +12461,9 @@
             <a:lstStyle/>
             <a:p>
               <a:r>
-                <a:rPr lang="en-US" sz="1400" dirty="0" smtClean="0"/>
+                <a:rPr lang="en-US" sz="1400" dirty="0"/>
                 <a:t>rs_1</a:t>
               </a:r>
-              <a:endParaRPr lang="en-US" sz="1400" dirty="0"/>
             </a:p>
           </p:txBody>
         </p:sp>
@@ -12782,10 +12660,9 @@
             <a:lstStyle/>
             <a:p>
               <a:r>
-                <a:rPr lang="en-US" sz="1400" dirty="0" smtClean="0"/>
+                <a:rPr lang="en-US" sz="1400" dirty="0"/>
                 <a:t>rs_2</a:t>
               </a:r>
-              <a:endParaRPr lang="en-US" sz="1400" dirty="0"/>
             </a:p>
           </p:txBody>
         </p:sp>
@@ -12850,18 +12727,13 @@
             <a:lstStyle/>
             <a:p>
               <a:r>
-                <a:rPr lang="en-US" sz="1100" dirty="0" smtClean="0">
+                <a:rPr lang="en-US" sz="1100" dirty="0">
                   <a:solidFill>
                     <a:srgbClr val="7030A0"/>
                   </a:solidFill>
                 </a:rPr>
                 <a:t>immediate</a:t>
               </a:r>
-              <a:endParaRPr lang="en-US" sz="1100" dirty="0">
-                <a:solidFill>
-                  <a:srgbClr val="7030A0"/>
-                </a:solidFill>
-              </a:endParaRPr>
             </a:p>
           </p:txBody>
         </p:sp>
@@ -12924,10 +12796,9 @@
             <a:lstStyle/>
             <a:p>
               <a:r>
-                <a:rPr lang="en-US" sz="1200" dirty="0" smtClean="0"/>
+                <a:rPr lang="en-US" sz="1200" dirty="0"/>
                 <a:t>32’d4</a:t>
               </a:r>
-              <a:endParaRPr lang="en-US" sz="1200" dirty="0"/>
             </a:p>
           </p:txBody>
         </p:sp>
@@ -12984,18 +12855,13 @@
             <a:p>
               <a:pPr algn="ctr"/>
               <a:r>
-                <a:rPr lang="en-US" sz="1798" dirty="0" smtClean="0">
+                <a:rPr lang="en-US" sz="1798" dirty="0">
                   <a:solidFill>
                     <a:schemeClr val="tx1"/>
                   </a:solidFill>
                 </a:rPr>
                 <a:t>Jump Branch Unit</a:t>
               </a:r>
-              <a:endParaRPr lang="en-US" sz="1798" dirty="0">
-                <a:solidFill>
-                  <a:schemeClr val="tx1"/>
-                </a:solidFill>
-              </a:endParaRPr>
             </a:p>
           </p:txBody>
         </p:sp>
@@ -13256,13 +13122,8 @@
             <a:p>
               <a:r>
                 <a:rPr lang="en-US" sz="1600" dirty="0"/>
-                <a:t>i</a:t>
+                <a:t>instruction_type</a:t>
               </a:r>
-              <a:r>
-                <a:rPr lang="en-US" sz="1600" dirty="0" smtClean="0"/>
-                <a:t>nstruction_type</a:t>
-              </a:r>
-              <a:endParaRPr lang="en-US" sz="1600" dirty="0"/>
             </a:p>
           </p:txBody>
         </p:sp>
@@ -13458,18 +13319,13 @@
             <a:p>
               <a:pPr algn="ctr"/>
               <a:r>
-                <a:rPr lang="en-US" sz="1600" dirty="0" smtClean="0">
+                <a:rPr lang="en-US" sz="1600" dirty="0">
                   <a:solidFill>
                     <a:schemeClr val="tx1"/>
                   </a:solidFill>
                 </a:rPr>
                 <a:t>Additional EXEC Unit (MUL/DIV/FPU)</a:t>
               </a:r>
-              <a:endParaRPr lang="en-US" sz="1600" dirty="0">
-                <a:solidFill>
-                  <a:schemeClr val="tx1"/>
-                </a:solidFill>
-              </a:endParaRPr>
             </a:p>
           </p:txBody>
         </p:sp>
@@ -13660,10 +13516,9 @@
             <a:lstStyle/>
             <a:p>
               <a:r>
-                <a:rPr lang="en-US" sz="1200" dirty="0" smtClean="0"/>
+                <a:rPr lang="en-US" sz="1200" dirty="0"/>
                 <a:t>jump_branch_enable</a:t>
               </a:r>
-              <a:endParaRPr lang="en-US" sz="1200" dirty="0"/>
             </a:p>
           </p:txBody>
         </p:sp>
@@ -13719,7 +13574,7 @@
             <a:p>
               <a:pPr algn="ctr"/>
               <a:r>
-                <a:rPr lang="en-US" sz="1798" dirty="0" smtClean="0">
+                <a:rPr lang="en-US" sz="1798" dirty="0">
                   <a:solidFill>
                     <a:schemeClr val="tx1"/>
                   </a:solidFill>
@@ -13730,7 +13585,7 @@
             <a:p>
               <a:pPr algn="ctr"/>
               <a:r>
-                <a:rPr lang="en-US" sz="1798" dirty="0" smtClean="0">
+                <a:rPr lang="en-US" sz="1798" dirty="0">
                   <a:solidFill>
                     <a:schemeClr val="tx1"/>
                   </a:solidFill>
@@ -13741,18 +13596,13 @@
             <a:p>
               <a:pPr algn="ctr"/>
               <a:r>
-                <a:rPr lang="en-US" sz="1798" dirty="0" smtClean="0">
+                <a:rPr lang="en-US" sz="1798" dirty="0">
                   <a:solidFill>
                     <a:schemeClr val="tx1"/>
                   </a:solidFill>
                 </a:rPr>
                 <a:t>Unit</a:t>
               </a:r>
-              <a:endParaRPr lang="en-US" sz="1798" dirty="0">
-                <a:solidFill>
-                  <a:schemeClr val="tx1"/>
-                </a:solidFill>
-              </a:endParaRPr>
             </a:p>
           </p:txBody>
         </p:sp>
@@ -13779,27 +13629,28 @@
             <a:lstStyle/>
             <a:p>
               <a:r>
-                <a:rPr lang="en-US" sz="1400" dirty="0" smtClean="0"/>
+                <a:rPr lang="en-US" sz="1400" dirty="0"/>
                 <a:t>bus_rs2</a:t>
               </a:r>
-              <a:endParaRPr lang="en-US" sz="1400" dirty="0"/>
             </a:p>
           </p:txBody>
         </p:sp>
         <p:cxnSp>
           <p:nvCxnSpPr>
             <p:cNvPr id="510" name="Elbow Connector 509"/>
-            <p:cNvCxnSpPr/>
+            <p:cNvCxnSpPr>
+              <a:cxnSpLocks/>
+            </p:cNvCxnSpPr>
             <p:nvPr/>
           </p:nvCxnSpPr>
           <p:spPr>
             <a:xfrm>
               <a:off x="12456330" y="2980823"/>
-              <a:ext cx="840176" cy="636544"/>
+              <a:ext cx="969226" cy="636544"/>
             </a:xfrm>
             <a:prstGeom prst="bentConnector3">
               <a:avLst>
-                <a:gd name="adj1" fmla="val 99882"/>
+                <a:gd name="adj1" fmla="val 100316"/>
               </a:avLst>
             </a:prstGeom>
             <a:ln w="12700">
@@ -14099,10 +13950,9 @@
             <a:lstStyle/>
             <a:p>
               <a:r>
-                <a:rPr lang="en-US" sz="1600" dirty="0" smtClean="0"/>
+                <a:rPr lang="en-US" sz="1600" dirty="0"/>
                 <a:t>address</a:t>
               </a:r>
-              <a:endParaRPr lang="en-US" sz="1600" dirty="0"/>
             </a:p>
           </p:txBody>
         </p:sp>
@@ -14203,10 +14053,9 @@
             <a:lstStyle/>
             <a:p>
               <a:r>
-                <a:rPr lang="en-US" sz="1400" dirty="0" smtClean="0"/>
+                <a:rPr lang="en-US" sz="1400" dirty="0"/>
                 <a:t>opcode</a:t>
               </a:r>
-              <a:endParaRPr lang="en-US" sz="1400" dirty="0"/>
             </a:p>
           </p:txBody>
         </p:sp>
@@ -14233,10 +14082,9 @@
             <a:lstStyle/>
             <a:p>
               <a:r>
-                <a:rPr lang="en-US" sz="1400" dirty="0" smtClean="0"/>
+                <a:rPr lang="en-US" sz="1400" dirty="0"/>
                 <a:t>funct3</a:t>
               </a:r>
-              <a:endParaRPr lang="en-US" sz="1400" dirty="0"/>
             </a:p>
           </p:txBody>
         </p:sp>
@@ -14263,10 +14111,9 @@
             <a:lstStyle/>
             <a:p>
               <a:r>
-                <a:rPr lang="en-US" sz="1400" dirty="0" smtClean="0"/>
+                <a:rPr lang="en-US" sz="1400" dirty="0"/>
                 <a:t>(store_data)</a:t>
               </a:r>
-              <a:endParaRPr lang="en-US" sz="1400" dirty="0"/>
             </a:p>
           </p:txBody>
         </p:sp>
@@ -14331,7 +14178,7 @@
             <a:lstStyle/>
             <a:p>
               <a:r>
-                <a:rPr lang="en-US" sz="1400" dirty="0" err="1" smtClean="0"/>
+                <a:rPr lang="en-US" sz="1400" dirty="0" err="1"/>
                 <a:t>load_data</a:t>
               </a:r>
               <a:endParaRPr lang="en-US" sz="1400" dirty="0"/>
@@ -14390,7 +14237,7 @@
             <a:p>
               <a:pPr algn="ctr"/>
               <a:r>
-                <a:rPr lang="en-US" sz="1798" dirty="0" smtClean="0">
+                <a:rPr lang="en-US" sz="1798" dirty="0">
                   <a:solidFill>
                     <a:schemeClr val="tx1"/>
                   </a:solidFill>
@@ -14401,18 +14248,13 @@
             <a:p>
               <a:pPr algn="ctr"/>
               <a:r>
-                <a:rPr lang="en-US" sz="1798" dirty="0" smtClean="0">
+                <a:rPr lang="en-US" sz="1798" dirty="0">
                   <a:solidFill>
                     <a:schemeClr val="tx1"/>
                   </a:solidFill>
                 </a:rPr>
                 <a:t>(Write)</a:t>
               </a:r>
-              <a:endParaRPr lang="en-US" sz="1798" dirty="0">
-                <a:solidFill>
-                  <a:schemeClr val="tx1"/>
-                </a:solidFill>
-              </a:endParaRPr>
             </a:p>
           </p:txBody>
         </p:sp>
@@ -14478,7 +14320,7 @@
             <a:lstStyle/>
             <a:p>
               <a:r>
-                <a:rPr lang="en-US" sz="1400" dirty="0" err="1" smtClean="0"/>
+                <a:rPr lang="en-US" sz="1400" dirty="0" err="1"/>
                 <a:t>write_data</a:t>
               </a:r>
               <a:endParaRPr lang="en-US" sz="1400" dirty="0"/>
@@ -14618,10 +14460,9 @@
             <a:lstStyle/>
             <a:p>
               <a:r>
-                <a:rPr lang="en-US" sz="1600" dirty="0" smtClean="0"/>
+                <a:rPr lang="en-US" sz="1600" dirty="0"/>
                 <a:t>immediate</a:t>
               </a:r>
-              <a:endParaRPr lang="en-US" sz="1600" dirty="0"/>
             </a:p>
           </p:txBody>
         </p:sp>
@@ -14649,11 +14490,7 @@
             <a:p>
               <a:r>
                 <a:rPr lang="en-US" sz="1600" dirty="0" err="1"/>
-                <a:t>l</a:t>
-              </a:r>
-              <a:r>
-                <a:rPr lang="en-US" sz="1600" dirty="0" err="1" smtClean="0"/>
-                <a:t>oad_data</a:t>
+                <a:t>load_data</a:t>
               </a:r>
               <a:endParaRPr lang="en-US" sz="1600" dirty="0"/>
             </a:p>
@@ -14682,7 +14519,7 @@
             <a:lstStyle/>
             <a:p>
               <a:r>
-                <a:rPr lang="en-US" sz="1600" dirty="0" err="1" smtClean="0"/>
+                <a:rPr lang="en-US" sz="1600" dirty="0" err="1"/>
                 <a:t>alu_output</a:t>
               </a:r>
               <a:endParaRPr lang="en-US" sz="1600" dirty="0"/>
@@ -14712,10 +14549,9 @@
             <a:lstStyle/>
             <a:p>
               <a:r>
-                <a:rPr lang="en-US" sz="1400" dirty="0" smtClean="0"/>
+                <a:rPr lang="en-US" sz="1400" dirty="0"/>
                 <a:t>write_index</a:t>
               </a:r>
-              <a:endParaRPr lang="en-US" sz="1400" dirty="0"/>
             </a:p>
           </p:txBody>
         </p:sp>
@@ -14742,18 +14578,13 @@
             <a:lstStyle/>
             <a:p>
               <a:r>
-                <a:rPr lang="en-US" sz="1400" dirty="0" smtClean="0">
+                <a:rPr lang="en-US" sz="1400" dirty="0">
                   <a:solidFill>
                     <a:srgbClr val="FF0000"/>
                   </a:solidFill>
                 </a:rPr>
                 <a:t>write_enable</a:t>
               </a:r>
-              <a:endParaRPr lang="en-US" sz="1400" dirty="0">
-                <a:solidFill>
-                  <a:srgbClr val="FF0000"/>
-                </a:solidFill>
-              </a:endParaRPr>
             </a:p>
           </p:txBody>
         </p:sp>
@@ -14844,13 +14675,6 @@
   <p:clrMapOvr>
     <a:masterClrMapping/>
   </p:clrMapOvr>
-  <p:timing>
-    <p:tnLst>
-      <p:par>
-        <p:cTn id="1" dur="indefinite" restart="never" nodeType="tmRoot"/>
-      </p:par>
-    </p:tnLst>
-  </p:timing>
 </p:sld>
 </file>
 
@@ -14871,6 +14695,129 @@
           <a:chExt cx="0" cy="0"/>
         </a:xfrm>
       </p:grpSpPr>
+      <p:grpSp>
+        <p:nvGrpSpPr>
+          <p:cNvPr id="514" name="Group 513"/>
+          <p:cNvGrpSpPr/>
+          <p:nvPr/>
+        </p:nvGrpSpPr>
+        <p:grpSpPr>
+          <a:xfrm>
+            <a:off x="12620854" y="1322832"/>
+            <a:ext cx="1800734" cy="281940"/>
+            <a:chOff x="8832429" y="1844040"/>
+            <a:chExt cx="3298126" cy="281940"/>
+          </a:xfrm>
+        </p:grpSpPr>
+        <p:cxnSp>
+          <p:nvCxnSpPr>
+            <p:cNvPr id="515" name="Straight Arrow Connector 514"/>
+            <p:cNvCxnSpPr/>
+            <p:nvPr/>
+          </p:nvCxnSpPr>
+          <p:spPr>
+            <a:xfrm>
+              <a:off x="8843315" y="1844040"/>
+              <a:ext cx="3287240" cy="0"/>
+            </a:xfrm>
+            <a:prstGeom prst="straightConnector1">
+              <a:avLst/>
+            </a:prstGeom>
+            <a:ln w="12700">
+              <a:solidFill>
+                <a:schemeClr val="tx1"/>
+              </a:solidFill>
+              <a:tailEnd type="triangle"/>
+            </a:ln>
+          </p:spPr>
+          <p:style>
+            <a:lnRef idx="1">
+              <a:schemeClr val="accent1"/>
+            </a:lnRef>
+            <a:fillRef idx="0">
+              <a:schemeClr val="accent1"/>
+            </a:fillRef>
+            <a:effectRef idx="0">
+              <a:schemeClr val="accent1"/>
+            </a:effectRef>
+            <a:fontRef idx="minor">
+              <a:schemeClr val="tx1"/>
+            </a:fontRef>
+          </p:style>
+        </p:cxnSp>
+        <p:cxnSp>
+          <p:nvCxnSpPr>
+            <p:cNvPr id="516" name="Straight Arrow Connector 515"/>
+            <p:cNvCxnSpPr/>
+            <p:nvPr/>
+          </p:nvCxnSpPr>
+          <p:spPr>
+            <a:xfrm>
+              <a:off x="8835176" y="1981200"/>
+              <a:ext cx="3287240" cy="0"/>
+            </a:xfrm>
+            <a:prstGeom prst="straightConnector1">
+              <a:avLst/>
+            </a:prstGeom>
+            <a:ln w="12700">
+              <a:solidFill>
+                <a:schemeClr val="tx1"/>
+              </a:solidFill>
+              <a:tailEnd type="triangle"/>
+            </a:ln>
+          </p:spPr>
+          <p:style>
+            <a:lnRef idx="1">
+              <a:schemeClr val="accent1"/>
+            </a:lnRef>
+            <a:fillRef idx="0">
+              <a:schemeClr val="accent1"/>
+            </a:fillRef>
+            <a:effectRef idx="0">
+              <a:schemeClr val="accent1"/>
+            </a:effectRef>
+            <a:fontRef idx="minor">
+              <a:schemeClr val="tx1"/>
+            </a:fontRef>
+          </p:style>
+        </p:cxnSp>
+        <p:cxnSp>
+          <p:nvCxnSpPr>
+            <p:cNvPr id="517" name="Straight Arrow Connector 516"/>
+            <p:cNvCxnSpPr/>
+            <p:nvPr/>
+          </p:nvCxnSpPr>
+          <p:spPr>
+            <a:xfrm>
+              <a:off x="8832429" y="2125980"/>
+              <a:ext cx="3287240" cy="0"/>
+            </a:xfrm>
+            <a:prstGeom prst="straightConnector1">
+              <a:avLst/>
+            </a:prstGeom>
+            <a:ln w="12700">
+              <a:solidFill>
+                <a:schemeClr val="tx1"/>
+              </a:solidFill>
+              <a:tailEnd type="triangle"/>
+            </a:ln>
+          </p:spPr>
+          <p:style>
+            <a:lnRef idx="1">
+              <a:schemeClr val="accent1"/>
+            </a:lnRef>
+            <a:fillRef idx="0">
+              <a:schemeClr val="accent1"/>
+            </a:fillRef>
+            <a:effectRef idx="0">
+              <a:schemeClr val="accent1"/>
+            </a:effectRef>
+            <a:fontRef idx="minor">
+              <a:schemeClr val="tx1"/>
+            </a:fontRef>
+          </p:style>
+        </p:cxnSp>
+      </p:grpSp>
       <p:cxnSp>
         <p:nvCxnSpPr>
           <p:cNvPr id="504" name="Elbow Connector 503"/>
@@ -15082,8 +15029,8 @@
         </p:nvSpPr>
         <p:spPr>
           <a:xfrm>
-            <a:off x="415957" y="1013678"/>
-            <a:ext cx="16330194" cy="7151914"/>
+            <a:off x="415956" y="1013677"/>
+            <a:ext cx="16452171" cy="7970507"/>
           </a:xfrm>
           <a:prstGeom prst="roundRect">
             <a:avLst>
@@ -15221,7 +15168,7 @@
           <a:p>
             <a:pPr algn="ctr"/>
             <a:r>
-              <a:rPr lang="en-US" sz="1798" dirty="0" smtClean="0">
+              <a:rPr lang="en-US" sz="1798" dirty="0">
                 <a:solidFill>
                   <a:schemeClr val="tx1"/>
                 </a:solidFill>
@@ -15232,18 +15179,13 @@
           <a:p>
             <a:pPr algn="ctr"/>
             <a:r>
-              <a:rPr lang="en-US" sz="1798" dirty="0" smtClean="0">
+              <a:rPr lang="en-US" sz="1798" dirty="0">
                 <a:solidFill>
                   <a:schemeClr val="tx1"/>
                 </a:solidFill>
               </a:rPr>
               <a:t>(Read)</a:t>
             </a:r>
-            <a:endParaRPr lang="en-US" sz="1798" dirty="0">
-              <a:solidFill>
-                <a:schemeClr val="tx1"/>
-              </a:solidFill>
-            </a:endParaRPr>
           </a:p>
         </p:txBody>
       </p:sp>
@@ -15338,21 +15280,8 @@
                   <a:schemeClr val="tx1"/>
                 </a:solidFill>
               </a:rPr>
-              <a:t>I</a:t>
+              <a:t>Immediate Generator</a:t>
             </a:r>
-            <a:r>
-              <a:rPr lang="en-US" sz="1798" dirty="0" smtClean="0">
-                <a:solidFill>
-                  <a:schemeClr val="tx1"/>
-                </a:solidFill>
-              </a:rPr>
-              <a:t>mmediate Generator</a:t>
-            </a:r>
-            <a:endParaRPr lang="en-US" sz="1798" dirty="0">
-              <a:solidFill>
-                <a:schemeClr val="tx1"/>
-              </a:solidFill>
-            </a:endParaRPr>
           </a:p>
         </p:txBody>
       </p:sp>
@@ -15400,10 +15329,10 @@
         </p:nvGrpSpPr>
         <p:grpSpPr>
           <a:xfrm>
-            <a:off x="14450688" y="1172160"/>
-            <a:ext cx="507476" cy="6875955"/>
-            <a:chOff x="4944353" y="2024407"/>
-            <a:chExt cx="507477" cy="1545997"/>
+            <a:off x="14421589" y="1172160"/>
+            <a:ext cx="583603" cy="6875955"/>
+            <a:chOff x="4915252" y="2024407"/>
+            <a:chExt cx="583604" cy="1545997"/>
           </a:xfrm>
           <a:solidFill>
             <a:schemeClr val="bg2"/>
@@ -15417,8 +15346,8 @@
           </p:nvSpPr>
           <p:spPr>
             <a:xfrm>
-              <a:off x="4944353" y="2024407"/>
-              <a:ext cx="507477" cy="1545996"/>
+              <a:off x="4915252" y="2024407"/>
+              <a:ext cx="583604" cy="1545996"/>
             </a:xfrm>
             <a:prstGeom prst="roundRect">
               <a:avLst>
@@ -15459,18 +15388,35 @@
             <a:p>
               <a:pPr algn="ctr"/>
               <a:r>
-                <a:rPr lang="en-US" sz="1100" dirty="0" smtClean="0">
+                <a:rPr lang="en-US" sz="1800" b="1" dirty="0">
                   <a:solidFill>
                     <a:schemeClr val="tx1"/>
                   </a:solidFill>
                 </a:rPr>
-                <a:t>MEM</a:t>
+                <a:t>MA</a:t>
               </a:r>
-              <a:endParaRPr lang="en-US" sz="1100" dirty="0">
-                <a:solidFill>
-                  <a:schemeClr val="tx1"/>
-                </a:solidFill>
-              </a:endParaRPr>
+            </a:p>
+            <a:p>
+              <a:pPr algn="ctr"/>
+              <a:r>
+                <a:rPr lang="en-US" sz="1800" b="1" dirty="0">
+                  <a:solidFill>
+                    <a:schemeClr val="tx1"/>
+                  </a:solidFill>
+                </a:rPr>
+                <a:t>/</a:t>
+              </a:r>
+            </a:p>
+            <a:p>
+              <a:pPr algn="ctr"/>
+              <a:r>
+                <a:rPr lang="en-US" sz="1800" b="1" dirty="0">
+                  <a:solidFill>
+                    <a:schemeClr val="tx1"/>
+                  </a:solidFill>
+                </a:rPr>
+                <a:t>WB</a:t>
+              </a:r>
             </a:p>
           </p:txBody>
         </p:sp>
@@ -15771,10 +15717,9 @@
           <a:lstStyle/>
           <a:p>
             <a:r>
-              <a:rPr lang="en-US" sz="1800" dirty="0" smtClean="0"/>
+              <a:rPr lang="en-US" sz="1800" dirty="0"/>
               <a:t>PC</a:t>
             </a:r>
-            <a:endParaRPr lang="en-US" sz="1800" dirty="0"/>
           </a:p>
         </p:txBody>
       </p:sp>
@@ -15901,10 +15846,9 @@
           <a:lstStyle/>
           <a:p>
             <a:r>
-              <a:rPr lang="en-US" sz="1800" dirty="0" smtClean="0"/>
+              <a:rPr lang="en-US" sz="1800" dirty="0"/>
               <a:t>Next PC</a:t>
             </a:r>
-            <a:endParaRPr lang="en-US" sz="1800" dirty="0"/>
           </a:p>
         </p:txBody>
       </p:sp>
@@ -15972,10 +15916,9 @@
           <a:lstStyle/>
           <a:p>
             <a:r>
-              <a:rPr lang="en-US" sz="1800" dirty="0" smtClean="0"/>
+              <a:rPr lang="en-US" sz="1800" dirty="0"/>
               <a:t>RESET ADDRESS</a:t>
             </a:r>
-            <a:endParaRPr lang="en-US" sz="1800" dirty="0"/>
           </a:p>
         </p:txBody>
       </p:sp>
@@ -16040,10 +15983,9 @@
           <a:lstStyle/>
           <a:p>
             <a:r>
-              <a:rPr lang="en-US" sz="1800" dirty="0" smtClean="0"/>
+              <a:rPr lang="en-US" sz="1800" dirty="0"/>
               <a:t>PC</a:t>
             </a:r>
-            <a:endParaRPr lang="en-US" sz="1800" dirty="0"/>
           </a:p>
         </p:txBody>
       </p:sp>
@@ -16108,10 +16050,9 @@
           <a:lstStyle/>
           <a:p>
             <a:r>
-              <a:rPr lang="en-US" sz="1800" dirty="0" smtClean="0"/>
+              <a:rPr lang="en-US" sz="1800" dirty="0"/>
               <a:t>Address</a:t>
             </a:r>
-            <a:endParaRPr lang="en-US" sz="1800" dirty="0"/>
           </a:p>
         </p:txBody>
       </p:sp>
@@ -16176,10 +16117,9 @@
           <a:lstStyle/>
           <a:p>
             <a:r>
-              <a:rPr lang="en-US" sz="1600" dirty="0" smtClean="0"/>
+              <a:rPr lang="en-US" sz="1600" dirty="0"/>
               <a:t>Jump &amp; Branch Enable</a:t>
             </a:r>
-            <a:endParaRPr lang="en-US" sz="1600" dirty="0"/>
           </a:p>
         </p:txBody>
       </p:sp>
@@ -16224,14 +16164,14 @@
       </p:cxnSp>
       <p:sp>
         <p:nvSpPr>
-          <p:cNvPr id="115" name="TextBox 114"/>
+          <p:cNvPr id="116" name="TextBox 115"/>
           <p:cNvSpPr txBox="1"/>
           <p:nvPr/>
         </p:nvSpPr>
         <p:spPr>
           <a:xfrm>
-            <a:off x="2025415" y="3357748"/>
-            <a:ext cx="684803" cy="369332"/>
+            <a:off x="2093552" y="3695137"/>
+            <a:ext cx="822661" cy="369332"/>
           </a:xfrm>
           <a:prstGeom prst="rect">
             <a:avLst/>
@@ -16245,40 +16185,9 @@
           <a:lstStyle/>
           <a:p>
             <a:r>
-              <a:rPr lang="en-US" sz="1800" dirty="0" smtClean="0"/>
-              <a:t>Clock</a:t>
-            </a:r>
-            <a:endParaRPr lang="en-US" sz="1800" dirty="0"/>
-          </a:p>
-        </p:txBody>
-      </p:sp>
-      <p:sp>
-        <p:nvSpPr>
-          <p:cNvPr id="116" name="TextBox 115"/>
-          <p:cNvSpPr txBox="1"/>
-          <p:nvPr/>
-        </p:nvSpPr>
-        <p:spPr>
-          <a:xfrm>
-            <a:off x="1864446" y="3694487"/>
-            <a:ext cx="822661" cy="369332"/>
-          </a:xfrm>
-          <a:prstGeom prst="rect">
-            <a:avLst/>
-          </a:prstGeom>
-          <a:noFill/>
-        </p:spPr>
-        <p:txBody>
-          <a:bodyPr wrap="none" rtlCol="0">
-            <a:spAutoFit/>
-          </a:bodyPr>
-          <a:lstStyle/>
-          <a:p>
-            <a:r>
-              <a:rPr lang="en-US" sz="1800" dirty="0" smtClean="0"/>
+              <a:rPr lang="en-US" sz="1800" dirty="0"/>
               <a:t>Enable</a:t>
             </a:r>
-            <a:endParaRPr lang="en-US" sz="1800" dirty="0"/>
           </a:p>
         </p:txBody>
       </p:sp>
@@ -16286,49 +16195,13 @@
         <p:nvCxnSpPr>
           <p:cNvPr id="64" name="Straight Arrow Connector 63"/>
           <p:cNvCxnSpPr>
-            <a:endCxn id="116" idx="3"/>
+            <a:cxnSpLocks/>
           </p:cNvCxnSpPr>
           <p:nvPr/>
         </p:nvCxnSpPr>
         <p:spPr>
           <a:xfrm flipH="1">
-            <a:off x="2687107" y="3879153"/>
-            <a:ext cx="607871" cy="0"/>
-          </a:xfrm>
-          <a:prstGeom prst="straightConnector1">
-            <a:avLst/>
-          </a:prstGeom>
-          <a:ln w="12700">
-            <a:solidFill>
-              <a:schemeClr val="tx1"/>
-            </a:solidFill>
-            <a:tailEnd type="triangle"/>
-          </a:ln>
-        </p:spPr>
-        <p:style>
-          <a:lnRef idx="1">
-            <a:schemeClr val="accent1"/>
-          </a:lnRef>
-          <a:fillRef idx="0">
-            <a:schemeClr val="accent1"/>
-          </a:fillRef>
-          <a:effectRef idx="0">
-            <a:schemeClr val="accent1"/>
-          </a:effectRef>
-          <a:fontRef idx="minor">
-            <a:schemeClr val="tx1"/>
-          </a:fontRef>
-        </p:style>
-      </p:cxnSp>
-      <p:cxnSp>
-        <p:nvCxnSpPr>
-          <p:cNvPr id="130" name="Straight Arrow Connector 129"/>
-          <p:cNvCxnSpPr/>
-          <p:nvPr/>
-        </p:nvCxnSpPr>
-        <p:spPr>
-          <a:xfrm flipH="1">
-            <a:off x="2697137" y="3552939"/>
+            <a:off x="2849058" y="3879153"/>
             <a:ext cx="607871" cy="0"/>
           </a:xfrm>
           <a:prstGeom prst="straightConnector1">
@@ -16486,18 +16359,13 @@
           <a:p>
             <a:pPr algn="ctr"/>
             <a:r>
-              <a:rPr lang="en-US" sz="1798" dirty="0" smtClean="0">
+              <a:rPr lang="en-US" sz="1798" dirty="0">
                 <a:solidFill>
                   <a:schemeClr val="tx1"/>
                 </a:solidFill>
               </a:rPr>
               <a:t>Memory (4MB)</a:t>
             </a:r>
-            <a:endParaRPr lang="en-US" sz="1798" dirty="0">
-              <a:solidFill>
-                <a:schemeClr val="tx1"/>
-              </a:solidFill>
-            </a:endParaRPr>
           </a:p>
         </p:txBody>
       </p:sp>
@@ -16649,10 +16517,9 @@
             <a:lstStyle/>
             <a:p>
               <a:r>
-                <a:rPr lang="en-US" sz="1800" dirty="0" smtClean="0"/>
+                <a:rPr lang="en-US" sz="1800" dirty="0"/>
                 <a:t>instruction</a:t>
               </a:r>
-              <a:endParaRPr lang="en-US" sz="1800" dirty="0"/>
             </a:p>
           </p:txBody>
         </p:sp>
@@ -16680,10 +16547,9 @@
           <a:lstStyle/>
           <a:p>
             <a:r>
-              <a:rPr lang="en-US" sz="1600" dirty="0" smtClean="0"/>
+              <a:rPr lang="en-US" sz="1600" dirty="0"/>
               <a:t>Immediate</a:t>
             </a:r>
-            <a:endParaRPr lang="en-US" sz="1600" dirty="0"/>
           </a:p>
         </p:txBody>
       </p:sp>
@@ -16710,10 +16576,9 @@
           <a:lstStyle/>
           <a:p>
             <a:r>
-              <a:rPr lang="en-US" sz="1600" dirty="0" smtClean="0"/>
+              <a:rPr lang="en-US" sz="1600" dirty="0"/>
               <a:t>Instruction Type</a:t>
             </a:r>
-            <a:endParaRPr lang="en-US" sz="1600" dirty="0"/>
           </a:p>
         </p:txBody>
       </p:sp>
@@ -16721,6 +16586,7 @@
         <p:nvCxnSpPr>
           <p:cNvPr id="135" name="Elbow Connector 134"/>
           <p:cNvCxnSpPr>
+            <a:cxnSpLocks/>
             <a:endCxn id="84" idx="1"/>
           </p:cNvCxnSpPr>
           <p:nvPr/>
@@ -16824,12 +16690,34 @@
             <a:p>
               <a:pPr algn="ctr"/>
               <a:r>
-                <a:rPr lang="en-US" sz="1798" dirty="0">
+                <a:rPr lang="en-US" sz="1800" b="1" dirty="0">
                   <a:solidFill>
                     <a:schemeClr val="tx1"/>
                   </a:solidFill>
                 </a:rPr>
                 <a:t>IF</a:t>
+              </a:r>
+            </a:p>
+            <a:p>
+              <a:pPr algn="ctr"/>
+              <a:r>
+                <a:rPr lang="en-US" sz="1800" b="1" dirty="0">
+                  <a:solidFill>
+                    <a:schemeClr val="tx1"/>
+                  </a:solidFill>
+                </a:rPr>
+                <a:t>/</a:t>
+              </a:r>
+            </a:p>
+            <a:p>
+              <a:pPr algn="ctr"/>
+              <a:r>
+                <a:rPr lang="en-US" sz="1800" b="1" dirty="0">
+                  <a:solidFill>
+                    <a:schemeClr val="tx1"/>
+                  </a:solidFill>
+                </a:rPr>
+                <a:t>ID</a:t>
               </a:r>
             </a:p>
           </p:txBody>
@@ -16945,10 +16833,9 @@
           <a:lstStyle/>
           <a:p>
             <a:r>
-              <a:rPr lang="en-US" sz="1400" dirty="0" smtClean="0"/>
+              <a:rPr lang="en-US" sz="1400" dirty="0"/>
               <a:t>Index 1</a:t>
             </a:r>
-            <a:endParaRPr lang="en-US" sz="1400" dirty="0"/>
           </a:p>
         </p:txBody>
       </p:sp>
@@ -17011,10 +16898,9 @@
           <a:lstStyle/>
           <a:p>
             <a:r>
-              <a:rPr lang="en-US" sz="1400" dirty="0" smtClean="0"/>
+              <a:rPr lang="en-US" sz="1400" dirty="0"/>
               <a:t>Index 2</a:t>
             </a:r>
-            <a:endParaRPr lang="en-US" sz="1400" dirty="0"/>
           </a:p>
         </p:txBody>
       </p:sp>
@@ -17028,12 +16914,12 @@
         </p:nvCxnSpPr>
         <p:spPr>
           <a:xfrm>
-            <a:off x="5639955" y="3304678"/>
+            <a:off x="5691467" y="3304893"/>
             <a:ext cx="296134" cy="286878"/>
           </a:xfrm>
           <a:prstGeom prst="bentConnector3">
             <a:avLst>
-              <a:gd name="adj1" fmla="val 50000"/>
+              <a:gd name="adj1" fmla="val 58577"/>
             </a:avLst>
           </a:prstGeom>
           <a:ln w="12700">
@@ -17066,7 +16952,7 @@
         </p:nvSpPr>
         <p:spPr>
           <a:xfrm>
-            <a:off x="5936089" y="3437667"/>
+            <a:off x="5987601" y="3437882"/>
             <a:ext cx="1029193" cy="307777"/>
           </a:xfrm>
           <a:prstGeom prst="rect">
@@ -17081,10 +16967,9 @@
           <a:lstStyle/>
           <a:p>
             <a:r>
-              <a:rPr lang="en-US" sz="1400" dirty="0" smtClean="0"/>
+              <a:rPr lang="en-US" sz="1400" dirty="0"/>
               <a:t>Write Index</a:t>
             </a:r>
-            <a:endParaRPr lang="en-US" sz="1400" dirty="0"/>
           </a:p>
         </p:txBody>
       </p:sp>
@@ -17191,10 +17076,9 @@
           <a:lstStyle/>
           <a:p>
             <a:r>
-              <a:rPr lang="en-US" sz="1400" dirty="0" smtClean="0"/>
+              <a:rPr lang="en-US" sz="1400" dirty="0"/>
               <a:t>Read Enable 1</a:t>
             </a:r>
-            <a:endParaRPr lang="en-US" sz="1400" dirty="0"/>
           </a:p>
         </p:txBody>
       </p:sp>
@@ -17224,10 +17108,9 @@
           <a:lstStyle/>
           <a:p>
             <a:r>
-              <a:rPr lang="en-US" sz="1400" dirty="0" smtClean="0"/>
+              <a:rPr lang="en-US" sz="1400" dirty="0"/>
               <a:t>Read Enable 2</a:t>
             </a:r>
-            <a:endParaRPr lang="en-US" sz="1400" dirty="0"/>
           </a:p>
         </p:txBody>
       </p:sp>
@@ -17278,18 +17161,13 @@
           <a:p>
             <a:pPr algn="ctr"/>
             <a:r>
-              <a:rPr lang="en-US" sz="1600" dirty="0" smtClean="0">
+              <a:rPr lang="en-US" sz="1600" dirty="0">
                 <a:solidFill>
                   <a:schemeClr val="tx1"/>
                 </a:solidFill>
               </a:rPr>
               <a:t>RegFile Control Logic</a:t>
             </a:r>
-            <a:endParaRPr lang="en-US" sz="1600" dirty="0">
-              <a:solidFill>
-                <a:schemeClr val="tx1"/>
-              </a:solidFill>
-            </a:endParaRPr>
           </a:p>
         </p:txBody>
       </p:sp>
@@ -17357,10 +17235,9 @@
           <a:lstStyle/>
           <a:p>
             <a:r>
-              <a:rPr lang="en-US" sz="1400" dirty="0" smtClean="0"/>
+              <a:rPr lang="en-US" sz="1400" dirty="0"/>
               <a:t>Write Enable</a:t>
             </a:r>
-            <a:endParaRPr lang="en-US" sz="1400" dirty="0"/>
           </a:p>
         </p:txBody>
       </p:sp>
@@ -17427,14 +17304,15 @@
         <p:nvCxnSpPr>
           <p:cNvPr id="162" name="Straight Arrow Connector 161"/>
           <p:cNvCxnSpPr>
+            <a:cxnSpLocks/>
             <a:stCxn id="84" idx="3"/>
           </p:cNvCxnSpPr>
           <p:nvPr/>
         </p:nvCxnSpPr>
         <p:spPr>
-          <a:xfrm>
-            <a:off x="7255334" y="2086242"/>
-            <a:ext cx="1042755" cy="0"/>
+          <a:xfrm flipV="1">
+            <a:off x="7255334" y="2077766"/>
+            <a:ext cx="1056155" cy="8476"/>
           </a:xfrm>
           <a:prstGeom prst="straightConnector1">
             <a:avLst/>
@@ -17465,14 +17343,15 @@
         <p:nvCxnSpPr>
           <p:cNvPr id="139" name="Straight Arrow Connector 138"/>
           <p:cNvCxnSpPr>
+            <a:cxnSpLocks/>
             <a:stCxn id="171" idx="3"/>
           </p:cNvCxnSpPr>
           <p:nvPr/>
         </p:nvCxnSpPr>
         <p:spPr>
           <a:xfrm>
-            <a:off x="7599821" y="2539749"/>
-            <a:ext cx="691176" cy="0"/>
+            <a:off x="7564875" y="2539749"/>
+            <a:ext cx="746614" cy="0"/>
           </a:xfrm>
           <a:prstGeom prst="straightConnector1">
             <a:avLst/>
@@ -17503,14 +17382,15 @@
         <p:nvCxnSpPr>
           <p:cNvPr id="174" name="Straight Arrow Connector 173"/>
           <p:cNvCxnSpPr>
+            <a:cxnSpLocks/>
             <a:stCxn id="192" idx="3"/>
           </p:cNvCxnSpPr>
           <p:nvPr/>
         </p:nvCxnSpPr>
         <p:spPr>
           <a:xfrm>
-            <a:off x="6965282" y="3591556"/>
-            <a:ext cx="1325715" cy="0"/>
+            <a:off x="7016794" y="3591771"/>
+            <a:ext cx="1294695" cy="0"/>
           </a:xfrm>
           <a:prstGeom prst="straightConnector1">
             <a:avLst/>
@@ -17636,10 +17516,9 @@
           <a:lstStyle/>
           <a:p>
             <a:r>
-              <a:rPr lang="en-US" sz="1400" dirty="0" smtClean="0"/>
+              <a:rPr lang="en-US" sz="1400" dirty="0"/>
               <a:t>Register Source 1 Bus</a:t>
             </a:r>
-            <a:endParaRPr lang="en-US" sz="1400" dirty="0"/>
           </a:p>
         </p:txBody>
       </p:sp>
@@ -17704,14 +17583,9 @@
           <a:lstStyle/>
           <a:p>
             <a:r>
-              <a:rPr lang="en-US" sz="1400" dirty="0" smtClean="0"/>
-              <a:t>S</a:t>
+              <a:rPr lang="en-US" sz="1400" dirty="0"/>
+              <a:t>Source 1</a:t>
             </a:r>
-            <a:r>
-              <a:rPr lang="en-US" sz="1400" dirty="0" smtClean="0"/>
-              <a:t>ource 1</a:t>
-            </a:r>
-            <a:endParaRPr lang="en-US" sz="1400" dirty="0"/>
           </a:p>
         </p:txBody>
       </p:sp>
@@ -17779,13 +17653,8 @@
           <a:p>
             <a:r>
               <a:rPr lang="en-US" sz="1400" dirty="0"/>
-              <a:t>S</a:t>
+              <a:t>Source 2</a:t>
             </a:r>
-            <a:r>
-              <a:rPr lang="en-US" sz="1400" dirty="0" smtClean="0"/>
-              <a:t>ource 2</a:t>
-            </a:r>
-            <a:endParaRPr lang="en-US" sz="1400" dirty="0"/>
           </a:p>
         </p:txBody>
       </p:sp>
@@ -17793,18 +17662,18 @@
         <p:nvCxnSpPr>
           <p:cNvPr id="253" name="Elbow Connector 252"/>
           <p:cNvCxnSpPr>
-            <a:stCxn id="261" idx="0"/>
+            <a:cxnSpLocks/>
           </p:cNvCxnSpPr>
           <p:nvPr/>
         </p:nvCxnSpPr>
         <p:spPr>
           <a:xfrm rot="5400000" flipH="1" flipV="1">
-            <a:off x="5437606" y="6925220"/>
-            <a:ext cx="968544" cy="338675"/>
+            <a:off x="5088124" y="7241155"/>
+            <a:ext cx="1615207" cy="399748"/>
           </a:xfrm>
           <a:prstGeom prst="bentConnector3">
             <a:avLst>
-              <a:gd name="adj1" fmla="val 99827"/>
+              <a:gd name="adj1" fmla="val 100322"/>
             </a:avLst>
           </a:prstGeom>
           <a:ln w="12700">
@@ -17832,13 +17701,15 @@
       <p:cxnSp>
         <p:nvCxnSpPr>
           <p:cNvPr id="260" name="Straight Arrow Connector 259"/>
-          <p:cNvCxnSpPr/>
+          <p:cNvCxnSpPr>
+            <a:cxnSpLocks/>
+          </p:cNvCxnSpPr>
           <p:nvPr/>
         </p:nvCxnSpPr>
         <p:spPr>
           <a:xfrm>
-            <a:off x="5763115" y="7434072"/>
-            <a:ext cx="342042" cy="0"/>
+            <a:off x="5695853" y="7434072"/>
+            <a:ext cx="409304" cy="0"/>
           </a:xfrm>
           <a:prstGeom prst="straightConnector1">
             <a:avLst/>
@@ -17931,8 +17802,8 @@
           <p:nvPr/>
         </p:nvSpPr>
         <p:spPr>
-          <a:xfrm>
-            <a:off x="5276609" y="7578829"/>
+          <a:xfrm rot="16200000">
+            <a:off x="4770484" y="7489927"/>
             <a:ext cx="1354730" cy="307777"/>
           </a:xfrm>
           <a:prstGeom prst="rect">
@@ -17950,10 +17821,9 @@
           <a:lstStyle/>
           <a:p>
             <a:r>
-              <a:rPr lang="en-US" sz="1400" dirty="0" smtClean="0"/>
+              <a:rPr lang="en-US" sz="1400" dirty="0"/>
               <a:t>Forwarded Data</a:t>
             </a:r>
-            <a:endParaRPr lang="en-US" sz="1400" dirty="0"/>
           </a:p>
         </p:txBody>
       </p:sp>
@@ -18156,10 +18026,9 @@
           <a:lstStyle/>
           <a:p>
             <a:r>
-              <a:rPr lang="en-US" sz="1400" dirty="0" smtClean="0"/>
+              <a:rPr lang="en-US" sz="1400" dirty="0"/>
               <a:t>opcode</a:t>
             </a:r>
-            <a:endParaRPr lang="en-US" sz="1400" dirty="0"/>
           </a:p>
         </p:txBody>
       </p:sp>
@@ -18186,10 +18055,9 @@
           <a:lstStyle/>
           <a:p>
             <a:r>
-              <a:rPr lang="en-US" sz="1400" dirty="0" smtClean="0"/>
+              <a:rPr lang="en-US" sz="1400" dirty="0"/>
               <a:t>funct7</a:t>
             </a:r>
-            <a:endParaRPr lang="en-US" sz="1400" dirty="0"/>
           </a:p>
         </p:txBody>
       </p:sp>
@@ -18216,10 +18084,9 @@
           <a:lstStyle/>
           <a:p>
             <a:r>
-              <a:rPr lang="en-US" sz="1400" dirty="0" smtClean="0"/>
+              <a:rPr lang="en-US" sz="1400" dirty="0"/>
               <a:t>funct3</a:t>
             </a:r>
-            <a:endParaRPr lang="en-US" sz="1400" dirty="0"/>
           </a:p>
         </p:txBody>
       </p:sp>
@@ -18387,18 +18254,13 @@
           <a:p>
             <a:pPr algn="ctr"/>
             <a:r>
-              <a:rPr lang="en-US" dirty="0" smtClean="0">
+              <a:rPr lang="en-US" dirty="0">
                 <a:solidFill>
                   <a:schemeClr val="tx1"/>
                 </a:solidFill>
               </a:rPr>
               <a:t>+</a:t>
             </a:r>
-            <a:endParaRPr lang="en-US" dirty="0">
-              <a:solidFill>
-                <a:schemeClr val="tx1"/>
-              </a:solidFill>
-            </a:endParaRPr>
           </a:p>
         </p:txBody>
       </p:sp>
@@ -18540,10 +18402,9 @@
           <a:lstStyle/>
           <a:p>
             <a:r>
-              <a:rPr lang="en-US" sz="1600" dirty="0" smtClean="0"/>
+              <a:rPr lang="en-US" sz="1600" dirty="0"/>
               <a:t>Address</a:t>
             </a:r>
-            <a:endParaRPr lang="en-US" sz="1600" dirty="0"/>
           </a:p>
         </p:txBody>
       </p:sp>
@@ -18570,10 +18431,9 @@
           <a:lstStyle/>
           <a:p>
             <a:r>
-              <a:rPr lang="en-US" sz="1600" dirty="0" smtClean="0"/>
+              <a:rPr lang="en-US" sz="1600" dirty="0"/>
               <a:t>Immediate</a:t>
             </a:r>
-            <a:endParaRPr lang="en-US" sz="1600" dirty="0"/>
           </a:p>
         </p:txBody>
       </p:sp>
@@ -18636,10 +18496,9 @@
           <a:lstStyle/>
           <a:p>
             <a:r>
-              <a:rPr lang="en-US" sz="1400" dirty="0" smtClean="0"/>
+              <a:rPr lang="en-US" sz="1400" dirty="0"/>
               <a:t>PC</a:t>
             </a:r>
-            <a:endParaRPr lang="en-US" sz="1400" dirty="0"/>
           </a:p>
         </p:txBody>
       </p:sp>
@@ -19418,10 +19277,9 @@
             <a:lstStyle/>
             <a:p>
               <a:r>
-                <a:rPr lang="en-US" sz="1600" dirty="0" smtClean="0"/>
+                <a:rPr lang="en-US" sz="1600" dirty="0"/>
                 <a:t>ALU</a:t>
               </a:r>
-              <a:endParaRPr lang="en-US" sz="1600" dirty="0"/>
             </a:p>
           </p:txBody>
         </p:sp>
@@ -19430,6 +19288,7 @@
         <p:nvCxnSpPr>
           <p:cNvPr id="397" name="Elbow Connector 396"/>
           <p:cNvCxnSpPr>
+            <a:cxnSpLocks/>
             <a:stCxn id="388" idx="0"/>
           </p:cNvCxnSpPr>
           <p:nvPr/>
@@ -19437,11 +19296,11 @@
         <p:spPr>
           <a:xfrm>
             <a:off x="11245225" y="4298694"/>
-            <a:ext cx="502596" cy="166428"/>
+            <a:ext cx="476639" cy="183176"/>
           </a:xfrm>
           <a:prstGeom prst="bentConnector3">
             <a:avLst>
-              <a:gd name="adj1" fmla="val 62129"/>
+              <a:gd name="adj1" fmla="val 65321"/>
             </a:avLst>
           </a:prstGeom>
           <a:ln w="12700">
@@ -19842,12 +19701,34 @@
             <a:p>
               <a:pPr algn="ctr"/>
               <a:r>
-                <a:rPr lang="en-US" sz="1798" dirty="0">
+                <a:rPr lang="en-US" sz="1800" b="1" dirty="0">
                   <a:solidFill>
                     <a:schemeClr val="tx1"/>
                   </a:solidFill>
                 </a:rPr>
                 <a:t>ID</a:t>
+              </a:r>
+            </a:p>
+            <a:p>
+              <a:pPr algn="ctr"/>
+              <a:r>
+                <a:rPr lang="en-US" sz="1800" b="1" dirty="0">
+                  <a:solidFill>
+                    <a:schemeClr val="tx1"/>
+                  </a:solidFill>
+                </a:rPr>
+                <a:t>/</a:t>
+              </a:r>
+            </a:p>
+            <a:p>
+              <a:pPr algn="ctr"/>
+              <a:r>
+                <a:rPr lang="en-US" sz="1800" b="1" dirty="0">
+                  <a:solidFill>
+                    <a:schemeClr val="tx1"/>
+                  </a:solidFill>
+                </a:rPr>
+                <a:t>EX</a:t>
               </a:r>
             </a:p>
           </p:txBody>
@@ -20031,18 +19912,13 @@
           <a:p>
             <a:pPr algn="ctr"/>
             <a:r>
-              <a:rPr lang="en-US" sz="1798" dirty="0" smtClean="0">
+              <a:rPr lang="en-US" sz="1798" dirty="0">
                 <a:solidFill>
                   <a:schemeClr val="tx1"/>
                 </a:solidFill>
               </a:rPr>
               <a:t>Jump Branch Unit</a:t>
             </a:r>
-            <a:endParaRPr lang="en-US" sz="1798" dirty="0">
-              <a:solidFill>
-                <a:schemeClr val="tx1"/>
-              </a:solidFill>
-            </a:endParaRPr>
           </a:p>
         </p:txBody>
       </p:sp>
@@ -20287,8 +20163,8 @@
         </p:nvSpPr>
         <p:spPr>
           <a:xfrm>
-            <a:off x="9147988" y="7626526"/>
-            <a:ext cx="1527598" cy="338554"/>
+            <a:off x="9430411" y="7608400"/>
+            <a:ext cx="1648028" cy="338554"/>
           </a:xfrm>
           <a:prstGeom prst="rect">
             <a:avLst/>
@@ -20296,16 +20172,15 @@
           <a:noFill/>
         </p:spPr>
         <p:txBody>
-          <a:bodyPr wrap="none" rtlCol="0">
+          <a:bodyPr wrap="square" rtlCol="0">
             <a:spAutoFit/>
           </a:bodyPr>
           <a:lstStyle/>
           <a:p>
             <a:r>
-              <a:rPr lang="en-US" sz="1600" dirty="0" smtClean="0"/>
+              <a:rPr lang="en-US" sz="1600" dirty="0"/>
               <a:t>Instruction Type</a:t>
             </a:r>
-            <a:endParaRPr lang="en-US" sz="1600" dirty="0"/>
           </a:p>
         </p:txBody>
       </p:sp>
@@ -20313,19 +20188,20 @@
         <p:nvCxnSpPr>
           <p:cNvPr id="466" name="Elbow Connector 465"/>
           <p:cNvCxnSpPr>
+            <a:cxnSpLocks/>
             <a:stCxn id="464" idx="1"/>
           </p:cNvCxnSpPr>
           <p:nvPr/>
         </p:nvCxnSpPr>
         <p:spPr>
           <a:xfrm rot="10800000" flipH="1">
-            <a:off x="9147987" y="6396139"/>
-            <a:ext cx="578765" cy="1399665"/>
+            <a:off x="9430410" y="6378019"/>
+            <a:ext cx="218863" cy="1399659"/>
           </a:xfrm>
           <a:prstGeom prst="bentConnector4">
             <a:avLst>
-              <a:gd name="adj1" fmla="val -21066"/>
-              <a:gd name="adj2" fmla="val 86534"/>
+              <a:gd name="adj1" fmla="val -204546"/>
+              <a:gd name="adj2" fmla="val 82587"/>
             </a:avLst>
           </a:prstGeom>
           <a:ln w="12700">
@@ -20358,7 +20234,7 @@
         </p:nvSpPr>
         <p:spPr>
           <a:xfrm rot="5400000">
-            <a:off x="11567717" y="4527917"/>
+            <a:off x="11542317" y="4527917"/>
             <a:ext cx="539293" cy="179086"/>
           </a:xfrm>
           <a:prstGeom prst="trapezoid">
@@ -20413,6 +20289,7 @@
         <p:nvCxnSpPr>
           <p:cNvPr id="474" name="Straight Arrow Connector 473"/>
           <p:cNvCxnSpPr>
+            <a:cxnSpLocks/>
             <a:stCxn id="470" idx="0"/>
             <a:endCxn id="164" idx="1"/>
           </p:cNvCxnSpPr>
@@ -20420,8 +20297,8 @@
         </p:nvCxnSpPr>
         <p:spPr>
           <a:xfrm flipV="1">
-            <a:off x="11926907" y="4610138"/>
-            <a:ext cx="193695" cy="7323"/>
+            <a:off x="11901507" y="4610138"/>
+            <a:ext cx="219097" cy="7323"/>
           </a:xfrm>
           <a:prstGeom prst="straightConnector1">
             <a:avLst/>
@@ -20501,18 +20378,13 @@
           <a:p>
             <a:pPr algn="ctr"/>
             <a:r>
-              <a:rPr lang="en-US" sz="1600" dirty="0" smtClean="0">
+              <a:rPr lang="en-US" sz="1600" dirty="0">
                 <a:solidFill>
                   <a:schemeClr val="tx1"/>
                 </a:solidFill>
               </a:rPr>
               <a:t>Additional EXEC Unit (MUL/DIV/FPU)</a:t>
             </a:r>
-            <a:endParaRPr lang="en-US" sz="1600" dirty="0">
-              <a:solidFill>
-                <a:schemeClr val="tx1"/>
-              </a:solidFill>
-            </a:endParaRPr>
           </a:p>
         </p:txBody>
       </p:sp>
@@ -20520,6 +20392,7 @@
         <p:nvCxnSpPr>
           <p:cNvPr id="483" name="Elbow Connector 482"/>
           <p:cNvCxnSpPr>
+            <a:cxnSpLocks/>
             <a:stCxn id="479" idx="3"/>
             <a:endCxn id="470" idx="2"/>
           </p:cNvCxnSpPr>
@@ -20528,11 +20401,11 @@
         <p:spPr>
           <a:xfrm flipV="1">
             <a:off x="11477865" y="4617461"/>
-            <a:ext cx="269956" cy="2518134"/>
+            <a:ext cx="244556" cy="2518134"/>
           </a:xfrm>
           <a:prstGeom prst="bentConnector3">
             <a:avLst>
-              <a:gd name="adj1" fmla="val 50000"/>
+              <a:gd name="adj1" fmla="val 33122"/>
             </a:avLst>
           </a:prstGeom>
           <a:ln w="12700">
@@ -20682,38 +20555,6 @@
       </p:grpSp>
       <p:sp>
         <p:nvSpPr>
-          <p:cNvPr id="501" name="TextBox 500"/>
-          <p:cNvSpPr txBox="1"/>
-          <p:nvPr/>
-        </p:nvSpPr>
-        <p:spPr>
-          <a:xfrm rot="16200000">
-            <a:off x="11220617" y="4939347"/>
-            <a:ext cx="1426640" cy="646331"/>
-          </a:xfrm>
-          <a:prstGeom prst="rect">
-            <a:avLst/>
-          </a:prstGeom>
-          <a:noFill/>
-        </p:spPr>
-        <p:txBody>
-          <a:bodyPr wrap="square" rtlCol="0">
-            <a:spAutoFit/>
-          </a:bodyPr>
-          <a:lstStyle/>
-          <a:p>
-            <a:r>
-              <a:rPr lang="en-US" sz="1200" dirty="0"/>
-              <a:t>Jump &amp; Branch Enable</a:t>
-            </a:r>
-          </a:p>
-          <a:p>
-            <a:endParaRPr lang="en-US" sz="1200" dirty="0"/>
-          </a:p>
-        </p:txBody>
-      </p:sp>
-      <p:sp>
-        <p:nvSpPr>
           <p:cNvPr id="502" name="Rounded Rectangle 501"/>
           <p:cNvSpPr/>
           <p:nvPr/>
@@ -20764,7 +20605,7 @@
           <a:p>
             <a:pPr algn="ctr"/>
             <a:r>
-              <a:rPr lang="en-US" sz="1798" dirty="0" smtClean="0">
+              <a:rPr lang="en-US" sz="1798" dirty="0">
                 <a:solidFill>
                   <a:schemeClr val="tx1"/>
                 </a:solidFill>
@@ -20775,7 +20616,7 @@
           <a:p>
             <a:pPr algn="ctr"/>
             <a:r>
-              <a:rPr lang="en-US" sz="1798" dirty="0" smtClean="0">
+              <a:rPr lang="en-US" sz="1798" dirty="0">
                 <a:solidFill>
                   <a:schemeClr val="tx1"/>
                 </a:solidFill>
@@ -20786,35 +20627,32 @@
           <a:p>
             <a:pPr algn="ctr"/>
             <a:r>
-              <a:rPr lang="en-US" sz="1798" dirty="0" smtClean="0">
+              <a:rPr lang="en-US" sz="1798" dirty="0">
                 <a:solidFill>
                   <a:schemeClr val="tx1"/>
                 </a:solidFill>
               </a:rPr>
               <a:t>Unit</a:t>
             </a:r>
-            <a:endParaRPr lang="en-US" sz="1798" dirty="0">
-              <a:solidFill>
-                <a:schemeClr val="tx1"/>
-              </a:solidFill>
-            </a:endParaRPr>
           </a:p>
         </p:txBody>
       </p:sp>
       <p:cxnSp>
         <p:nvCxnSpPr>
           <p:cNvPr id="510" name="Elbow Connector 509"/>
-          <p:cNvCxnSpPr/>
+          <p:cNvCxnSpPr>
+            <a:cxnSpLocks/>
+          </p:cNvCxnSpPr>
           <p:nvPr/>
         </p:nvCxnSpPr>
         <p:spPr>
           <a:xfrm>
             <a:off x="12443630" y="2459615"/>
-            <a:ext cx="840176" cy="636544"/>
+            <a:ext cx="958537" cy="636544"/>
           </a:xfrm>
           <a:prstGeom prst="bentConnector3">
             <a:avLst>
-              <a:gd name="adj1" fmla="val 99882"/>
+              <a:gd name="adj1" fmla="val 99685"/>
             </a:avLst>
           </a:prstGeom>
           <a:ln w="12700">
@@ -20847,10 +20685,10 @@
         </p:nvGrpSpPr>
         <p:grpSpPr>
           <a:xfrm>
-            <a:off x="12120602" y="1172160"/>
-            <a:ext cx="507476" cy="6875959"/>
-            <a:chOff x="4944353" y="2024407"/>
-            <a:chExt cx="507477" cy="1545997"/>
+            <a:off x="12120604" y="1172160"/>
+            <a:ext cx="554095" cy="6875959"/>
+            <a:chOff x="4944356" y="2024407"/>
+            <a:chExt cx="528089" cy="1545997"/>
           </a:xfrm>
           <a:solidFill>
             <a:schemeClr val="bg2"/>
@@ -20864,8 +20702,8 @@
           </p:nvSpPr>
           <p:spPr>
             <a:xfrm>
-              <a:off x="4944353" y="2024407"/>
-              <a:ext cx="507477" cy="1545996"/>
+              <a:off x="4944356" y="2024407"/>
+              <a:ext cx="528089" cy="1545996"/>
             </a:xfrm>
             <a:prstGeom prst="roundRect">
               <a:avLst>
@@ -20906,12 +20744,34 @@
             <a:p>
               <a:pPr algn="ctr"/>
               <a:r>
-                <a:rPr lang="en-US" sz="1798" dirty="0">
+                <a:rPr lang="en-US" sz="1800" b="1" dirty="0">
                   <a:solidFill>
                     <a:schemeClr val="tx1"/>
                   </a:solidFill>
                 </a:rPr>
                 <a:t>EX</a:t>
+              </a:r>
+            </a:p>
+            <a:p>
+              <a:pPr algn="ctr"/>
+              <a:r>
+                <a:rPr lang="en-US" sz="1800" b="1" dirty="0">
+                  <a:solidFill>
+                    <a:schemeClr val="tx1"/>
+                  </a:solidFill>
+                </a:rPr>
+                <a:t>/</a:t>
+              </a:r>
+            </a:p>
+            <a:p>
+              <a:pPr algn="ctr"/>
+              <a:r>
+                <a:rPr lang="en-US" sz="1800" b="1" dirty="0">
+                  <a:solidFill>
+                    <a:schemeClr val="tx1"/>
+                  </a:solidFill>
+                </a:rPr>
+                <a:t>MA</a:t>
               </a:r>
             </a:p>
           </p:txBody>
@@ -20968,129 +20828,6 @@
           </p:txBody>
         </p:sp>
       </p:grpSp>
-      <p:grpSp>
-        <p:nvGrpSpPr>
-          <p:cNvPr id="514" name="Group 513"/>
-          <p:cNvGrpSpPr/>
-          <p:nvPr/>
-        </p:nvGrpSpPr>
-        <p:grpSpPr>
-          <a:xfrm>
-            <a:off x="12620854" y="1322832"/>
-            <a:ext cx="1829834" cy="281940"/>
-            <a:chOff x="8832429" y="1844040"/>
-            <a:chExt cx="3298126" cy="281940"/>
-          </a:xfrm>
-        </p:grpSpPr>
-        <p:cxnSp>
-          <p:nvCxnSpPr>
-            <p:cNvPr id="515" name="Straight Arrow Connector 514"/>
-            <p:cNvCxnSpPr/>
-            <p:nvPr/>
-          </p:nvCxnSpPr>
-          <p:spPr>
-            <a:xfrm>
-              <a:off x="8843315" y="1844040"/>
-              <a:ext cx="3287240" cy="0"/>
-            </a:xfrm>
-            <a:prstGeom prst="straightConnector1">
-              <a:avLst/>
-            </a:prstGeom>
-            <a:ln w="12700">
-              <a:solidFill>
-                <a:schemeClr val="tx1"/>
-              </a:solidFill>
-              <a:tailEnd type="triangle"/>
-            </a:ln>
-          </p:spPr>
-          <p:style>
-            <a:lnRef idx="1">
-              <a:schemeClr val="accent1"/>
-            </a:lnRef>
-            <a:fillRef idx="0">
-              <a:schemeClr val="accent1"/>
-            </a:fillRef>
-            <a:effectRef idx="0">
-              <a:schemeClr val="accent1"/>
-            </a:effectRef>
-            <a:fontRef idx="minor">
-              <a:schemeClr val="tx1"/>
-            </a:fontRef>
-          </p:style>
-        </p:cxnSp>
-        <p:cxnSp>
-          <p:nvCxnSpPr>
-            <p:cNvPr id="516" name="Straight Arrow Connector 515"/>
-            <p:cNvCxnSpPr/>
-            <p:nvPr/>
-          </p:nvCxnSpPr>
-          <p:spPr>
-            <a:xfrm>
-              <a:off x="8835176" y="1981200"/>
-              <a:ext cx="3287240" cy="0"/>
-            </a:xfrm>
-            <a:prstGeom prst="straightConnector1">
-              <a:avLst/>
-            </a:prstGeom>
-            <a:ln w="12700">
-              <a:solidFill>
-                <a:schemeClr val="tx1"/>
-              </a:solidFill>
-              <a:tailEnd type="triangle"/>
-            </a:ln>
-          </p:spPr>
-          <p:style>
-            <a:lnRef idx="1">
-              <a:schemeClr val="accent1"/>
-            </a:lnRef>
-            <a:fillRef idx="0">
-              <a:schemeClr val="accent1"/>
-            </a:fillRef>
-            <a:effectRef idx="0">
-              <a:schemeClr val="accent1"/>
-            </a:effectRef>
-            <a:fontRef idx="minor">
-              <a:schemeClr val="tx1"/>
-            </a:fontRef>
-          </p:style>
-        </p:cxnSp>
-        <p:cxnSp>
-          <p:nvCxnSpPr>
-            <p:cNvPr id="517" name="Straight Arrow Connector 516"/>
-            <p:cNvCxnSpPr/>
-            <p:nvPr/>
-          </p:nvCxnSpPr>
-          <p:spPr>
-            <a:xfrm>
-              <a:off x="8832429" y="2125980"/>
-              <a:ext cx="3287240" cy="0"/>
-            </a:xfrm>
-            <a:prstGeom prst="straightConnector1">
-              <a:avLst/>
-            </a:prstGeom>
-            <a:ln w="12700">
-              <a:solidFill>
-                <a:schemeClr val="tx1"/>
-              </a:solidFill>
-              <a:tailEnd type="triangle"/>
-            </a:ln>
-          </p:spPr>
-          <p:style>
-            <a:lnRef idx="1">
-              <a:schemeClr val="accent1"/>
-            </a:lnRef>
-            <a:fillRef idx="0">
-              <a:schemeClr val="accent1"/>
-            </a:fillRef>
-            <a:effectRef idx="0">
-              <a:schemeClr val="accent1"/>
-            </a:effectRef>
-            <a:fontRef idx="minor">
-              <a:schemeClr val="tx1"/>
-            </a:fontRef>
-          </p:style>
-        </p:cxnSp>
-      </p:grpSp>
       <p:sp>
         <p:nvSpPr>
           <p:cNvPr id="518" name="TextBox 517"/>
@@ -21099,7 +20836,7 @@
         </p:nvSpPr>
         <p:spPr>
           <a:xfrm>
-            <a:off x="12583270" y="2140311"/>
+            <a:off x="12631742" y="2111320"/>
             <a:ext cx="850426" cy="338554"/>
           </a:xfrm>
           <a:prstGeom prst="rect">
@@ -21114,10 +20851,9 @@
           <a:lstStyle/>
           <a:p>
             <a:r>
-              <a:rPr lang="en-US" sz="1600" dirty="0" smtClean="0"/>
+              <a:rPr lang="en-US" sz="1600" dirty="0"/>
               <a:t>Address</a:t>
             </a:r>
-            <a:endParaRPr lang="en-US" sz="1600" dirty="0"/>
           </a:p>
         </p:txBody>
       </p:sp>
@@ -21218,10 +20954,9 @@
           <a:lstStyle/>
           <a:p>
             <a:r>
-              <a:rPr lang="en-US" sz="1400" dirty="0" smtClean="0"/>
+              <a:rPr lang="en-US" sz="1400" dirty="0"/>
               <a:t>opcode</a:t>
             </a:r>
-            <a:endParaRPr lang="en-US" sz="1400" dirty="0"/>
           </a:p>
         </p:txBody>
       </p:sp>
@@ -21248,10 +20983,9 @@
           <a:lstStyle/>
           <a:p>
             <a:r>
-              <a:rPr lang="en-US" sz="1400" dirty="0" smtClean="0"/>
+              <a:rPr lang="en-US" sz="1400" dirty="0"/>
               <a:t>funct3</a:t>
             </a:r>
-            <a:endParaRPr lang="en-US" sz="1400" dirty="0"/>
           </a:p>
         </p:txBody>
       </p:sp>
@@ -21279,13 +21013,8 @@
           <a:p>
             <a:r>
               <a:rPr lang="en-US" sz="1400" dirty="0"/>
-              <a:t>S</a:t>
+              <a:t>Store Data</a:t>
             </a:r>
-            <a:r>
-              <a:rPr lang="en-US" sz="1400" dirty="0" smtClean="0"/>
-              <a:t>tore Data</a:t>
-            </a:r>
-            <a:endParaRPr lang="en-US" sz="1400" dirty="0"/>
           </a:p>
         </p:txBody>
       </p:sp>
@@ -21293,14 +21022,15 @@
         <p:nvCxnSpPr>
           <p:cNvPr id="536" name="Elbow Connector 535"/>
           <p:cNvCxnSpPr>
+            <a:cxnSpLocks/>
             <a:stCxn id="502" idx="2"/>
           </p:cNvCxnSpPr>
           <p:nvPr/>
         </p:nvCxnSpPr>
         <p:spPr>
           <a:xfrm rot="16200000" flipH="1">
-            <a:off x="13853977" y="5468100"/>
-            <a:ext cx="389400" cy="791942"/>
+            <a:off x="13838004" y="5484073"/>
+            <a:ext cx="392343" cy="762938"/>
           </a:xfrm>
           <a:prstGeom prst="bentConnector2">
             <a:avLst/>
@@ -21335,7 +21065,7 @@
         </p:nvSpPr>
         <p:spPr>
           <a:xfrm>
-            <a:off x="13543320" y="6065304"/>
+            <a:off x="13585238" y="6061718"/>
             <a:ext cx="916598" cy="307777"/>
           </a:xfrm>
           <a:prstGeom prst="rect">
@@ -21350,10 +21080,9 @@
           <a:lstStyle/>
           <a:p>
             <a:r>
-              <a:rPr lang="en-US" sz="1400" dirty="0" smtClean="0"/>
+              <a:rPr lang="en-US" sz="1400" dirty="0"/>
               <a:t>Load Data</a:t>
             </a:r>
-            <a:endParaRPr lang="en-US" sz="1400" dirty="0"/>
           </a:p>
         </p:txBody>
       </p:sp>
@@ -21409,7 +21138,7 @@
           <a:p>
             <a:pPr algn="ctr"/>
             <a:r>
-              <a:rPr lang="en-US" sz="1798" dirty="0" smtClean="0">
+              <a:rPr lang="en-US" sz="1798" dirty="0">
                 <a:solidFill>
                   <a:schemeClr val="tx1"/>
                 </a:solidFill>
@@ -21420,18 +21149,13 @@
           <a:p>
             <a:pPr algn="ctr"/>
             <a:r>
-              <a:rPr lang="en-US" sz="1798" dirty="0" smtClean="0">
+              <a:rPr lang="en-US" sz="1798" dirty="0">
                 <a:solidFill>
                   <a:schemeClr val="tx1"/>
                 </a:solidFill>
               </a:rPr>
               <a:t>(Write)</a:t>
             </a:r>
-            <a:endParaRPr lang="en-US" sz="1798" dirty="0">
-              <a:solidFill>
-                <a:schemeClr val="tx1"/>
-              </a:solidFill>
-            </a:endParaRPr>
           </a:p>
         </p:txBody>
       </p:sp>
@@ -21482,7 +21206,7 @@
         </p:nvSpPr>
         <p:spPr>
           <a:xfrm>
-            <a:off x="15798412" y="4373492"/>
+            <a:off x="15790891" y="4258804"/>
             <a:ext cx="973536" cy="307777"/>
           </a:xfrm>
           <a:prstGeom prst="rect">
@@ -21497,23 +21221,24 @@
           <a:lstStyle/>
           <a:p>
             <a:r>
-              <a:rPr lang="en-US" sz="1400" dirty="0" smtClean="0"/>
+              <a:rPr lang="en-US" sz="1400" dirty="0"/>
               <a:t>Write Data</a:t>
             </a:r>
-            <a:endParaRPr lang="en-US" sz="1400" dirty="0"/>
           </a:p>
         </p:txBody>
       </p:sp>
       <p:cxnSp>
         <p:nvCxnSpPr>
           <p:cNvPr id="543" name="Straight Arrow Connector 542"/>
-          <p:cNvCxnSpPr/>
+          <p:cNvCxnSpPr>
+            <a:cxnSpLocks/>
+          </p:cNvCxnSpPr>
           <p:nvPr/>
         </p:nvCxnSpPr>
         <p:spPr>
           <a:xfrm>
-            <a:off x="15421475" y="2228470"/>
-            <a:ext cx="0" cy="1709948"/>
+            <a:off x="15421475" y="2237837"/>
+            <a:ext cx="0" cy="1700581"/>
           </a:xfrm>
           <a:prstGeom prst="straightConnector1">
             <a:avLst/>
@@ -21637,10 +21362,9 @@
           <a:lstStyle/>
           <a:p>
             <a:r>
-              <a:rPr lang="en-US" sz="1600" dirty="0" smtClean="0"/>
+              <a:rPr lang="en-US" sz="1600" dirty="0"/>
               <a:t>immediate</a:t>
             </a:r>
-            <a:endParaRPr lang="en-US" sz="1600" dirty="0"/>
           </a:p>
         </p:txBody>
       </p:sp>
@@ -21667,10 +21391,9 @@
           <a:lstStyle/>
           <a:p>
             <a:r>
-              <a:rPr lang="en-US" sz="1600" dirty="0" smtClean="0"/>
+              <a:rPr lang="en-US" sz="1600" dirty="0"/>
               <a:t>Load Data</a:t>
             </a:r>
-            <a:endParaRPr lang="en-US" sz="1600" dirty="0"/>
           </a:p>
         </p:txBody>
       </p:sp>
@@ -21697,10 +21420,9 @@
           <a:lstStyle/>
           <a:p>
             <a:r>
-              <a:rPr lang="en-US" sz="1600" dirty="0" smtClean="0"/>
+              <a:rPr lang="en-US" sz="1600" dirty="0"/>
               <a:t>ALU Output</a:t>
             </a:r>
-            <a:endParaRPr lang="en-US" sz="1600" dirty="0"/>
           </a:p>
         </p:txBody>
       </p:sp>
@@ -21727,10 +21449,9 @@
           <a:lstStyle/>
           <a:p>
             <a:r>
-              <a:rPr lang="en-US" sz="1400" dirty="0" smtClean="0"/>
+              <a:rPr lang="en-US" sz="1400" dirty="0"/>
               <a:t>Write Index</a:t>
             </a:r>
-            <a:endParaRPr lang="en-US" sz="1400" dirty="0"/>
           </a:p>
         </p:txBody>
       </p:sp>
@@ -21757,10 +21478,9 @@
           <a:lstStyle/>
           <a:p>
             <a:r>
-              <a:rPr lang="en-US" sz="1400" dirty="0" smtClean="0"/>
+              <a:rPr lang="en-US" sz="1400" dirty="0"/>
               <a:t>Write Enable</a:t>
             </a:r>
-            <a:endParaRPr lang="en-US" sz="1400" dirty="0"/>
           </a:p>
         </p:txBody>
       </p:sp>
@@ -21848,8 +21568,8 @@
         </p:nvSpPr>
         <p:spPr>
           <a:xfrm>
-            <a:off x="3974592" y="8371445"/>
-            <a:ext cx="12797356" cy="612740"/>
+            <a:off x="3971433" y="8268115"/>
+            <a:ext cx="12792994" cy="501504"/>
           </a:xfrm>
           <a:prstGeom prst="roundRect">
             <a:avLst>
@@ -21892,7 +21612,7 @@
           <a:p>
             <a:pPr algn="ctr"/>
             <a:r>
-              <a:rPr lang="en-US" sz="1798" dirty="0" smtClean="0">
+              <a:rPr lang="en-US" sz="1798" dirty="0">
                 <a:solidFill>
                   <a:schemeClr val="tx1"/>
                 </a:solidFill>
@@ -21900,7 +21620,7 @@
               <a:t>Hazard Detection and </a:t>
             </a:r>
             <a:r>
-              <a:rPr lang="en-US" sz="1798" smtClean="0">
+              <a:rPr lang="en-US" sz="1798">
                 <a:solidFill>
                   <a:schemeClr val="tx1"/>
                 </a:solidFill>
@@ -21938,10 +21658,9 @@
           <a:lstStyle/>
           <a:p>
             <a:r>
-              <a:rPr lang="en-US" sz="1400" dirty="0" smtClean="0"/>
+              <a:rPr lang="en-US" sz="1400" dirty="0"/>
               <a:t>Register Source 2 Bus</a:t>
             </a:r>
-            <a:endParaRPr lang="en-US" sz="1400" dirty="0"/>
           </a:p>
         </p:txBody>
       </p:sp>
@@ -21961,6 +21680,273 @@
           <a:prstGeom prst="bentConnector3">
             <a:avLst>
               <a:gd name="adj1" fmla="val -1146"/>
+            </a:avLst>
+          </a:prstGeom>
+          <a:ln w="12700">
+            <a:solidFill>
+              <a:schemeClr val="tx1"/>
+            </a:solidFill>
+            <a:tailEnd type="triangle"/>
+          </a:ln>
+        </p:spPr>
+        <p:style>
+          <a:lnRef idx="1">
+            <a:schemeClr val="accent1"/>
+          </a:lnRef>
+          <a:fillRef idx="0">
+            <a:schemeClr val="accent1"/>
+          </a:fillRef>
+          <a:effectRef idx="0">
+            <a:schemeClr val="accent1"/>
+          </a:effectRef>
+          <a:fontRef idx="minor">
+            <a:schemeClr val="tx1"/>
+          </a:fontRef>
+        </p:style>
+      </p:cxnSp>
+      <p:cxnSp>
+        <p:nvCxnSpPr>
+          <p:cNvPr id="42" name="Connector: Elbow 41">
+            <a:extLst>
+              <a:ext uri="{FF2B5EF4-FFF2-40B4-BE49-F238E27FC236}">
+                <a16:creationId xmlns:a16="http://schemas.microsoft.com/office/drawing/2014/main" id="{1C67DE59-B1FC-AF82-61E3-040D9C7F138C}"/>
+              </a:ext>
+            </a:extLst>
+          </p:cNvPr>
+          <p:cNvCxnSpPr/>
+          <p:nvPr/>
+        </p:nvCxnSpPr>
+        <p:spPr>
+          <a:xfrm rot="10800000">
+            <a:off x="15005193" y="2111321"/>
+            <a:ext cx="416283" cy="126517"/>
+          </a:xfrm>
+          <a:prstGeom prst="bentConnector3">
+            <a:avLst>
+              <a:gd name="adj1" fmla="val -338"/>
+            </a:avLst>
+          </a:prstGeom>
+          <a:ln w="12700">
+            <a:solidFill>
+              <a:schemeClr val="tx1"/>
+            </a:solidFill>
+          </a:ln>
+        </p:spPr>
+        <p:style>
+          <a:lnRef idx="1">
+            <a:schemeClr val="dk1"/>
+          </a:lnRef>
+          <a:fillRef idx="0">
+            <a:schemeClr val="dk1"/>
+          </a:fillRef>
+          <a:effectRef idx="0">
+            <a:schemeClr val="dk1"/>
+          </a:effectRef>
+          <a:fontRef idx="minor">
+            <a:schemeClr val="tx1"/>
+          </a:fontRef>
+        </p:style>
+      </p:cxnSp>
+      <p:cxnSp>
+        <p:nvCxnSpPr>
+          <p:cNvPr id="46" name="Connector: Elbow 45">
+            <a:extLst>
+              <a:ext uri="{FF2B5EF4-FFF2-40B4-BE49-F238E27FC236}">
+                <a16:creationId xmlns:a16="http://schemas.microsoft.com/office/drawing/2014/main" id="{B6C757D3-702F-E13E-8C3B-E31266A50557}"/>
+              </a:ext>
+            </a:extLst>
+          </p:cNvPr>
+          <p:cNvCxnSpPr>
+            <a:cxnSpLocks/>
+          </p:cNvCxnSpPr>
+          <p:nvPr/>
+        </p:nvCxnSpPr>
+        <p:spPr>
+          <a:xfrm rot="10800000">
+            <a:off x="15013230" y="1889413"/>
+            <a:ext cx="809114" cy="347372"/>
+          </a:xfrm>
+          <a:prstGeom prst="bentConnector3">
+            <a:avLst>
+              <a:gd name="adj1" fmla="val -32"/>
+            </a:avLst>
+          </a:prstGeom>
+          <a:ln w="12700">
+            <a:solidFill>
+              <a:schemeClr val="tx1"/>
+            </a:solidFill>
+          </a:ln>
+        </p:spPr>
+        <p:style>
+          <a:lnRef idx="1">
+            <a:schemeClr val="dk1"/>
+          </a:lnRef>
+          <a:fillRef idx="0">
+            <a:schemeClr val="dk1"/>
+          </a:fillRef>
+          <a:effectRef idx="0">
+            <a:schemeClr val="dk1"/>
+          </a:effectRef>
+          <a:fontRef idx="minor">
+            <a:schemeClr val="tx1"/>
+          </a:fontRef>
+        </p:style>
+      </p:cxnSp>
+      <p:cxnSp>
+        <p:nvCxnSpPr>
+          <p:cNvPr id="51" name="Connector: Elbow 50">
+            <a:extLst>
+              <a:ext uri="{FF2B5EF4-FFF2-40B4-BE49-F238E27FC236}">
+                <a16:creationId xmlns:a16="http://schemas.microsoft.com/office/drawing/2014/main" id="{7A6B1384-098F-F884-72BB-8C541FC727BC}"/>
+              </a:ext>
+            </a:extLst>
+          </p:cNvPr>
+          <p:cNvCxnSpPr>
+            <a:cxnSpLocks/>
+          </p:cNvCxnSpPr>
+          <p:nvPr/>
+        </p:nvCxnSpPr>
+        <p:spPr>
+          <a:xfrm rot="10800000">
+            <a:off x="15005193" y="1700260"/>
+            <a:ext cx="1212149" cy="552277"/>
+          </a:xfrm>
+          <a:prstGeom prst="bentConnector3">
+            <a:avLst>
+              <a:gd name="adj1" fmla="val 102"/>
+            </a:avLst>
+          </a:prstGeom>
+          <a:ln w="12700">
+            <a:solidFill>
+              <a:schemeClr val="tx1"/>
+            </a:solidFill>
+          </a:ln>
+        </p:spPr>
+        <p:style>
+          <a:lnRef idx="1">
+            <a:schemeClr val="dk1"/>
+          </a:lnRef>
+          <a:fillRef idx="0">
+            <a:schemeClr val="dk1"/>
+          </a:fillRef>
+          <a:effectRef idx="0">
+            <a:schemeClr val="dk1"/>
+          </a:effectRef>
+          <a:fontRef idx="minor">
+            <a:schemeClr val="tx1"/>
+          </a:fontRef>
+        </p:style>
+      </p:cxnSp>
+      <p:cxnSp>
+        <p:nvCxnSpPr>
+          <p:cNvPr id="449" name="Straight Arrow Connector 448">
+            <a:extLst>
+              <a:ext uri="{FF2B5EF4-FFF2-40B4-BE49-F238E27FC236}">
+                <a16:creationId xmlns:a16="http://schemas.microsoft.com/office/drawing/2014/main" id="{7DC3677B-3FE1-1AB3-35CF-F10C1219A55E}"/>
+              </a:ext>
+            </a:extLst>
+          </p:cNvPr>
+          <p:cNvCxnSpPr>
+            <a:cxnSpLocks/>
+          </p:cNvCxnSpPr>
+          <p:nvPr/>
+        </p:nvCxnSpPr>
+        <p:spPr>
+          <a:xfrm>
+            <a:off x="11976130" y="4610107"/>
+            <a:ext cx="0" cy="3658008"/>
+          </a:xfrm>
+          <a:prstGeom prst="straightConnector1">
+            <a:avLst/>
+          </a:prstGeom>
+          <a:ln w="12700">
+            <a:solidFill>
+              <a:schemeClr val="tx1"/>
+            </a:solidFill>
+            <a:tailEnd type="triangle"/>
+          </a:ln>
+        </p:spPr>
+        <p:style>
+          <a:lnRef idx="1">
+            <a:schemeClr val="accent1"/>
+          </a:lnRef>
+          <a:fillRef idx="0">
+            <a:schemeClr val="accent1"/>
+          </a:fillRef>
+          <a:effectRef idx="0">
+            <a:schemeClr val="accent1"/>
+          </a:effectRef>
+          <a:fontRef idx="minor">
+            <a:schemeClr val="tx1"/>
+          </a:fontRef>
+        </p:style>
+      </p:cxnSp>
+      <p:cxnSp>
+        <p:nvCxnSpPr>
+          <p:cNvPr id="458" name="Straight Arrow Connector 457">
+            <a:extLst>
+              <a:ext uri="{FF2B5EF4-FFF2-40B4-BE49-F238E27FC236}">
+                <a16:creationId xmlns:a16="http://schemas.microsoft.com/office/drawing/2014/main" id="{A8C32D93-5FFA-B4A7-0931-C3C0E7A7AE35}"/>
+              </a:ext>
+            </a:extLst>
+          </p:cNvPr>
+          <p:cNvCxnSpPr>
+            <a:cxnSpLocks/>
+          </p:cNvCxnSpPr>
+          <p:nvPr/>
+        </p:nvCxnSpPr>
+        <p:spPr>
+          <a:xfrm>
+            <a:off x="13652048" y="6045370"/>
+            <a:ext cx="0" cy="2222745"/>
+          </a:xfrm>
+          <a:prstGeom prst="straightConnector1">
+            <a:avLst/>
+          </a:prstGeom>
+          <a:ln w="12700">
+            <a:solidFill>
+              <a:schemeClr val="tx1"/>
+            </a:solidFill>
+            <a:tailEnd type="triangle"/>
+          </a:ln>
+        </p:spPr>
+        <p:style>
+          <a:lnRef idx="1">
+            <a:schemeClr val="accent1"/>
+          </a:lnRef>
+          <a:fillRef idx="0">
+            <a:schemeClr val="accent1"/>
+          </a:fillRef>
+          <a:effectRef idx="0">
+            <a:schemeClr val="accent1"/>
+          </a:effectRef>
+          <a:fontRef idx="minor">
+            <a:schemeClr val="tx1"/>
+          </a:fontRef>
+        </p:style>
+      </p:cxnSp>
+      <p:cxnSp>
+        <p:nvCxnSpPr>
+          <p:cNvPr id="468" name="Connector: Elbow 467">
+            <a:extLst>
+              <a:ext uri="{FF2B5EF4-FFF2-40B4-BE49-F238E27FC236}">
+                <a16:creationId xmlns:a16="http://schemas.microsoft.com/office/drawing/2014/main" id="{9ED975EF-3A1B-D1B8-6562-7E77C9F7A747}"/>
+              </a:ext>
+            </a:extLst>
+          </p:cNvPr>
+          <p:cNvCxnSpPr>
+            <a:cxnSpLocks/>
+          </p:cNvCxnSpPr>
+          <p:nvPr/>
+        </p:nvCxnSpPr>
+        <p:spPr>
+          <a:xfrm rot="16200000" flipH="1">
+            <a:off x="14386440" y="6058935"/>
+            <a:ext cx="3640914" cy="757963"/>
+          </a:xfrm>
+          <a:prstGeom prst="bentConnector3">
+            <a:avLst>
+              <a:gd name="adj1" fmla="val -1145"/>
             </a:avLst>
           </a:prstGeom>
           <a:ln w="12700">
@@ -21995,13 +21981,6 @@
   <p:clrMapOvr>
     <a:masterClrMapping/>
   </p:clrMapOvr>
-  <p:timing>
-    <p:tnLst>
-      <p:par>
-        <p:cTn id="1" dur="indefinite" restart="never" nodeType="tmRoot"/>
-      </p:par>
-    </p:tnLst>
-  </p:timing>
 </p:sld>
 </file>
 

</xml_diff>